<commit_message>
Added in text and photos to some slides
</commit_message>
<xml_diff>
--- a/presentation/New Thesis Presentation.pptx
+++ b/presentation/New Thesis Presentation.pptx
@@ -5,10 +5,10 @@
     <p:sldMasterId id="2147483648" r:id="rId1"/>
   </p:sldMasterIdLst>
   <p:notesMasterIdLst>
-    <p:notesMasterId r:id="rId13"/>
+    <p:notesMasterId r:id="rId12"/>
   </p:notesMasterIdLst>
   <p:handoutMasterIdLst>
-    <p:handoutMasterId r:id="rId14"/>
+    <p:handoutMasterId r:id="rId13"/>
   </p:handoutMasterIdLst>
   <p:sldIdLst>
     <p:sldId id="261" r:id="rId2"/>
@@ -19,9 +19,8 @@
     <p:sldId id="264" r:id="rId7"/>
     <p:sldId id="265" r:id="rId8"/>
     <p:sldId id="266" r:id="rId9"/>
-    <p:sldId id="268" r:id="rId10"/>
-    <p:sldId id="269" r:id="rId11"/>
-    <p:sldId id="271" r:id="rId12"/>
+    <p:sldId id="272" r:id="rId10"/>
+    <p:sldId id="271" r:id="rId11"/>
   </p:sldIdLst>
   <p:sldSz cx="12192000" cy="6858000"/>
   <p:notesSz cx="6858000" cy="9144000"/>
@@ -163,14 +162,13 @@
             <p14:sldId id="266"/>
           </p14:sldIdLst>
         </p14:section>
-        <p14:section name="Conclussions" id="{F2855F61-745D-4C37-8467-6876D9730DB6}">
+        <p14:section name="Conclusions &amp; Future Work" id="{F2855F61-745D-4C37-8467-6876D9730DB6}">
           <p14:sldIdLst>
-            <p14:sldId id="268"/>
+            <p14:sldId id="272"/>
           </p14:sldIdLst>
         </p14:section>
         <p14:section name="Future Work" id="{3CC1A3CD-6760-474B-ADB2-98BE0243CDCC}">
           <p14:sldIdLst>
-            <p14:sldId id="269"/>
             <p14:sldId id="271"/>
           </p14:sldIdLst>
         </p14:section>
@@ -208,14 +206,69 @@
   <c:roundedCorners val="0"/>
   <mc:AlternateContent xmlns:mc="http://schemas.openxmlformats.org/markup-compatibility/2006">
     <mc:Choice xmlns:c14="http://schemas.microsoft.com/office/drawing/2007/8/2/chart" Requires="c14">
-      <c14:style val="103"/>
+      <c14:style val="102"/>
     </mc:Choice>
     <mc:Fallback>
-      <c:style val="3"/>
+      <c:style val="2"/>
     </mc:Fallback>
   </mc:AlternateContent>
   <c:chart>
-    <c:autoTitleDeleted val="1"/>
+    <c:title>
+      <c:tx>
+        <c:rich>
+          <a:bodyPr rot="0" spcFirstLastPara="1" vertOverflow="ellipsis" vert="horz" wrap="square" anchor="ctr" anchorCtr="1"/>
+          <a:lstStyle/>
+          <a:p>
+            <a:pPr>
+              <a:defRPr sz="1862" b="0" i="0" u="none" strike="noStrike" kern="1200" spc="0" baseline="0">
+                <a:solidFill>
+                  <a:schemeClr val="tx1">
+                    <a:lumMod val="65000"/>
+                    <a:lumOff val="35000"/>
+                  </a:schemeClr>
+                </a:solidFill>
+                <a:latin typeface="+mn-lt"/>
+                <a:ea typeface="+mn-ea"/>
+                <a:cs typeface="+mn-cs"/>
+              </a:defRPr>
+            </a:pPr>
+            <a:r>
+              <a:rPr lang="en-IE" dirty="0"/>
+              <a:t>Algorithm Frequency</a:t>
+            </a:r>
+          </a:p>
+        </c:rich>
+      </c:tx>
+      <c:overlay val="0"/>
+      <c:spPr>
+        <a:noFill/>
+        <a:ln>
+          <a:noFill/>
+        </a:ln>
+        <a:effectLst/>
+      </c:spPr>
+      <c:txPr>
+        <a:bodyPr rot="0" spcFirstLastPara="1" vertOverflow="ellipsis" vert="horz" wrap="square" anchor="ctr" anchorCtr="1"/>
+        <a:lstStyle/>
+        <a:p>
+          <a:pPr>
+            <a:defRPr sz="1862" b="0" i="0" u="none" strike="noStrike" kern="1200" spc="0" baseline="0">
+              <a:solidFill>
+                <a:schemeClr val="tx1">
+                  <a:lumMod val="65000"/>
+                  <a:lumOff val="35000"/>
+                </a:schemeClr>
+              </a:solidFill>
+              <a:latin typeface="+mn-lt"/>
+              <a:ea typeface="+mn-ea"/>
+              <a:cs typeface="+mn-cs"/>
+            </a:defRPr>
+          </a:pPr>
+          <a:endParaRPr lang="en-US"/>
+        </a:p>
+      </c:txPr>
+    </c:title>
+    <c:autoTitleDeleted val="0"/>
     <c:plotArea>
       <c:layout/>
       <c:barChart>
@@ -231,41 +284,15 @@
               <c:strCache>
                 <c:ptCount val="1"/>
                 <c:pt idx="0">
-                  <c:v>Series 1</c:v>
+                  <c:v>Palindrome</c:v>
                 </c:pt>
               </c:strCache>
             </c:strRef>
           </c:tx>
           <c:spPr>
-            <a:gradFill rotWithShape="1">
-              <a:gsLst>
-                <a:gs pos="0">
-                  <a:schemeClr val="accent1">
-                    <a:shade val="65000"/>
-                    <a:satMod val="103000"/>
-                    <a:lumMod val="102000"/>
-                    <a:tint val="94000"/>
-                  </a:schemeClr>
-                </a:gs>
-                <a:gs pos="50000">
-                  <a:schemeClr val="accent1">
-                    <a:shade val="65000"/>
-                    <a:satMod val="110000"/>
-                    <a:lumMod val="100000"/>
-                    <a:shade val="100000"/>
-                  </a:schemeClr>
-                </a:gs>
-                <a:gs pos="100000">
-                  <a:schemeClr val="accent1">
-                    <a:shade val="65000"/>
-                    <a:lumMod val="99000"/>
-                    <a:satMod val="120000"/>
-                    <a:shade val="78000"/>
-                  </a:schemeClr>
-                </a:gs>
-              </a:gsLst>
-              <a:lin ang="5400000" scaled="0"/>
-            </a:gradFill>
+            <a:solidFill>
+              <a:schemeClr val="accent1"/>
+            </a:solidFill>
             <a:ln>
               <a:noFill/>
             </a:ln>
@@ -274,48 +301,30 @@
           <c:invertIfNegative val="0"/>
           <c:cat>
             <c:strRef>
-              <c:f>Sheet1!$A$2:$A$5</c:f>
+              <c:f>Sheet1!$A$2</c:f>
               <c:strCache>
-                <c:ptCount val="4"/>
+                <c:ptCount val="1"/>
                 <c:pt idx="0">
-                  <c:v>Category 1</c:v>
-                </c:pt>
-                <c:pt idx="1">
-                  <c:v>Category 2</c:v>
-                </c:pt>
-                <c:pt idx="2">
-                  <c:v>Category 3</c:v>
-                </c:pt>
-                <c:pt idx="3">
-                  <c:v>Category 4</c:v>
+                  <c:v>Algorithms </c:v>
                 </c:pt>
               </c:strCache>
             </c:strRef>
           </c:cat>
           <c:val>
             <c:numRef>
-              <c:f>Sheet1!$B$2:$B$5</c:f>
+              <c:f>Sheet1!$B$2</c:f>
               <c:numCache>
                 <c:formatCode>General</c:formatCode>
-                <c:ptCount val="4"/>
+                <c:ptCount val="1"/>
                 <c:pt idx="0">
-                  <c:v>4.3</c:v>
-                </c:pt>
-                <c:pt idx="1">
-                  <c:v>2.5</c:v>
-                </c:pt>
-                <c:pt idx="2">
-                  <c:v>3.5</c:v>
-                </c:pt>
-                <c:pt idx="3">
-                  <c:v>4.5</c:v>
+                  <c:v>5</c:v>
                 </c:pt>
               </c:numCache>
             </c:numRef>
           </c:val>
           <c:extLst>
             <c:ext xmlns:c16="http://schemas.microsoft.com/office/drawing/2014/chart" uri="{C3380CC4-5D6E-409C-BE32-E72D297353CC}">
-              <c16:uniqueId val="{00000000-0EE8-4DF7-827C-1D8E6340A006}"/>
+              <c16:uniqueId val="{00000000-1F3A-4319-B027-D80696FBA2D1}"/>
             </c:ext>
           </c:extLst>
         </c:ser>
@@ -328,38 +337,15 @@
               <c:strCache>
                 <c:ptCount val="1"/>
                 <c:pt idx="0">
-                  <c:v>Series 2</c:v>
+                  <c:v>Merge Sort</c:v>
                 </c:pt>
               </c:strCache>
             </c:strRef>
           </c:tx>
           <c:spPr>
-            <a:gradFill rotWithShape="1">
-              <a:gsLst>
-                <a:gs pos="0">
-                  <a:schemeClr val="accent1">
-                    <a:satMod val="103000"/>
-                    <a:lumMod val="102000"/>
-                    <a:tint val="94000"/>
-                  </a:schemeClr>
-                </a:gs>
-                <a:gs pos="50000">
-                  <a:schemeClr val="accent1">
-                    <a:satMod val="110000"/>
-                    <a:lumMod val="100000"/>
-                    <a:shade val="100000"/>
-                  </a:schemeClr>
-                </a:gs>
-                <a:gs pos="100000">
-                  <a:schemeClr val="accent1">
-                    <a:lumMod val="99000"/>
-                    <a:satMod val="120000"/>
-                    <a:shade val="78000"/>
-                  </a:schemeClr>
-                </a:gs>
-              </a:gsLst>
-              <a:lin ang="5400000" scaled="0"/>
-            </a:gradFill>
+            <a:solidFill>
+              <a:schemeClr val="accent2"/>
+            </a:solidFill>
             <a:ln>
               <a:noFill/>
             </a:ln>
@@ -368,48 +354,30 @@
           <c:invertIfNegative val="0"/>
           <c:cat>
             <c:strRef>
-              <c:f>Sheet1!$A$2:$A$5</c:f>
+              <c:f>Sheet1!$A$2</c:f>
               <c:strCache>
-                <c:ptCount val="4"/>
+                <c:ptCount val="1"/>
                 <c:pt idx="0">
-                  <c:v>Category 1</c:v>
-                </c:pt>
-                <c:pt idx="1">
-                  <c:v>Category 2</c:v>
-                </c:pt>
-                <c:pt idx="2">
-                  <c:v>Category 3</c:v>
-                </c:pt>
-                <c:pt idx="3">
-                  <c:v>Category 4</c:v>
+                  <c:v>Algorithms </c:v>
                 </c:pt>
               </c:strCache>
             </c:strRef>
           </c:cat>
           <c:val>
             <c:numRef>
-              <c:f>Sheet1!$C$2:$C$5</c:f>
+              <c:f>Sheet1!$C$2</c:f>
               <c:numCache>
                 <c:formatCode>General</c:formatCode>
-                <c:ptCount val="4"/>
+                <c:ptCount val="1"/>
                 <c:pt idx="0">
-                  <c:v>2.4</c:v>
-                </c:pt>
-                <c:pt idx="1">
-                  <c:v>4.4000000000000004</c:v>
-                </c:pt>
-                <c:pt idx="2">
-                  <c:v>1.8</c:v>
-                </c:pt>
-                <c:pt idx="3">
-                  <c:v>2.8</c:v>
+                  <c:v>2</c:v>
                 </c:pt>
               </c:numCache>
             </c:numRef>
           </c:val>
           <c:extLst>
             <c:ext xmlns:c16="http://schemas.microsoft.com/office/drawing/2014/chart" uri="{C3380CC4-5D6E-409C-BE32-E72D297353CC}">
-              <c16:uniqueId val="{00000001-0EE8-4DF7-827C-1D8E6340A006}"/>
+              <c16:uniqueId val="{00000001-1F3A-4319-B027-D80696FBA2D1}"/>
             </c:ext>
           </c:extLst>
         </c:ser>
@@ -422,41 +390,15 @@
               <c:strCache>
                 <c:ptCount val="1"/>
                 <c:pt idx="0">
-                  <c:v>Series 3</c:v>
+                  <c:v>Binary Search</c:v>
                 </c:pt>
               </c:strCache>
             </c:strRef>
           </c:tx>
           <c:spPr>
-            <a:gradFill rotWithShape="1">
-              <a:gsLst>
-                <a:gs pos="0">
-                  <a:schemeClr val="accent1">
-                    <a:tint val="65000"/>
-                    <a:satMod val="103000"/>
-                    <a:lumMod val="102000"/>
-                    <a:tint val="94000"/>
-                  </a:schemeClr>
-                </a:gs>
-                <a:gs pos="50000">
-                  <a:schemeClr val="accent1">
-                    <a:tint val="65000"/>
-                    <a:satMod val="110000"/>
-                    <a:lumMod val="100000"/>
-                    <a:shade val="100000"/>
-                  </a:schemeClr>
-                </a:gs>
-                <a:gs pos="100000">
-                  <a:schemeClr val="accent1">
-                    <a:tint val="65000"/>
-                    <a:lumMod val="99000"/>
-                    <a:satMod val="120000"/>
-                    <a:shade val="78000"/>
-                  </a:schemeClr>
-                </a:gs>
-              </a:gsLst>
-              <a:lin ang="5400000" scaled="0"/>
-            </a:gradFill>
+            <a:solidFill>
+              <a:schemeClr val="accent3"/>
+            </a:solidFill>
             <a:ln>
               <a:noFill/>
             </a:ln>
@@ -465,48 +407,244 @@
           <c:invertIfNegative val="0"/>
           <c:cat>
             <c:strRef>
-              <c:f>Sheet1!$A$2:$A$5</c:f>
+              <c:f>Sheet1!$A$2</c:f>
               <c:strCache>
-                <c:ptCount val="4"/>
+                <c:ptCount val="1"/>
                 <c:pt idx="0">
-                  <c:v>Category 1</c:v>
-                </c:pt>
-                <c:pt idx="1">
-                  <c:v>Category 2</c:v>
-                </c:pt>
-                <c:pt idx="2">
-                  <c:v>Category 3</c:v>
-                </c:pt>
-                <c:pt idx="3">
-                  <c:v>Category 4</c:v>
+                  <c:v>Algorithms </c:v>
                 </c:pt>
               </c:strCache>
             </c:strRef>
           </c:cat>
           <c:val>
             <c:numRef>
-              <c:f>Sheet1!$D$2:$D$5</c:f>
+              <c:f>Sheet1!$D$2</c:f>
               <c:numCache>
                 <c:formatCode>General</c:formatCode>
-                <c:ptCount val="4"/>
+                <c:ptCount val="1"/>
                 <c:pt idx="0">
                   <c:v>2</c:v>
-                </c:pt>
-                <c:pt idx="1">
-                  <c:v>2</c:v>
-                </c:pt>
-                <c:pt idx="2">
-                  <c:v>3</c:v>
-                </c:pt>
-                <c:pt idx="3">
-                  <c:v>5</c:v>
                 </c:pt>
               </c:numCache>
             </c:numRef>
           </c:val>
           <c:extLst>
             <c:ext xmlns:c16="http://schemas.microsoft.com/office/drawing/2014/chart" uri="{C3380CC4-5D6E-409C-BE32-E72D297353CC}">
-              <c16:uniqueId val="{00000002-0EE8-4DF7-827C-1D8E6340A006}"/>
+              <c16:uniqueId val="{00000002-1F3A-4319-B027-D80696FBA2D1}"/>
+            </c:ext>
+          </c:extLst>
+        </c:ser>
+        <c:ser>
+          <c:idx val="3"/>
+          <c:order val="3"/>
+          <c:tx>
+            <c:strRef>
+              <c:f>Sheet1!$E$1</c:f>
+              <c:strCache>
+                <c:ptCount val="1"/>
+                <c:pt idx="0">
+                  <c:v>Tree Traversal</c:v>
+                </c:pt>
+              </c:strCache>
+            </c:strRef>
+          </c:tx>
+          <c:spPr>
+            <a:solidFill>
+              <a:schemeClr val="accent4"/>
+            </a:solidFill>
+            <a:ln>
+              <a:noFill/>
+            </a:ln>
+            <a:effectLst/>
+          </c:spPr>
+          <c:invertIfNegative val="0"/>
+          <c:cat>
+            <c:strRef>
+              <c:f>Sheet1!$A$2</c:f>
+              <c:strCache>
+                <c:ptCount val="1"/>
+                <c:pt idx="0">
+                  <c:v>Algorithms </c:v>
+                </c:pt>
+              </c:strCache>
+            </c:strRef>
+          </c:cat>
+          <c:val>
+            <c:numRef>
+              <c:f>Sheet1!$E$2</c:f>
+              <c:numCache>
+                <c:formatCode>General</c:formatCode>
+                <c:ptCount val="1"/>
+                <c:pt idx="0">
+                  <c:v>6</c:v>
+                </c:pt>
+              </c:numCache>
+            </c:numRef>
+          </c:val>
+          <c:extLst>
+            <c:ext xmlns:c16="http://schemas.microsoft.com/office/drawing/2014/chart" uri="{C3380CC4-5D6E-409C-BE32-E72D297353CC}">
+              <c16:uniqueId val="{00000003-1F3A-4319-B027-D80696FBA2D1}"/>
+            </c:ext>
+          </c:extLst>
+        </c:ser>
+        <c:ser>
+          <c:idx val="4"/>
+          <c:order val="4"/>
+          <c:tx>
+            <c:strRef>
+              <c:f>Sheet1!$F$1</c:f>
+              <c:strCache>
+                <c:ptCount val="1"/>
+                <c:pt idx="0">
+                  <c:v>Breadth-First Search</c:v>
+                </c:pt>
+              </c:strCache>
+            </c:strRef>
+          </c:tx>
+          <c:spPr>
+            <a:solidFill>
+              <a:schemeClr val="accent5"/>
+            </a:solidFill>
+            <a:ln>
+              <a:noFill/>
+            </a:ln>
+            <a:effectLst/>
+          </c:spPr>
+          <c:invertIfNegative val="0"/>
+          <c:cat>
+            <c:strRef>
+              <c:f>Sheet1!$A$2</c:f>
+              <c:strCache>
+                <c:ptCount val="1"/>
+                <c:pt idx="0">
+                  <c:v>Algorithms </c:v>
+                </c:pt>
+              </c:strCache>
+            </c:strRef>
+          </c:cat>
+          <c:val>
+            <c:numRef>
+              <c:f>Sheet1!$F$2</c:f>
+              <c:numCache>
+                <c:formatCode>General</c:formatCode>
+                <c:ptCount val="1"/>
+                <c:pt idx="0">
+                  <c:v>2</c:v>
+                </c:pt>
+              </c:numCache>
+            </c:numRef>
+          </c:val>
+          <c:extLst>
+            <c:ext xmlns:c16="http://schemas.microsoft.com/office/drawing/2014/chart" uri="{C3380CC4-5D6E-409C-BE32-E72D297353CC}">
+              <c16:uniqueId val="{00000004-1F3A-4319-B027-D80696FBA2D1}"/>
+            </c:ext>
+          </c:extLst>
+        </c:ser>
+        <c:ser>
+          <c:idx val="5"/>
+          <c:order val="5"/>
+          <c:tx>
+            <c:strRef>
+              <c:f>Sheet1!$G$1</c:f>
+              <c:strCache>
+                <c:ptCount val="1"/>
+                <c:pt idx="0">
+                  <c:v>Depth-First Search</c:v>
+                </c:pt>
+              </c:strCache>
+            </c:strRef>
+          </c:tx>
+          <c:spPr>
+            <a:solidFill>
+              <a:schemeClr val="accent6"/>
+            </a:solidFill>
+            <a:ln>
+              <a:noFill/>
+            </a:ln>
+            <a:effectLst/>
+          </c:spPr>
+          <c:invertIfNegative val="0"/>
+          <c:cat>
+            <c:strRef>
+              <c:f>Sheet1!$A$2</c:f>
+              <c:strCache>
+                <c:ptCount val="1"/>
+                <c:pt idx="0">
+                  <c:v>Algorithms </c:v>
+                </c:pt>
+              </c:strCache>
+            </c:strRef>
+          </c:cat>
+          <c:val>
+            <c:numRef>
+              <c:f>Sheet1!$G$2</c:f>
+              <c:numCache>
+                <c:formatCode>General</c:formatCode>
+                <c:ptCount val="1"/>
+                <c:pt idx="0">
+                  <c:v>0</c:v>
+                </c:pt>
+              </c:numCache>
+            </c:numRef>
+          </c:val>
+          <c:extLst>
+            <c:ext xmlns:c16="http://schemas.microsoft.com/office/drawing/2014/chart" uri="{C3380CC4-5D6E-409C-BE32-E72D297353CC}">
+              <c16:uniqueId val="{00000005-1F3A-4319-B027-D80696FBA2D1}"/>
+            </c:ext>
+          </c:extLst>
+        </c:ser>
+        <c:ser>
+          <c:idx val="6"/>
+          <c:order val="6"/>
+          <c:tx>
+            <c:strRef>
+              <c:f>Sheet1!$H$1</c:f>
+              <c:strCache>
+                <c:ptCount val="1"/>
+                <c:pt idx="0">
+                  <c:v>Dynamic Programming</c:v>
+                </c:pt>
+              </c:strCache>
+            </c:strRef>
+          </c:tx>
+          <c:spPr>
+            <a:solidFill>
+              <a:schemeClr val="accent1">
+                <a:lumMod val="60000"/>
+              </a:schemeClr>
+            </a:solidFill>
+            <a:ln>
+              <a:noFill/>
+            </a:ln>
+            <a:effectLst/>
+          </c:spPr>
+          <c:invertIfNegative val="0"/>
+          <c:cat>
+            <c:strRef>
+              <c:f>Sheet1!$A$2</c:f>
+              <c:strCache>
+                <c:ptCount val="1"/>
+                <c:pt idx="0">
+                  <c:v>Algorithms </c:v>
+                </c:pt>
+              </c:strCache>
+            </c:strRef>
+          </c:cat>
+          <c:val>
+            <c:numRef>
+              <c:f>Sheet1!$H$2</c:f>
+              <c:numCache>
+                <c:formatCode>General</c:formatCode>
+                <c:ptCount val="1"/>
+                <c:pt idx="0">
+                  <c:v>3</c:v>
+                </c:pt>
+              </c:numCache>
+            </c:numRef>
+          </c:val>
+          <c:extLst>
+            <c:ext xmlns:c16="http://schemas.microsoft.com/office/drawing/2014/chart" uri="{C3380CC4-5D6E-409C-BE32-E72D297353CC}">
+              <c16:uniqueId val="{00000006-1F3A-4319-B027-D80696FBA2D1}"/>
             </c:ext>
           </c:extLst>
         </c:ser>
@@ -518,13 +656,13 @@
           <c:showPercent val="0"/>
           <c:showBubbleSize val="0"/>
         </c:dLbls>
-        <c:gapWidth val="100"/>
-        <c:overlap val="-24"/>
-        <c:axId val="96190280"/>
-        <c:axId val="96186752"/>
+        <c:gapWidth val="219"/>
+        <c:overlap val="-27"/>
+        <c:axId val="428634968"/>
+        <c:axId val="428636280"/>
       </c:barChart>
       <c:catAx>
-        <c:axId val="96190280"/>
+        <c:axId val="428634968"/>
         <c:scaling>
           <c:orientation val="minMax"/>
         </c:scaling>
@@ -538,7 +676,7 @@
           <a:noFill/>
           <a:ln w="9525" cap="flat" cmpd="sng" algn="ctr">
             <a:solidFill>
-              <a:schemeClr val="tx2">
+              <a:schemeClr val="tx1">
                 <a:lumMod val="15000"/>
                 <a:lumOff val="85000"/>
               </a:schemeClr>
@@ -554,7 +692,10 @@
             <a:pPr>
               <a:defRPr sz="1197" b="0" i="0" u="none" strike="noStrike" kern="1200" baseline="0">
                 <a:solidFill>
-                  <a:schemeClr val="tx2"/>
+                  <a:schemeClr val="tx1">
+                    <a:lumMod val="65000"/>
+                    <a:lumOff val="35000"/>
+                  </a:schemeClr>
                 </a:solidFill>
                 <a:latin typeface="+mn-lt"/>
                 <a:ea typeface="+mn-ea"/>
@@ -564,7 +705,7 @@
             <a:endParaRPr lang="en-US"/>
           </a:p>
         </c:txPr>
-        <c:crossAx val="96186752"/>
+        <c:crossAx val="428636280"/>
         <c:crosses val="autoZero"/>
         <c:auto val="1"/>
         <c:lblAlgn val="ctr"/>
@@ -572,7 +713,7 @@
         <c:noMultiLvlLbl val="0"/>
       </c:catAx>
       <c:valAx>
-        <c:axId val="96186752"/>
+        <c:axId val="428636280"/>
         <c:scaling>
           <c:orientation val="minMax"/>
         </c:scaling>
@@ -582,7 +723,7 @@
           <c:spPr>
             <a:ln w="9525" cap="flat" cmpd="sng" algn="ctr">
               <a:solidFill>
-                <a:schemeClr val="tx2">
+                <a:schemeClr val="tx1">
                   <a:lumMod val="15000"/>
                   <a:lumOff val="85000"/>
                 </a:schemeClr>
@@ -592,6 +733,61 @@
             <a:effectLst/>
           </c:spPr>
         </c:majorGridlines>
+        <c:title>
+          <c:tx>
+            <c:rich>
+              <a:bodyPr rot="-5400000" spcFirstLastPara="1" vertOverflow="ellipsis" vert="horz" wrap="square" anchor="ctr" anchorCtr="1"/>
+              <a:lstStyle/>
+              <a:p>
+                <a:pPr>
+                  <a:defRPr sz="1330" b="0" i="0" u="none" strike="noStrike" kern="1200" baseline="0">
+                    <a:solidFill>
+                      <a:schemeClr val="tx1">
+                        <a:lumMod val="65000"/>
+                        <a:lumOff val="35000"/>
+                      </a:schemeClr>
+                    </a:solidFill>
+                    <a:latin typeface="+mn-lt"/>
+                    <a:ea typeface="+mn-ea"/>
+                    <a:cs typeface="+mn-cs"/>
+                  </a:defRPr>
+                </a:pPr>
+                <a:r>
+                  <a:rPr lang="en-IE" dirty="0"/>
+                  <a:t>Frequency</a:t>
+                </a:r>
+              </a:p>
+            </c:rich>
+          </c:tx>
+          <c:overlay val="0"/>
+          <c:spPr>
+            <a:noFill/>
+            <a:ln>
+              <a:noFill/>
+            </a:ln>
+            <a:effectLst/>
+          </c:spPr>
+          <c:txPr>
+            <a:bodyPr rot="-5400000" spcFirstLastPara="1" vertOverflow="ellipsis" vert="horz" wrap="square" anchor="ctr" anchorCtr="1"/>
+            <a:lstStyle/>
+            <a:p>
+              <a:pPr>
+                <a:defRPr sz="1330" b="0" i="0" u="none" strike="noStrike" kern="1200" baseline="0">
+                  <a:solidFill>
+                    <a:schemeClr val="tx1">
+                      <a:lumMod val="65000"/>
+                      <a:lumOff val="35000"/>
+                    </a:schemeClr>
+                  </a:solidFill>
+                  <a:latin typeface="+mn-lt"/>
+                  <a:ea typeface="+mn-ea"/>
+                  <a:cs typeface="+mn-cs"/>
+                </a:defRPr>
+              </a:pPr>
+              <a:endParaRPr lang="en-US"/>
+            </a:p>
+          </c:txPr>
+        </c:title>
         <c:numFmt formatCode="General" sourceLinked="1"/>
         <c:majorTickMark val="none"/>
         <c:minorTickMark val="none"/>
@@ -610,7 +806,10 @@
             <a:pPr>
               <a:defRPr sz="1197" b="0" i="0" u="none" strike="noStrike" kern="1200" baseline="0">
                 <a:solidFill>
-                  <a:schemeClr val="tx2"/>
+                  <a:schemeClr val="tx1">
+                    <a:lumMod val="65000"/>
+                    <a:lumOff val="35000"/>
+                  </a:schemeClr>
                 </a:solidFill>
                 <a:latin typeface="+mn-lt"/>
                 <a:ea typeface="+mn-ea"/>
@@ -620,7 +819,7 @@
             <a:endParaRPr lang="en-US"/>
           </a:p>
         </c:txPr>
-        <c:crossAx val="96190280"/>
+        <c:crossAx val="428634968"/>
         <c:crosses val="autoZero"/>
         <c:crossBetween val="between"/>
       </c:valAx>
@@ -649,7 +848,10 @@
           <a:pPr>
             <a:defRPr sz="1197" b="0" i="0" u="none" strike="noStrike" kern="1200" baseline="0">
               <a:solidFill>
-                <a:schemeClr val="tx2"/>
+                <a:schemeClr val="tx1">
+                  <a:lumMod val="65000"/>
+                  <a:lumOff val="35000"/>
+                </a:schemeClr>
               </a:solidFill>
               <a:latin typeface="+mn-lt"/>
               <a:ea typeface="+mn-ea"/>
@@ -662,6 +864,715 @@
     </c:legend>
     <c:plotVisOnly val="1"/>
     <c:dispBlanksAs val="gap"/>
+    <c:extLst>
+      <c:ext xmlns:c16r3="http://schemas.microsoft.com/office/drawing/2017/03/chart" uri="{56B9EC1D-385E-4148-901F-78D8002777C0}">
+        <c16r3:dataDisplayOptions16>
+          <c16r3:dispNaAsBlank val="1"/>
+        </c16r3:dataDisplayOptions16>
+      </c:ext>
+    </c:extLst>
+    <c:showDLblsOverMax val="0"/>
+  </c:chart>
+  <c:spPr>
+    <a:noFill/>
+    <a:ln>
+      <a:noFill/>
+    </a:ln>
+    <a:effectLst/>
+  </c:spPr>
+  <c:txPr>
+    <a:bodyPr/>
+    <a:lstStyle/>
+    <a:p>
+      <a:pPr>
+        <a:defRPr/>
+      </a:pPr>
+      <a:endParaRPr lang="en-US"/>
+    </a:p>
+  </c:txPr>
+  <c:externalData r:id="rId3">
+    <c:autoUpdate val="0"/>
+  </c:externalData>
+</c:chartSpace>
+</file>
+
+<file path=ppt/charts/chart2.xml><?xml version="1.0" encoding="utf-8"?>
+<c:chartSpace xmlns:c="http://schemas.openxmlformats.org/drawingml/2006/chart" xmlns:a="http://schemas.openxmlformats.org/drawingml/2006/main" xmlns:r="http://schemas.openxmlformats.org/officeDocument/2006/relationships" xmlns:c16r2="http://schemas.microsoft.com/office/drawing/2015/06/chart">
+  <c:date1904 val="0"/>
+  <c:lang val="en-US"/>
+  <c:roundedCorners val="0"/>
+  <mc:AlternateContent xmlns:mc="http://schemas.openxmlformats.org/markup-compatibility/2006">
+    <mc:Choice xmlns:c14="http://schemas.microsoft.com/office/drawing/2007/8/2/chart" Requires="c14">
+      <c14:style val="102"/>
+    </mc:Choice>
+    <mc:Fallback>
+      <c:style val="2"/>
+    </mc:Fallback>
+  </mc:AlternateContent>
+  <c:chart>
+    <c:title>
+      <c:tx>
+        <c:rich>
+          <a:bodyPr rot="0" spcFirstLastPara="1" vertOverflow="ellipsis" vert="horz" wrap="square" anchor="ctr" anchorCtr="1"/>
+          <a:lstStyle/>
+          <a:p>
+            <a:pPr>
+              <a:defRPr sz="1862" b="0" i="0" u="none" strike="noStrike" kern="1200" spc="0" baseline="0">
+                <a:solidFill>
+                  <a:schemeClr val="tx1">
+                    <a:lumMod val="65000"/>
+                    <a:lumOff val="35000"/>
+                  </a:schemeClr>
+                </a:solidFill>
+                <a:latin typeface="+mn-lt"/>
+                <a:ea typeface="+mn-ea"/>
+                <a:cs typeface="+mn-cs"/>
+              </a:defRPr>
+            </a:pPr>
+            <a:r>
+              <a:rPr lang="en-IE" dirty="0"/>
+              <a:t>Data</a:t>
+            </a:r>
+            <a:r>
+              <a:rPr lang="en-IE" baseline="0" dirty="0"/>
+              <a:t> Structure </a:t>
+            </a:r>
+            <a:endParaRPr lang="en-IE" dirty="0"/>
+          </a:p>
+        </c:rich>
+      </c:tx>
+      <c:overlay val="0"/>
+      <c:spPr>
+        <a:noFill/>
+        <a:ln>
+          <a:noFill/>
+        </a:ln>
+        <a:effectLst/>
+      </c:spPr>
+      <c:txPr>
+        <a:bodyPr rot="0" spcFirstLastPara="1" vertOverflow="ellipsis" vert="horz" wrap="square" anchor="ctr" anchorCtr="1"/>
+        <a:lstStyle/>
+        <a:p>
+          <a:pPr>
+            <a:defRPr sz="1862" b="0" i="0" u="none" strike="noStrike" kern="1200" spc="0" baseline="0">
+              <a:solidFill>
+                <a:schemeClr val="tx1">
+                  <a:lumMod val="65000"/>
+                  <a:lumOff val="35000"/>
+                </a:schemeClr>
+              </a:solidFill>
+              <a:latin typeface="+mn-lt"/>
+              <a:ea typeface="+mn-ea"/>
+              <a:cs typeface="+mn-cs"/>
+            </a:defRPr>
+          </a:pPr>
+          <a:endParaRPr lang="en-US"/>
+        </a:p>
+      </c:txPr>
+    </c:title>
+    <c:autoTitleDeleted val="0"/>
+    <c:plotArea>
+      <c:layout/>
+      <c:barChart>
+        <c:barDir val="col"/>
+        <c:grouping val="clustered"/>
+        <c:varyColors val="0"/>
+        <c:ser>
+          <c:idx val="0"/>
+          <c:order val="0"/>
+          <c:tx>
+            <c:strRef>
+              <c:f>Sheet1!$B$1</c:f>
+              <c:strCache>
+                <c:ptCount val="1"/>
+                <c:pt idx="0">
+                  <c:v>List</c:v>
+                </c:pt>
+              </c:strCache>
+            </c:strRef>
+          </c:tx>
+          <c:spPr>
+            <a:solidFill>
+              <a:schemeClr val="accent1"/>
+            </a:solidFill>
+            <a:ln>
+              <a:noFill/>
+            </a:ln>
+            <a:effectLst/>
+          </c:spPr>
+          <c:invertIfNegative val="0"/>
+          <c:cat>
+            <c:strRef>
+              <c:f>Sheet1!$A$2</c:f>
+              <c:strCache>
+                <c:ptCount val="1"/>
+                <c:pt idx="0">
+                  <c:v>Data Strucutres</c:v>
+                </c:pt>
+              </c:strCache>
+            </c:strRef>
+          </c:cat>
+          <c:val>
+            <c:numRef>
+              <c:f>Sheet1!$B$2</c:f>
+              <c:numCache>
+                <c:formatCode>General</c:formatCode>
+                <c:ptCount val="1"/>
+                <c:pt idx="0">
+                  <c:v>7</c:v>
+                </c:pt>
+              </c:numCache>
+            </c:numRef>
+          </c:val>
+          <c:extLst>
+            <c:ext xmlns:c16="http://schemas.microsoft.com/office/drawing/2014/chart" uri="{C3380CC4-5D6E-409C-BE32-E72D297353CC}">
+              <c16:uniqueId val="{00000000-7A61-4781-85C5-ECE5E969938F}"/>
+            </c:ext>
+          </c:extLst>
+        </c:ser>
+        <c:ser>
+          <c:idx val="1"/>
+          <c:order val="1"/>
+          <c:tx>
+            <c:strRef>
+              <c:f>Sheet1!$C$1</c:f>
+              <c:strCache>
+                <c:ptCount val="1"/>
+                <c:pt idx="0">
+                  <c:v>Trees</c:v>
+                </c:pt>
+              </c:strCache>
+            </c:strRef>
+          </c:tx>
+          <c:spPr>
+            <a:solidFill>
+              <a:schemeClr val="accent2"/>
+            </a:solidFill>
+            <a:ln>
+              <a:noFill/>
+            </a:ln>
+            <a:effectLst/>
+          </c:spPr>
+          <c:invertIfNegative val="0"/>
+          <c:cat>
+            <c:strRef>
+              <c:f>Sheet1!$A$2</c:f>
+              <c:strCache>
+                <c:ptCount val="1"/>
+                <c:pt idx="0">
+                  <c:v>Data Strucutres</c:v>
+                </c:pt>
+              </c:strCache>
+            </c:strRef>
+          </c:cat>
+          <c:val>
+            <c:numRef>
+              <c:f>Sheet1!$C$2</c:f>
+              <c:numCache>
+                <c:formatCode>General</c:formatCode>
+                <c:ptCount val="1"/>
+                <c:pt idx="0">
+                  <c:v>9</c:v>
+                </c:pt>
+              </c:numCache>
+            </c:numRef>
+          </c:val>
+          <c:extLst>
+            <c:ext xmlns:c16="http://schemas.microsoft.com/office/drawing/2014/chart" uri="{C3380CC4-5D6E-409C-BE32-E72D297353CC}">
+              <c16:uniqueId val="{00000001-7A61-4781-85C5-ECE5E969938F}"/>
+            </c:ext>
+          </c:extLst>
+        </c:ser>
+        <c:ser>
+          <c:idx val="2"/>
+          <c:order val="2"/>
+          <c:tx>
+            <c:strRef>
+              <c:f>Sheet1!$D$1</c:f>
+              <c:strCache>
+                <c:ptCount val="1"/>
+                <c:pt idx="0">
+                  <c:v>Stacks</c:v>
+                </c:pt>
+              </c:strCache>
+            </c:strRef>
+          </c:tx>
+          <c:spPr>
+            <a:solidFill>
+              <a:schemeClr val="accent3"/>
+            </a:solidFill>
+            <a:ln>
+              <a:noFill/>
+            </a:ln>
+            <a:effectLst/>
+          </c:spPr>
+          <c:invertIfNegative val="0"/>
+          <c:cat>
+            <c:strRef>
+              <c:f>Sheet1!$A$2</c:f>
+              <c:strCache>
+                <c:ptCount val="1"/>
+                <c:pt idx="0">
+                  <c:v>Data Strucutres</c:v>
+                </c:pt>
+              </c:strCache>
+            </c:strRef>
+          </c:cat>
+          <c:val>
+            <c:numRef>
+              <c:f>Sheet1!$D$2</c:f>
+              <c:numCache>
+                <c:formatCode>General</c:formatCode>
+                <c:ptCount val="1"/>
+                <c:pt idx="0">
+                  <c:v>4</c:v>
+                </c:pt>
+              </c:numCache>
+            </c:numRef>
+          </c:val>
+          <c:extLst>
+            <c:ext xmlns:c16="http://schemas.microsoft.com/office/drawing/2014/chart" uri="{C3380CC4-5D6E-409C-BE32-E72D297353CC}">
+              <c16:uniqueId val="{00000002-7A61-4781-85C5-ECE5E969938F}"/>
+            </c:ext>
+          </c:extLst>
+        </c:ser>
+        <c:ser>
+          <c:idx val="3"/>
+          <c:order val="3"/>
+          <c:tx>
+            <c:strRef>
+              <c:f>Sheet1!$E$1</c:f>
+              <c:strCache>
+                <c:ptCount val="1"/>
+                <c:pt idx="0">
+                  <c:v>Queues</c:v>
+                </c:pt>
+              </c:strCache>
+            </c:strRef>
+          </c:tx>
+          <c:spPr>
+            <a:solidFill>
+              <a:schemeClr val="accent4"/>
+            </a:solidFill>
+            <a:ln>
+              <a:noFill/>
+            </a:ln>
+            <a:effectLst/>
+          </c:spPr>
+          <c:invertIfNegative val="0"/>
+          <c:cat>
+            <c:strRef>
+              <c:f>Sheet1!$A$2</c:f>
+              <c:strCache>
+                <c:ptCount val="1"/>
+                <c:pt idx="0">
+                  <c:v>Data Strucutres</c:v>
+                </c:pt>
+              </c:strCache>
+            </c:strRef>
+          </c:cat>
+          <c:val>
+            <c:numRef>
+              <c:f>Sheet1!$E$2</c:f>
+              <c:numCache>
+                <c:formatCode>General</c:formatCode>
+                <c:ptCount val="1"/>
+                <c:pt idx="0">
+                  <c:v>1</c:v>
+                </c:pt>
+              </c:numCache>
+            </c:numRef>
+          </c:val>
+          <c:extLst>
+            <c:ext xmlns:c16="http://schemas.microsoft.com/office/drawing/2014/chart" uri="{C3380CC4-5D6E-409C-BE32-E72D297353CC}">
+              <c16:uniqueId val="{00000003-7A61-4781-85C5-ECE5E969938F}"/>
+            </c:ext>
+          </c:extLst>
+        </c:ser>
+        <c:ser>
+          <c:idx val="4"/>
+          <c:order val="4"/>
+          <c:tx>
+            <c:strRef>
+              <c:f>Sheet1!$F$1</c:f>
+              <c:strCache>
+                <c:ptCount val="1"/>
+                <c:pt idx="0">
+                  <c:v>Arrays</c:v>
+                </c:pt>
+              </c:strCache>
+            </c:strRef>
+          </c:tx>
+          <c:spPr>
+            <a:solidFill>
+              <a:schemeClr val="accent5"/>
+            </a:solidFill>
+            <a:ln>
+              <a:noFill/>
+            </a:ln>
+            <a:effectLst/>
+          </c:spPr>
+          <c:invertIfNegative val="0"/>
+          <c:cat>
+            <c:strRef>
+              <c:f>Sheet1!$A$2</c:f>
+              <c:strCache>
+                <c:ptCount val="1"/>
+                <c:pt idx="0">
+                  <c:v>Data Strucutres</c:v>
+                </c:pt>
+              </c:strCache>
+            </c:strRef>
+          </c:cat>
+          <c:val>
+            <c:numRef>
+              <c:f>Sheet1!$F$2</c:f>
+              <c:numCache>
+                <c:formatCode>General</c:formatCode>
+                <c:ptCount val="1"/>
+                <c:pt idx="0">
+                  <c:v>17</c:v>
+                </c:pt>
+              </c:numCache>
+            </c:numRef>
+          </c:val>
+          <c:extLst>
+            <c:ext xmlns:c16="http://schemas.microsoft.com/office/drawing/2014/chart" uri="{C3380CC4-5D6E-409C-BE32-E72D297353CC}">
+              <c16:uniqueId val="{00000004-7A61-4781-85C5-ECE5E969938F}"/>
+            </c:ext>
+          </c:extLst>
+        </c:ser>
+        <c:ser>
+          <c:idx val="5"/>
+          <c:order val="5"/>
+          <c:tx>
+            <c:strRef>
+              <c:f>Sheet1!$G$1</c:f>
+              <c:strCache>
+                <c:ptCount val="1"/>
+                <c:pt idx="0">
+                  <c:v>Maps</c:v>
+                </c:pt>
+              </c:strCache>
+            </c:strRef>
+          </c:tx>
+          <c:spPr>
+            <a:solidFill>
+              <a:schemeClr val="accent6"/>
+            </a:solidFill>
+            <a:ln>
+              <a:noFill/>
+            </a:ln>
+            <a:effectLst/>
+          </c:spPr>
+          <c:invertIfNegative val="0"/>
+          <c:cat>
+            <c:strRef>
+              <c:f>Sheet1!$A$2</c:f>
+              <c:strCache>
+                <c:ptCount val="1"/>
+                <c:pt idx="0">
+                  <c:v>Data Strucutres</c:v>
+                </c:pt>
+              </c:strCache>
+            </c:strRef>
+          </c:cat>
+          <c:val>
+            <c:numRef>
+              <c:f>Sheet1!$G$2</c:f>
+              <c:numCache>
+                <c:formatCode>General</c:formatCode>
+                <c:ptCount val="1"/>
+                <c:pt idx="0">
+                  <c:v>3</c:v>
+                </c:pt>
+              </c:numCache>
+            </c:numRef>
+          </c:val>
+          <c:extLst>
+            <c:ext xmlns:c16="http://schemas.microsoft.com/office/drawing/2014/chart" uri="{C3380CC4-5D6E-409C-BE32-E72D297353CC}">
+              <c16:uniqueId val="{00000005-7A61-4781-85C5-ECE5E969938F}"/>
+            </c:ext>
+          </c:extLst>
+        </c:ser>
+        <c:ser>
+          <c:idx val="6"/>
+          <c:order val="6"/>
+          <c:tx>
+            <c:strRef>
+              <c:f>Sheet1!$H$1</c:f>
+              <c:strCache>
+                <c:ptCount val="1"/>
+                <c:pt idx="0">
+                  <c:v>Strings</c:v>
+                </c:pt>
+              </c:strCache>
+            </c:strRef>
+          </c:tx>
+          <c:spPr>
+            <a:solidFill>
+              <a:schemeClr val="accent1">
+                <a:lumMod val="60000"/>
+              </a:schemeClr>
+            </a:solidFill>
+            <a:ln>
+              <a:noFill/>
+            </a:ln>
+            <a:effectLst/>
+          </c:spPr>
+          <c:invertIfNegative val="0"/>
+          <c:cat>
+            <c:strRef>
+              <c:f>Sheet1!$A$2</c:f>
+              <c:strCache>
+                <c:ptCount val="1"/>
+                <c:pt idx="0">
+                  <c:v>Data Strucutres</c:v>
+                </c:pt>
+              </c:strCache>
+            </c:strRef>
+          </c:cat>
+          <c:val>
+            <c:numRef>
+              <c:f>Sheet1!$H$2</c:f>
+              <c:numCache>
+                <c:formatCode>General</c:formatCode>
+                <c:ptCount val="1"/>
+                <c:pt idx="0">
+                  <c:v>3</c:v>
+                </c:pt>
+              </c:numCache>
+            </c:numRef>
+          </c:val>
+          <c:extLst>
+            <c:ext xmlns:c16="http://schemas.microsoft.com/office/drawing/2014/chart" uri="{C3380CC4-5D6E-409C-BE32-E72D297353CC}">
+              <c16:uniqueId val="{00000006-7A61-4781-85C5-ECE5E969938F}"/>
+            </c:ext>
+          </c:extLst>
+        </c:ser>
+        <c:dLbls>
+          <c:showLegendKey val="0"/>
+          <c:showVal val="0"/>
+          <c:showCatName val="0"/>
+          <c:showSerName val="0"/>
+          <c:showPercent val="0"/>
+          <c:showBubbleSize val="0"/>
+        </c:dLbls>
+        <c:gapWidth val="219"/>
+        <c:overlap val="-27"/>
+        <c:axId val="428634968"/>
+        <c:axId val="428636280"/>
+      </c:barChart>
+      <c:catAx>
+        <c:axId val="428634968"/>
+        <c:scaling>
+          <c:orientation val="minMax"/>
+        </c:scaling>
+        <c:delete val="0"/>
+        <c:axPos val="b"/>
+        <c:numFmt formatCode="General" sourceLinked="1"/>
+        <c:majorTickMark val="none"/>
+        <c:minorTickMark val="none"/>
+        <c:tickLblPos val="nextTo"/>
+        <c:spPr>
+          <a:noFill/>
+          <a:ln w="9525" cap="flat" cmpd="sng" algn="ctr">
+            <a:solidFill>
+              <a:schemeClr val="tx1">
+                <a:lumMod val="15000"/>
+                <a:lumOff val="85000"/>
+              </a:schemeClr>
+            </a:solidFill>
+            <a:round/>
+          </a:ln>
+          <a:effectLst/>
+        </c:spPr>
+        <c:txPr>
+          <a:bodyPr rot="-60000000" spcFirstLastPara="1" vertOverflow="ellipsis" vert="horz" wrap="square" anchor="ctr" anchorCtr="1"/>
+          <a:lstStyle/>
+          <a:p>
+            <a:pPr>
+              <a:defRPr sz="1197" b="0" i="0" u="none" strike="noStrike" kern="1200" baseline="0">
+                <a:solidFill>
+                  <a:schemeClr val="tx1">
+                    <a:lumMod val="65000"/>
+                    <a:lumOff val="35000"/>
+                  </a:schemeClr>
+                </a:solidFill>
+                <a:latin typeface="+mn-lt"/>
+                <a:ea typeface="+mn-ea"/>
+                <a:cs typeface="+mn-cs"/>
+              </a:defRPr>
+            </a:pPr>
+            <a:endParaRPr lang="en-US"/>
+          </a:p>
+        </c:txPr>
+        <c:crossAx val="428636280"/>
+        <c:crosses val="autoZero"/>
+        <c:auto val="1"/>
+        <c:lblAlgn val="ctr"/>
+        <c:lblOffset val="100"/>
+        <c:noMultiLvlLbl val="0"/>
+      </c:catAx>
+      <c:valAx>
+        <c:axId val="428636280"/>
+        <c:scaling>
+          <c:orientation val="minMax"/>
+        </c:scaling>
+        <c:delete val="0"/>
+        <c:axPos val="l"/>
+        <c:majorGridlines>
+          <c:spPr>
+            <a:ln w="9525" cap="flat" cmpd="sng" algn="ctr">
+              <a:solidFill>
+                <a:schemeClr val="tx1">
+                  <a:lumMod val="15000"/>
+                  <a:lumOff val="85000"/>
+                </a:schemeClr>
+              </a:solidFill>
+              <a:round/>
+            </a:ln>
+            <a:effectLst/>
+          </c:spPr>
+        </c:majorGridlines>
+        <c:title>
+          <c:tx>
+            <c:rich>
+              <a:bodyPr rot="-5400000" spcFirstLastPara="1" vertOverflow="ellipsis" vert="horz" wrap="square" anchor="ctr" anchorCtr="1"/>
+              <a:lstStyle/>
+              <a:p>
+                <a:pPr>
+                  <a:defRPr sz="1330" b="0" i="0" u="none" strike="noStrike" kern="1200" baseline="0">
+                    <a:solidFill>
+                      <a:schemeClr val="tx1">
+                        <a:lumMod val="65000"/>
+                        <a:lumOff val="35000"/>
+                      </a:schemeClr>
+                    </a:solidFill>
+                    <a:latin typeface="+mn-lt"/>
+                    <a:ea typeface="+mn-ea"/>
+                    <a:cs typeface="+mn-cs"/>
+                  </a:defRPr>
+                </a:pPr>
+                <a:r>
+                  <a:rPr lang="en-IE" dirty="0"/>
+                  <a:t>Frequency</a:t>
+                </a:r>
+              </a:p>
+            </c:rich>
+          </c:tx>
+          <c:overlay val="0"/>
+          <c:spPr>
+            <a:noFill/>
+            <a:ln>
+              <a:noFill/>
+            </a:ln>
+            <a:effectLst/>
+          </c:spPr>
+          <c:txPr>
+            <a:bodyPr rot="-5400000" spcFirstLastPara="1" vertOverflow="ellipsis" vert="horz" wrap="square" anchor="ctr" anchorCtr="1"/>
+            <a:lstStyle/>
+            <a:p>
+              <a:pPr>
+                <a:defRPr sz="1330" b="0" i="0" u="none" strike="noStrike" kern="1200" baseline="0">
+                  <a:solidFill>
+                    <a:schemeClr val="tx1">
+                      <a:lumMod val="65000"/>
+                      <a:lumOff val="35000"/>
+                    </a:schemeClr>
+                  </a:solidFill>
+                  <a:latin typeface="+mn-lt"/>
+                  <a:ea typeface="+mn-ea"/>
+                  <a:cs typeface="+mn-cs"/>
+                </a:defRPr>
+              </a:pPr>
+              <a:endParaRPr lang="en-US"/>
+            </a:p>
+          </c:txPr>
+        </c:title>
+        <c:numFmt formatCode="General" sourceLinked="1"/>
+        <c:majorTickMark val="none"/>
+        <c:minorTickMark val="none"/>
+        <c:tickLblPos val="nextTo"/>
+        <c:spPr>
+          <a:noFill/>
+          <a:ln>
+            <a:noFill/>
+          </a:ln>
+          <a:effectLst/>
+        </c:spPr>
+        <c:txPr>
+          <a:bodyPr rot="-60000000" spcFirstLastPara="1" vertOverflow="ellipsis" vert="horz" wrap="square" anchor="ctr" anchorCtr="1"/>
+          <a:lstStyle/>
+          <a:p>
+            <a:pPr>
+              <a:defRPr sz="1197" b="0" i="0" u="none" strike="noStrike" kern="1200" baseline="0">
+                <a:solidFill>
+                  <a:schemeClr val="tx1">
+                    <a:lumMod val="65000"/>
+                    <a:lumOff val="35000"/>
+                  </a:schemeClr>
+                </a:solidFill>
+                <a:latin typeface="+mn-lt"/>
+                <a:ea typeface="+mn-ea"/>
+                <a:cs typeface="+mn-cs"/>
+              </a:defRPr>
+            </a:pPr>
+            <a:endParaRPr lang="en-US"/>
+          </a:p>
+        </c:txPr>
+        <c:crossAx val="428634968"/>
+        <c:crosses val="autoZero"/>
+        <c:crossBetween val="between"/>
+      </c:valAx>
+      <c:spPr>
+        <a:noFill/>
+        <a:ln>
+          <a:noFill/>
+        </a:ln>
+        <a:effectLst/>
+      </c:spPr>
+    </c:plotArea>
+    <c:legend>
+      <c:legendPos val="b"/>
+      <c:overlay val="0"/>
+      <c:spPr>
+        <a:noFill/>
+        <a:ln>
+          <a:noFill/>
+        </a:ln>
+        <a:effectLst/>
+      </c:spPr>
+      <c:txPr>
+        <a:bodyPr rot="0" spcFirstLastPara="1" vertOverflow="ellipsis" vert="horz" wrap="square" anchor="ctr" anchorCtr="1"/>
+        <a:lstStyle/>
+        <a:p>
+          <a:pPr>
+            <a:defRPr sz="1197" b="0" i="0" u="none" strike="noStrike" kern="1200" baseline="0">
+              <a:solidFill>
+                <a:schemeClr val="tx1">
+                  <a:lumMod val="65000"/>
+                  <a:lumOff val="35000"/>
+                </a:schemeClr>
+              </a:solidFill>
+              <a:latin typeface="+mn-lt"/>
+              <a:ea typeface="+mn-ea"/>
+              <a:cs typeface="+mn-cs"/>
+            </a:defRPr>
+          </a:pPr>
+          <a:endParaRPr lang="en-US"/>
+        </a:p>
+      </c:txPr>
+    </c:legend>
+    <c:plotVisOnly val="1"/>
+    <c:dispBlanksAs val="gap"/>
+    <c:extLst>
+      <c:ext xmlns:c16r3="http://schemas.microsoft.com/office/drawing/2017/03/chart" uri="{56B9EC1D-385E-4148-901F-78D8002777C0}">
+        <c16r3:dataDisplayOptions16>
+          <c16r3:dispNaAsBlank val="1"/>
+        </c16r3:dataDisplayOptions16>
+      </c:ext>
+    </c:extLst>
     <c:showDLblsOverMax val="0"/>
   </c:chart>
   <c:spPr>
@@ -688,33 +1599,113 @@
 </file>
 
 <file path=ppt/charts/colors1.xml><?xml version="1.0" encoding="utf-8"?>
-<cs:colorStyle xmlns:cs="http://schemas.microsoft.com/office/drawing/2012/chartStyle" xmlns:a="http://schemas.openxmlformats.org/drawingml/2006/main" meth="withinLinear" id="14">
+<cs:colorStyle xmlns:cs="http://schemas.microsoft.com/office/drawing/2012/chartStyle" xmlns:a="http://schemas.openxmlformats.org/drawingml/2006/main" meth="cycle" id="10">
   <a:schemeClr val="accent1"/>
+  <a:schemeClr val="accent2"/>
+  <a:schemeClr val="accent3"/>
+  <a:schemeClr val="accent4"/>
+  <a:schemeClr val="accent5"/>
+  <a:schemeClr val="accent6"/>
+  <cs:variation/>
+  <cs:variation>
+    <a:lumMod val="60000"/>
+  </cs:variation>
+  <cs:variation>
+    <a:lumMod val="80000"/>
+    <a:lumOff val="20000"/>
+  </cs:variation>
+  <cs:variation>
+    <a:lumMod val="80000"/>
+  </cs:variation>
+  <cs:variation>
+    <a:lumMod val="60000"/>
+    <a:lumOff val="40000"/>
+  </cs:variation>
+  <cs:variation>
+    <a:lumMod val="50000"/>
+  </cs:variation>
+  <cs:variation>
+    <a:lumMod val="70000"/>
+    <a:lumOff val="30000"/>
+  </cs:variation>
+  <cs:variation>
+    <a:lumMod val="70000"/>
+  </cs:variation>
+  <cs:variation>
+    <a:lumMod val="50000"/>
+    <a:lumOff val="50000"/>
+  </cs:variation>
+</cs:colorStyle>
+</file>
+
+<file path=ppt/charts/colors2.xml><?xml version="1.0" encoding="utf-8"?>
+<cs:colorStyle xmlns:cs="http://schemas.microsoft.com/office/drawing/2012/chartStyle" xmlns:a="http://schemas.openxmlformats.org/drawingml/2006/main" meth="cycle" id="10">
+  <a:schemeClr val="accent1"/>
+  <a:schemeClr val="accent2"/>
+  <a:schemeClr val="accent3"/>
+  <a:schemeClr val="accent4"/>
+  <a:schemeClr val="accent5"/>
+  <a:schemeClr val="accent6"/>
+  <cs:variation/>
+  <cs:variation>
+    <a:lumMod val="60000"/>
+  </cs:variation>
+  <cs:variation>
+    <a:lumMod val="80000"/>
+    <a:lumOff val="20000"/>
+  </cs:variation>
+  <cs:variation>
+    <a:lumMod val="80000"/>
+  </cs:variation>
+  <cs:variation>
+    <a:lumMod val="60000"/>
+    <a:lumOff val="40000"/>
+  </cs:variation>
+  <cs:variation>
+    <a:lumMod val="50000"/>
+  </cs:variation>
+  <cs:variation>
+    <a:lumMod val="70000"/>
+    <a:lumOff val="30000"/>
+  </cs:variation>
+  <cs:variation>
+    <a:lumMod val="70000"/>
+  </cs:variation>
+  <cs:variation>
+    <a:lumMod val="50000"/>
+    <a:lumOff val="50000"/>
+  </cs:variation>
 </cs:colorStyle>
 </file>
 
 <file path=ppt/charts/style1.xml><?xml version="1.0" encoding="utf-8"?>
-<cs:chartStyle xmlns:cs="http://schemas.microsoft.com/office/drawing/2012/chartStyle" xmlns:a="http://schemas.openxmlformats.org/drawingml/2006/main" id="207">
+<cs:chartStyle xmlns:cs="http://schemas.microsoft.com/office/drawing/2012/chartStyle" xmlns:a="http://schemas.openxmlformats.org/drawingml/2006/main" id="201">
   <cs:axisTitle>
     <cs:lnRef idx="0"/>
     <cs:fillRef idx="0"/>
     <cs:effectRef idx="0"/>
     <cs:fontRef idx="minor">
-      <a:schemeClr val="tx2"/>
+      <a:schemeClr val="tx1">
+        <a:lumMod val="65000"/>
+        <a:lumOff val="35000"/>
+      </a:schemeClr>
     </cs:fontRef>
-    <cs:defRPr sz="1197" b="1" kern="1200"/>
+    <cs:defRPr sz="1330" kern="1200"/>
   </cs:axisTitle>
   <cs:categoryAxis>
     <cs:lnRef idx="0"/>
     <cs:fillRef idx="0"/>
     <cs:effectRef idx="0"/>
     <cs:fontRef idx="minor">
-      <a:schemeClr val="tx2"/>
+      <a:schemeClr val="tx1">
+        <a:lumMod val="65000"/>
+        <a:lumOff val="35000"/>
+      </a:schemeClr>
     </cs:fontRef>
     <cs:spPr>
       <a:ln w="9525" cap="flat" cmpd="sng" algn="ctr">
         <a:solidFill>
-          <a:schemeClr val="tx2">
+          <a:schemeClr val="tx1">
             <a:lumMod val="15000"/>
             <a:lumOff val="85000"/>
           </a:schemeClr>
@@ -729,7 +1720,7 @@
     <cs:fillRef idx="0"/>
     <cs:effectRef idx="0"/>
     <cs:fontRef idx="minor">
-      <a:schemeClr val="tx2"/>
+      <a:schemeClr val="tx1"/>
     </cs:fontRef>
     <cs:spPr>
       <a:solidFill>
@@ -737,7 +1728,7 @@
       </a:solidFill>
       <a:ln w="9525" cap="flat" cmpd="sng" algn="ctr">
         <a:solidFill>
-          <a:schemeClr val="tx2">
+          <a:schemeClr val="tx1">
             <a:lumMod val="15000"/>
             <a:lumOff val="85000"/>
           </a:schemeClr>
@@ -745,14 +1736,17 @@
         <a:round/>
       </a:ln>
     </cs:spPr>
-    <cs:defRPr sz="1197" kern="1200"/>
+    <cs:defRPr sz="1330" kern="1200"/>
   </cs:chartArea>
   <cs:dataLabel>
     <cs:lnRef idx="0"/>
     <cs:fillRef idx="0"/>
     <cs:effectRef idx="0"/>
     <cs:fontRef idx="minor">
-      <a:schemeClr val="tx2"/>
+      <a:schemeClr val="tx1">
+        <a:lumMod val="75000"/>
+        <a:lumOff val="25000"/>
+      </a:schemeClr>
     </cs:fontRef>
     <cs:defRPr sz="1197" kern="1200"/>
   </cs:dataLabel>
@@ -761,8 +1755,9 @@
     <cs:fillRef idx="0"/>
     <cs:effectRef idx="0"/>
     <cs:fontRef idx="minor">
-      <a:schemeClr val="dk2">
-        <a:lumMod val="75000"/>
+      <a:schemeClr val="dk1">
+        <a:lumMod val="65000"/>
+        <a:lumOff val="35000"/>
       </a:schemeClr>
     </cs:fontRef>
     <cs:spPr>
@@ -785,35 +1780,35 @@
   </cs:dataLabelCallout>
   <cs:dataPoint>
     <cs:lnRef idx="0"/>
-    <cs:fillRef idx="3">
+    <cs:fillRef idx="1">
       <cs:styleClr val="auto"/>
     </cs:fillRef>
-    <cs:effectRef idx="2"/>
+    <cs:effectRef idx="0"/>
     <cs:fontRef idx="minor">
-      <a:schemeClr val="tx2"/>
+      <a:schemeClr val="tx1"/>
     </cs:fontRef>
   </cs:dataPoint>
   <cs:dataPoint3D>
     <cs:lnRef idx="0"/>
-    <cs:fillRef idx="3">
+    <cs:fillRef idx="1">
       <cs:styleClr val="auto"/>
     </cs:fillRef>
-    <cs:effectRef idx="2"/>
+    <cs:effectRef idx="0"/>
     <cs:fontRef idx="minor">
-      <a:schemeClr val="tx2"/>
+      <a:schemeClr val="tx1"/>
     </cs:fontRef>
   </cs:dataPoint3D>
   <cs:dataPointLine>
     <cs:lnRef idx="0">
       <cs:styleClr val="auto"/>
     </cs:lnRef>
-    <cs:fillRef idx="3"/>
-    <cs:effectRef idx="2"/>
+    <cs:fillRef idx="1"/>
+    <cs:effectRef idx="0"/>
     <cs:fontRef idx="minor">
-      <a:schemeClr val="tx2"/>
+      <a:schemeClr val="tx1"/>
     </cs:fontRef>
     <cs:spPr>
-      <a:ln w="31750" cap="rnd">
+      <a:ln w="28575" cap="rnd">
         <a:solidFill>
           <a:schemeClr val="phClr"/>
         </a:solidFill>
@@ -822,32 +1817,33 @@
     </cs:spPr>
   </cs:dataPointLine>
   <cs:dataPointMarker>
-    <cs:lnRef idx="0"/>
-    <cs:fillRef idx="3">
+    <cs:lnRef idx="0">
+      <cs:styleClr val="auto"/>
+    </cs:lnRef>
+    <cs:fillRef idx="1">
       <cs:styleClr val="auto"/>
     </cs:fillRef>
-    <cs:effectRef idx="2"/>
+    <cs:effectRef idx="0"/>
     <cs:fontRef idx="minor">
-      <a:schemeClr val="tx2"/>
+      <a:schemeClr val="tx1"/>
     </cs:fontRef>
     <cs:spPr>
-      <a:ln w="12700">
+      <a:ln w="9525">
         <a:solidFill>
-          <a:schemeClr val="lt2"/>
+          <a:schemeClr val="phClr"/>
         </a:solidFill>
-        <a:round/>
       </a:ln>
     </cs:spPr>
   </cs:dataPointMarker>
-  <cs:dataPointMarkerLayout symbol="circle" size="6"/>
+  <cs:dataPointMarkerLayout symbol="circle" size="5"/>
   <cs:dataPointWireframe>
     <cs:lnRef idx="0">
       <cs:styleClr val="auto"/>
     </cs:lnRef>
-    <cs:fillRef idx="3"/>
-    <cs:effectRef idx="2"/>
+    <cs:fillRef idx="1"/>
+    <cs:effectRef idx="0"/>
     <cs:fontRef idx="minor">
-      <a:schemeClr val="tx2"/>
+      <a:schemeClr val="tx1"/>
     </cs:fontRef>
     <cs:spPr>
       <a:ln w="9525" cap="rnd">
@@ -863,16 +1859,21 @@
     <cs:fillRef idx="0"/>
     <cs:effectRef idx="0"/>
     <cs:fontRef idx="minor">
-      <a:schemeClr val="tx2"/>
+      <a:schemeClr val="tx1">
+        <a:lumMod val="65000"/>
+        <a:lumOff val="35000"/>
+      </a:schemeClr>
     </cs:fontRef>
     <cs:spPr>
-      <a:ln w="9525">
+      <a:noFill/>
+      <a:ln w="9525" cap="flat" cmpd="sng" algn="ctr">
         <a:solidFill>
-          <a:schemeClr val="tx2">
+          <a:schemeClr val="tx1">
             <a:lumMod val="15000"/>
             <a:lumOff val="85000"/>
           </a:schemeClr>
         </a:solidFill>
+        <a:round/>
       </a:ln>
     </cs:spPr>
     <cs:defRPr sz="1197" kern="1200"/>
@@ -906,17 +1907,17 @@
     <cs:fillRef idx="0"/>
     <cs:effectRef idx="0"/>
     <cs:fontRef idx="minor">
-      <a:schemeClr val="tx2"/>
+      <a:schemeClr val="tx1"/>
     </cs:fontRef>
     <cs:spPr>
-      <a:ln w="9525">
+      <a:ln w="9525" cap="flat" cmpd="sng" algn="ctr">
         <a:solidFill>
-          <a:schemeClr val="tx2">
-            <a:lumMod val="60000"/>
-            <a:lumOff val="40000"/>
+          <a:schemeClr val="tx1">
+            <a:lumMod val="35000"/>
+            <a:lumOff val="65000"/>
           </a:schemeClr>
         </a:solidFill>
-        <a:prstDash val="dash"/>
+        <a:round/>
       </a:ln>
     </cs:spPr>
   </cs:dropLine>
@@ -925,14 +1926,14 @@
     <cs:fillRef idx="0"/>
     <cs:effectRef idx="0"/>
     <cs:fontRef idx="minor">
-      <a:schemeClr val="tx2"/>
+      <a:schemeClr val="tx1"/>
     </cs:fontRef>
     <cs:spPr>
-      <a:ln w="9525">
+      <a:ln w="9525" cap="flat" cmpd="sng" algn="ctr">
         <a:solidFill>
-          <a:schemeClr val="tx2">
-            <a:lumMod val="75000"/>
-            <a:lumOff val="25000"/>
+          <a:schemeClr val="tx1">
+            <a:lumMod val="65000"/>
+            <a:lumOff val="35000"/>
           </a:schemeClr>
         </a:solidFill>
         <a:round/>
@@ -944,20 +1945,26 @@
     <cs:fillRef idx="0"/>
     <cs:effectRef idx="0"/>
     <cs:fontRef idx="minor">
-      <a:schemeClr val="tx2"/>
+      <a:schemeClr val="tx1"/>
     </cs:fontRef>
+    <cs:spPr>
+      <a:noFill/>
+      <a:ln>
+        <a:noFill/>
+      </a:ln>
+    </cs:spPr>
   </cs:floor>
   <cs:gridlineMajor>
     <cs:lnRef idx="0"/>
     <cs:fillRef idx="0"/>
     <cs:effectRef idx="0"/>
     <cs:fontRef idx="minor">
-      <a:schemeClr val="tx2"/>
+      <a:schemeClr val="tx1"/>
     </cs:fontRef>
     <cs:spPr>
       <a:ln w="9525" cap="flat" cmpd="sng" algn="ctr">
         <a:solidFill>
-          <a:schemeClr val="tx2">
+          <a:schemeClr val="tx1">
             <a:lumMod val="15000"/>
             <a:lumOff val="85000"/>
           </a:schemeClr>
@@ -971,16 +1978,17 @@
     <cs:fillRef idx="0"/>
     <cs:effectRef idx="0"/>
     <cs:fontRef idx="minor">
-      <a:schemeClr val="tx2"/>
+      <a:schemeClr val="tx1"/>
     </cs:fontRef>
     <cs:spPr>
-      <a:ln>
+      <a:ln w="9525" cap="flat" cmpd="sng" algn="ctr">
         <a:solidFill>
-          <a:schemeClr val="tx2">
+          <a:schemeClr val="tx1">
             <a:lumMod val="5000"/>
             <a:lumOff val="95000"/>
           </a:schemeClr>
         </a:solidFill>
+        <a:round/>
       </a:ln>
     </cs:spPr>
   </cs:gridlineMinor>
@@ -989,17 +1997,17 @@
     <cs:fillRef idx="0"/>
     <cs:effectRef idx="0"/>
     <cs:fontRef idx="minor">
-      <a:schemeClr val="tx2"/>
+      <a:schemeClr val="tx1"/>
     </cs:fontRef>
     <cs:spPr>
-      <a:ln w="9525">
+      <a:ln w="9525" cap="flat" cmpd="sng" algn="ctr">
         <a:solidFill>
-          <a:schemeClr val="tx2">
-            <a:lumMod val="60000"/>
-            <a:lumOff val="40000"/>
+          <a:schemeClr val="tx1">
+            <a:lumMod val="75000"/>
+            <a:lumOff val="25000"/>
           </a:schemeClr>
         </a:solidFill>
-        <a:prstDash val="dash"/>
+        <a:round/>
       </a:ln>
     </cs:spPr>
   </cs:hiLoLine>
@@ -1008,16 +2016,17 @@
     <cs:fillRef idx="0"/>
     <cs:effectRef idx="0"/>
     <cs:fontRef idx="minor">
-      <a:schemeClr val="tx2"/>
+      <a:schemeClr val="tx1"/>
     </cs:fontRef>
     <cs:spPr>
-      <a:ln w="9525">
+      <a:ln w="9525" cap="flat" cmpd="sng" algn="ctr">
         <a:solidFill>
-          <a:schemeClr val="tx2">
+          <a:schemeClr val="tx1">
             <a:lumMod val="35000"/>
             <a:lumOff val="65000"/>
           </a:schemeClr>
         </a:solidFill>
+        <a:round/>
       </a:ln>
     </cs:spPr>
   </cs:leaderLine>
@@ -1026,24 +2035,27 @@
     <cs:fillRef idx="0"/>
     <cs:effectRef idx="0"/>
     <cs:fontRef idx="minor">
-      <a:schemeClr val="tx2"/>
+      <a:schemeClr val="tx1">
+        <a:lumMod val="65000"/>
+        <a:lumOff val="35000"/>
+      </a:schemeClr>
     </cs:fontRef>
     <cs:defRPr sz="1197" kern="1200"/>
   </cs:legend>
-  <cs:plotArea>
+  <cs:plotArea mods="allowNoFillOverride allowNoLineOverride">
     <cs:lnRef idx="0"/>
     <cs:fillRef idx="0"/>
     <cs:effectRef idx="0"/>
     <cs:fontRef idx="minor">
-      <a:schemeClr val="tx2"/>
+      <a:schemeClr val="tx1"/>
     </cs:fontRef>
   </cs:plotArea>
-  <cs:plotArea3D>
+  <cs:plotArea3D mods="allowNoFillOverride allowNoLineOverride">
     <cs:lnRef idx="0"/>
     <cs:fillRef idx="0"/>
     <cs:effectRef idx="0"/>
     <cs:fontRef idx="minor">
-      <a:schemeClr val="tx2"/>
+      <a:schemeClr val="tx1"/>
     </cs:fontRef>
   </cs:plotArea3D>
   <cs:seriesAxis>
@@ -1051,19 +2063,11 @@
     <cs:fillRef idx="0"/>
     <cs:effectRef idx="0"/>
     <cs:fontRef idx="minor">
-      <a:schemeClr val="tx2"/>
+      <a:schemeClr val="tx1">
+        <a:lumMod val="65000"/>
+        <a:lumOff val="35000"/>
+      </a:schemeClr>
     </cs:fontRef>
-    <cs:spPr>
-      <a:ln w="9525" cap="flat" cmpd="sng" algn="ctr">
-        <a:solidFill>
-          <a:schemeClr val="tx2">
-            <a:lumMod val="15000"/>
-            <a:lumOff val="85000"/>
-          </a:schemeClr>
-        </a:solidFill>
-        <a:round/>
-      </a:ln>
-    </cs:spPr>
     <cs:defRPr sz="1197" kern="1200"/>
   </cs:seriesAxis>
   <cs:seriesLine>
@@ -1071,17 +2075,17 @@
     <cs:fillRef idx="0"/>
     <cs:effectRef idx="0"/>
     <cs:fontRef idx="minor">
-      <a:schemeClr val="tx2"/>
+      <a:schemeClr val="tx1"/>
     </cs:fontRef>
     <cs:spPr>
-      <a:ln w="9525">
+      <a:ln w="9525" cap="flat" cmpd="sng" algn="ctr">
         <a:solidFill>
-          <a:schemeClr val="tx2">
-            <a:lumMod val="60000"/>
-            <a:lumOff val="40000"/>
+          <a:schemeClr val="tx1">
+            <a:lumMod val="35000"/>
+            <a:lumOff val="65000"/>
           </a:schemeClr>
         </a:solidFill>
-        <a:prstDash val="dash"/>
+        <a:round/>
       </a:ln>
     </cs:spPr>
   </cs:seriesLine>
@@ -1090,9 +2094,12 @@
     <cs:fillRef idx="0"/>
     <cs:effectRef idx="0"/>
     <cs:fontRef idx="minor">
-      <a:schemeClr val="tx2"/>
+      <a:schemeClr val="tx1">
+        <a:lumMod val="65000"/>
+        <a:lumOff val="35000"/>
+      </a:schemeClr>
     </cs:fontRef>
-    <cs:defRPr sz="2128" b="1" kern="1200"/>
+    <cs:defRPr sz="1862" b="0" kern="1200" spc="0" baseline="0"/>
   </cs:title>
   <cs:trendline>
     <cs:lnRef idx="0">
@@ -1101,14 +2108,14 @@
     <cs:fillRef idx="0"/>
     <cs:effectRef idx="0"/>
     <cs:fontRef idx="minor">
-      <a:schemeClr val="tx2"/>
+      <a:schemeClr val="tx1"/>
     </cs:fontRef>
     <cs:spPr>
       <a:ln w="19050" cap="rnd">
         <a:solidFill>
           <a:schemeClr val="phClr"/>
         </a:solidFill>
-        <a:prstDash val="sysDash"/>
+        <a:prstDash val="sysDot"/>
       </a:ln>
     </cs:spPr>
   </cs:trendline>
@@ -1117,7 +2124,10 @@
     <cs:fillRef idx="0"/>
     <cs:effectRef idx="0"/>
     <cs:fontRef idx="minor">
-      <a:schemeClr val="tx2"/>
+      <a:schemeClr val="tx1">
+        <a:lumMod val="65000"/>
+        <a:lumOff val="35000"/>
+      </a:schemeClr>
     </cs:fontRef>
     <cs:defRPr sz="1197" kern="1200"/>
   </cs:trendlineLabel>
@@ -1126,7 +2136,7 @@
     <cs:fillRef idx="0"/>
     <cs:effectRef idx="0"/>
     <cs:fontRef idx="minor">
-      <a:schemeClr val="tx2"/>
+      <a:schemeClr val="dk1"/>
     </cs:fontRef>
     <cs:spPr>
       <a:solidFill>
@@ -1147,7 +2157,10 @@
     <cs:fillRef idx="0"/>
     <cs:effectRef idx="0"/>
     <cs:fontRef idx="minor">
-      <a:schemeClr val="tx2"/>
+      <a:schemeClr val="tx1">
+        <a:lumMod val="65000"/>
+        <a:lumOff val="35000"/>
+      </a:schemeClr>
     </cs:fontRef>
     <cs:defRPr sz="1197" kern="1200"/>
   </cs:valueAxis>
@@ -1156,8 +2169,517 @@
     <cs:fillRef idx="0"/>
     <cs:effectRef idx="0"/>
     <cs:fontRef idx="minor">
-      <a:schemeClr val="tx2"/>
+      <a:schemeClr val="tx1"/>
     </cs:fontRef>
+    <cs:spPr>
+      <a:noFill/>
+      <a:ln>
+        <a:noFill/>
+      </a:ln>
+    </cs:spPr>
+  </cs:wall>
+</cs:chartStyle>
+</file>
+
+<file path=ppt/charts/style2.xml><?xml version="1.0" encoding="utf-8"?>
+<cs:chartStyle xmlns:cs="http://schemas.microsoft.com/office/drawing/2012/chartStyle" xmlns:a="http://schemas.openxmlformats.org/drawingml/2006/main" id="201">
+  <cs:axisTitle>
+    <cs:lnRef idx="0"/>
+    <cs:fillRef idx="0"/>
+    <cs:effectRef idx="0"/>
+    <cs:fontRef idx="minor">
+      <a:schemeClr val="tx1">
+        <a:lumMod val="65000"/>
+        <a:lumOff val="35000"/>
+      </a:schemeClr>
+    </cs:fontRef>
+    <cs:defRPr sz="1330" kern="1200"/>
+  </cs:axisTitle>
+  <cs:categoryAxis>
+    <cs:lnRef idx="0"/>
+    <cs:fillRef idx="0"/>
+    <cs:effectRef idx="0"/>
+    <cs:fontRef idx="minor">
+      <a:schemeClr val="tx1">
+        <a:lumMod val="65000"/>
+        <a:lumOff val="35000"/>
+      </a:schemeClr>
+    </cs:fontRef>
+    <cs:spPr>
+      <a:ln w="9525" cap="flat" cmpd="sng" algn="ctr">
+        <a:solidFill>
+          <a:schemeClr val="tx1">
+            <a:lumMod val="15000"/>
+            <a:lumOff val="85000"/>
+          </a:schemeClr>
+        </a:solidFill>
+        <a:round/>
+      </a:ln>
+    </cs:spPr>
+    <cs:defRPr sz="1197" kern="1200"/>
+  </cs:categoryAxis>
+  <cs:chartArea mods="allowNoFillOverride allowNoLineOverride">
+    <cs:lnRef idx="0"/>
+    <cs:fillRef idx="0"/>
+    <cs:effectRef idx="0"/>
+    <cs:fontRef idx="minor">
+      <a:schemeClr val="tx1"/>
+    </cs:fontRef>
+    <cs:spPr>
+      <a:solidFill>
+        <a:schemeClr val="bg1"/>
+      </a:solidFill>
+      <a:ln w="9525" cap="flat" cmpd="sng" algn="ctr">
+        <a:solidFill>
+          <a:schemeClr val="tx1">
+            <a:lumMod val="15000"/>
+            <a:lumOff val="85000"/>
+          </a:schemeClr>
+        </a:solidFill>
+        <a:round/>
+      </a:ln>
+    </cs:spPr>
+    <cs:defRPr sz="1330" kern="1200"/>
+  </cs:chartArea>
+  <cs:dataLabel>
+    <cs:lnRef idx="0"/>
+    <cs:fillRef idx="0"/>
+    <cs:effectRef idx="0"/>
+    <cs:fontRef idx="minor">
+      <a:schemeClr val="tx1">
+        <a:lumMod val="75000"/>
+        <a:lumOff val="25000"/>
+      </a:schemeClr>
+    </cs:fontRef>
+    <cs:defRPr sz="1197" kern="1200"/>
+  </cs:dataLabel>
+  <cs:dataLabelCallout>
+    <cs:lnRef idx="0"/>
+    <cs:fillRef idx="0"/>
+    <cs:effectRef idx="0"/>
+    <cs:fontRef idx="minor">
+      <a:schemeClr val="dk1">
+        <a:lumMod val="65000"/>
+        <a:lumOff val="35000"/>
+      </a:schemeClr>
+    </cs:fontRef>
+    <cs:spPr>
+      <a:solidFill>
+        <a:schemeClr val="lt1"/>
+      </a:solidFill>
+      <a:ln>
+        <a:solidFill>
+          <a:schemeClr val="dk1">
+            <a:lumMod val="25000"/>
+            <a:lumOff val="75000"/>
+          </a:schemeClr>
+        </a:solidFill>
+      </a:ln>
+    </cs:spPr>
+    <cs:defRPr sz="1197" kern="1200"/>
+    <cs:bodyPr rot="0" spcFirstLastPara="1" vertOverflow="clip" horzOverflow="clip" vert="horz" wrap="square" lIns="36576" tIns="18288" rIns="36576" bIns="18288" anchor="ctr" anchorCtr="1">
+      <a:spAutoFit/>
+    </cs:bodyPr>
+  </cs:dataLabelCallout>
+  <cs:dataPoint>
+    <cs:lnRef idx="0"/>
+    <cs:fillRef idx="1">
+      <cs:styleClr val="auto"/>
+    </cs:fillRef>
+    <cs:effectRef idx="0"/>
+    <cs:fontRef idx="minor">
+      <a:schemeClr val="tx1"/>
+    </cs:fontRef>
+  </cs:dataPoint>
+  <cs:dataPoint3D>
+    <cs:lnRef idx="0"/>
+    <cs:fillRef idx="1">
+      <cs:styleClr val="auto"/>
+    </cs:fillRef>
+    <cs:effectRef idx="0"/>
+    <cs:fontRef idx="minor">
+      <a:schemeClr val="tx1"/>
+    </cs:fontRef>
+  </cs:dataPoint3D>
+  <cs:dataPointLine>
+    <cs:lnRef idx="0">
+      <cs:styleClr val="auto"/>
+    </cs:lnRef>
+    <cs:fillRef idx="1"/>
+    <cs:effectRef idx="0"/>
+    <cs:fontRef idx="minor">
+      <a:schemeClr val="tx1"/>
+    </cs:fontRef>
+    <cs:spPr>
+      <a:ln w="28575" cap="rnd">
+        <a:solidFill>
+          <a:schemeClr val="phClr"/>
+        </a:solidFill>
+        <a:round/>
+      </a:ln>
+    </cs:spPr>
+  </cs:dataPointLine>
+  <cs:dataPointMarker>
+    <cs:lnRef idx="0">
+      <cs:styleClr val="auto"/>
+    </cs:lnRef>
+    <cs:fillRef idx="1">
+      <cs:styleClr val="auto"/>
+    </cs:fillRef>
+    <cs:effectRef idx="0"/>
+    <cs:fontRef idx="minor">
+      <a:schemeClr val="tx1"/>
+    </cs:fontRef>
+    <cs:spPr>
+      <a:ln w="9525">
+        <a:solidFill>
+          <a:schemeClr val="phClr"/>
+        </a:solidFill>
+      </a:ln>
+    </cs:spPr>
+  </cs:dataPointMarker>
+  <cs:dataPointMarkerLayout symbol="circle" size="5"/>
+  <cs:dataPointWireframe>
+    <cs:lnRef idx="0">
+      <cs:styleClr val="auto"/>
+    </cs:lnRef>
+    <cs:fillRef idx="1"/>
+    <cs:effectRef idx="0"/>
+    <cs:fontRef idx="minor">
+      <a:schemeClr val="tx1"/>
+    </cs:fontRef>
+    <cs:spPr>
+      <a:ln w="9525" cap="rnd">
+        <a:solidFill>
+          <a:schemeClr val="phClr"/>
+        </a:solidFill>
+        <a:round/>
+      </a:ln>
+    </cs:spPr>
+  </cs:dataPointWireframe>
+  <cs:dataTable>
+    <cs:lnRef idx="0"/>
+    <cs:fillRef idx="0"/>
+    <cs:effectRef idx="0"/>
+    <cs:fontRef idx="minor">
+      <a:schemeClr val="tx1">
+        <a:lumMod val="65000"/>
+        <a:lumOff val="35000"/>
+      </a:schemeClr>
+    </cs:fontRef>
+    <cs:spPr>
+      <a:noFill/>
+      <a:ln w="9525" cap="flat" cmpd="sng" algn="ctr">
+        <a:solidFill>
+          <a:schemeClr val="tx1">
+            <a:lumMod val="15000"/>
+            <a:lumOff val="85000"/>
+          </a:schemeClr>
+        </a:solidFill>
+        <a:round/>
+      </a:ln>
+    </cs:spPr>
+    <cs:defRPr sz="1197" kern="1200"/>
+  </cs:dataTable>
+  <cs:downBar>
+    <cs:lnRef idx="0"/>
+    <cs:fillRef idx="0"/>
+    <cs:effectRef idx="0"/>
+    <cs:fontRef idx="minor">
+      <a:schemeClr val="dk1"/>
+    </cs:fontRef>
+    <cs:spPr>
+      <a:solidFill>
+        <a:schemeClr val="dk1">
+          <a:lumMod val="65000"/>
+          <a:lumOff val="35000"/>
+        </a:schemeClr>
+      </a:solidFill>
+      <a:ln w="9525">
+        <a:solidFill>
+          <a:schemeClr val="tx1">
+            <a:lumMod val="65000"/>
+            <a:lumOff val="35000"/>
+          </a:schemeClr>
+        </a:solidFill>
+      </a:ln>
+    </cs:spPr>
+  </cs:downBar>
+  <cs:dropLine>
+    <cs:lnRef idx="0"/>
+    <cs:fillRef idx="0"/>
+    <cs:effectRef idx="0"/>
+    <cs:fontRef idx="minor">
+      <a:schemeClr val="tx1"/>
+    </cs:fontRef>
+    <cs:spPr>
+      <a:ln w="9525" cap="flat" cmpd="sng" algn="ctr">
+        <a:solidFill>
+          <a:schemeClr val="tx1">
+            <a:lumMod val="35000"/>
+            <a:lumOff val="65000"/>
+          </a:schemeClr>
+        </a:solidFill>
+        <a:round/>
+      </a:ln>
+    </cs:spPr>
+  </cs:dropLine>
+  <cs:errorBar>
+    <cs:lnRef idx="0"/>
+    <cs:fillRef idx="0"/>
+    <cs:effectRef idx="0"/>
+    <cs:fontRef idx="minor">
+      <a:schemeClr val="tx1"/>
+    </cs:fontRef>
+    <cs:spPr>
+      <a:ln w="9525" cap="flat" cmpd="sng" algn="ctr">
+        <a:solidFill>
+          <a:schemeClr val="tx1">
+            <a:lumMod val="65000"/>
+            <a:lumOff val="35000"/>
+          </a:schemeClr>
+        </a:solidFill>
+        <a:round/>
+      </a:ln>
+    </cs:spPr>
+  </cs:errorBar>
+  <cs:floor>
+    <cs:lnRef idx="0"/>
+    <cs:fillRef idx="0"/>
+    <cs:effectRef idx="0"/>
+    <cs:fontRef idx="minor">
+      <a:schemeClr val="tx1"/>
+    </cs:fontRef>
+    <cs:spPr>
+      <a:noFill/>
+      <a:ln>
+        <a:noFill/>
+      </a:ln>
+    </cs:spPr>
+  </cs:floor>
+  <cs:gridlineMajor>
+    <cs:lnRef idx="0"/>
+    <cs:fillRef idx="0"/>
+    <cs:effectRef idx="0"/>
+    <cs:fontRef idx="minor">
+      <a:schemeClr val="tx1"/>
+    </cs:fontRef>
+    <cs:spPr>
+      <a:ln w="9525" cap="flat" cmpd="sng" algn="ctr">
+        <a:solidFill>
+          <a:schemeClr val="tx1">
+            <a:lumMod val="15000"/>
+            <a:lumOff val="85000"/>
+          </a:schemeClr>
+        </a:solidFill>
+        <a:round/>
+      </a:ln>
+    </cs:spPr>
+  </cs:gridlineMajor>
+  <cs:gridlineMinor>
+    <cs:lnRef idx="0"/>
+    <cs:fillRef idx="0"/>
+    <cs:effectRef idx="0"/>
+    <cs:fontRef idx="minor">
+      <a:schemeClr val="tx1"/>
+    </cs:fontRef>
+    <cs:spPr>
+      <a:ln w="9525" cap="flat" cmpd="sng" algn="ctr">
+        <a:solidFill>
+          <a:schemeClr val="tx1">
+            <a:lumMod val="5000"/>
+            <a:lumOff val="95000"/>
+          </a:schemeClr>
+        </a:solidFill>
+        <a:round/>
+      </a:ln>
+    </cs:spPr>
+  </cs:gridlineMinor>
+  <cs:hiLoLine>
+    <cs:lnRef idx="0"/>
+    <cs:fillRef idx="0"/>
+    <cs:effectRef idx="0"/>
+    <cs:fontRef idx="minor">
+      <a:schemeClr val="tx1"/>
+    </cs:fontRef>
+    <cs:spPr>
+      <a:ln w="9525" cap="flat" cmpd="sng" algn="ctr">
+        <a:solidFill>
+          <a:schemeClr val="tx1">
+            <a:lumMod val="75000"/>
+            <a:lumOff val="25000"/>
+          </a:schemeClr>
+        </a:solidFill>
+        <a:round/>
+      </a:ln>
+    </cs:spPr>
+  </cs:hiLoLine>
+  <cs:leaderLine>
+    <cs:lnRef idx="0"/>
+    <cs:fillRef idx="0"/>
+    <cs:effectRef idx="0"/>
+    <cs:fontRef idx="minor">
+      <a:schemeClr val="tx1"/>
+    </cs:fontRef>
+    <cs:spPr>
+      <a:ln w="9525" cap="flat" cmpd="sng" algn="ctr">
+        <a:solidFill>
+          <a:schemeClr val="tx1">
+            <a:lumMod val="35000"/>
+            <a:lumOff val="65000"/>
+          </a:schemeClr>
+        </a:solidFill>
+        <a:round/>
+      </a:ln>
+    </cs:spPr>
+  </cs:leaderLine>
+  <cs:legend>
+    <cs:lnRef idx="0"/>
+    <cs:fillRef idx="0"/>
+    <cs:effectRef idx="0"/>
+    <cs:fontRef idx="minor">
+      <a:schemeClr val="tx1">
+        <a:lumMod val="65000"/>
+        <a:lumOff val="35000"/>
+      </a:schemeClr>
+    </cs:fontRef>
+    <cs:defRPr sz="1197" kern="1200"/>
+  </cs:legend>
+  <cs:plotArea mods="allowNoFillOverride allowNoLineOverride">
+    <cs:lnRef idx="0"/>
+    <cs:fillRef idx="0"/>
+    <cs:effectRef idx="0"/>
+    <cs:fontRef idx="minor">
+      <a:schemeClr val="tx1"/>
+    </cs:fontRef>
+  </cs:plotArea>
+  <cs:plotArea3D mods="allowNoFillOverride allowNoLineOverride">
+    <cs:lnRef idx="0"/>
+    <cs:fillRef idx="0"/>
+    <cs:effectRef idx="0"/>
+    <cs:fontRef idx="minor">
+      <a:schemeClr val="tx1"/>
+    </cs:fontRef>
+  </cs:plotArea3D>
+  <cs:seriesAxis>
+    <cs:lnRef idx="0"/>
+    <cs:fillRef idx="0"/>
+    <cs:effectRef idx="0"/>
+    <cs:fontRef idx="minor">
+      <a:schemeClr val="tx1">
+        <a:lumMod val="65000"/>
+        <a:lumOff val="35000"/>
+      </a:schemeClr>
+    </cs:fontRef>
+    <cs:defRPr sz="1197" kern="1200"/>
+  </cs:seriesAxis>
+  <cs:seriesLine>
+    <cs:lnRef idx="0"/>
+    <cs:fillRef idx="0"/>
+    <cs:effectRef idx="0"/>
+    <cs:fontRef idx="minor">
+      <a:schemeClr val="tx1"/>
+    </cs:fontRef>
+    <cs:spPr>
+      <a:ln w="9525" cap="flat" cmpd="sng" algn="ctr">
+        <a:solidFill>
+          <a:schemeClr val="tx1">
+            <a:lumMod val="35000"/>
+            <a:lumOff val="65000"/>
+          </a:schemeClr>
+        </a:solidFill>
+        <a:round/>
+      </a:ln>
+    </cs:spPr>
+  </cs:seriesLine>
+  <cs:title>
+    <cs:lnRef idx="0"/>
+    <cs:fillRef idx="0"/>
+    <cs:effectRef idx="0"/>
+    <cs:fontRef idx="minor">
+      <a:schemeClr val="tx1">
+        <a:lumMod val="65000"/>
+        <a:lumOff val="35000"/>
+      </a:schemeClr>
+    </cs:fontRef>
+    <cs:defRPr sz="1862" b="0" kern="1200" spc="0" baseline="0"/>
+  </cs:title>
+  <cs:trendline>
+    <cs:lnRef idx="0">
+      <cs:styleClr val="auto"/>
+    </cs:lnRef>
+    <cs:fillRef idx="0"/>
+    <cs:effectRef idx="0"/>
+    <cs:fontRef idx="minor">
+      <a:schemeClr val="tx1"/>
+    </cs:fontRef>
+    <cs:spPr>
+      <a:ln w="19050" cap="rnd">
+        <a:solidFill>
+          <a:schemeClr val="phClr"/>
+        </a:solidFill>
+        <a:prstDash val="sysDot"/>
+      </a:ln>
+    </cs:spPr>
+  </cs:trendline>
+  <cs:trendlineLabel>
+    <cs:lnRef idx="0"/>
+    <cs:fillRef idx="0"/>
+    <cs:effectRef idx="0"/>
+    <cs:fontRef idx="minor">
+      <a:schemeClr val="tx1">
+        <a:lumMod val="65000"/>
+        <a:lumOff val="35000"/>
+      </a:schemeClr>
+    </cs:fontRef>
+    <cs:defRPr sz="1197" kern="1200"/>
+  </cs:trendlineLabel>
+  <cs:upBar>
+    <cs:lnRef idx="0"/>
+    <cs:fillRef idx="0"/>
+    <cs:effectRef idx="0"/>
+    <cs:fontRef idx="minor">
+      <a:schemeClr val="dk1"/>
+    </cs:fontRef>
+    <cs:spPr>
+      <a:solidFill>
+        <a:schemeClr val="lt1"/>
+      </a:solidFill>
+      <a:ln w="9525">
+        <a:solidFill>
+          <a:schemeClr val="tx1">
+            <a:lumMod val="15000"/>
+            <a:lumOff val="85000"/>
+          </a:schemeClr>
+        </a:solidFill>
+      </a:ln>
+    </cs:spPr>
+  </cs:upBar>
+  <cs:valueAxis>
+    <cs:lnRef idx="0"/>
+    <cs:fillRef idx="0"/>
+    <cs:effectRef idx="0"/>
+    <cs:fontRef idx="minor">
+      <a:schemeClr val="tx1">
+        <a:lumMod val="65000"/>
+        <a:lumOff val="35000"/>
+      </a:schemeClr>
+    </cs:fontRef>
+    <cs:defRPr sz="1197" kern="1200"/>
+  </cs:valueAxis>
+  <cs:wall>
+    <cs:lnRef idx="0"/>
+    <cs:fillRef idx="0"/>
+    <cs:effectRef idx="0"/>
+    <cs:fontRef idx="minor">
+      <a:schemeClr val="tx1"/>
+    </cs:fontRef>
+    <cs:spPr>
+      <a:noFill/>
+      <a:ln>
+        <a:noFill/>
+      </a:ln>
+    </cs:spPr>
   </cs:wall>
 </cs:chartStyle>
 </file>
@@ -19248,11 +20770,11 @@
             </a:r>
             <a:r>
               <a:rPr lang="en-US" dirty="0" err="1"/>
-              <a:t>Dr</a:t>
+              <a:t>Dr.Hao</a:t>
             </a:r>
             <a:r>
               <a:rPr lang="en-US" dirty="0"/>
-              <a:t> Hao Wu</a:t>
+              <a:t> Wu</a:t>
             </a:r>
           </a:p>
         </p:txBody>
@@ -19283,108 +20805,6 @@
 </file>
 
 <file path=ppt/slides/slide10.xml><?xml version="1.0" encoding="utf-8"?>
-<p:sld xmlns:a="http://schemas.openxmlformats.org/drawingml/2006/main" xmlns:r="http://schemas.openxmlformats.org/officeDocument/2006/relationships" xmlns:p="http://schemas.openxmlformats.org/presentationml/2006/main">
-  <p:cSld>
-    <p:spTree>
-      <p:nvGrpSpPr>
-        <p:cNvPr id="1" name=""/>
-        <p:cNvGrpSpPr/>
-        <p:nvPr/>
-      </p:nvGrpSpPr>
-      <p:grpSpPr>
-        <a:xfrm>
-          <a:off x="0" y="0"/>
-          <a:ext cx="0" cy="0"/>
-          <a:chOff x="0" y="0"/>
-          <a:chExt cx="0" cy="0"/>
-        </a:xfrm>
-      </p:grpSpPr>
-      <p:sp>
-        <p:nvSpPr>
-          <p:cNvPr id="2" name="Title 1"/>
-          <p:cNvSpPr>
-            <a:spLocks noGrp="1"/>
-          </p:cNvSpPr>
-          <p:nvPr>
-            <p:ph type="title"/>
-          </p:nvPr>
-        </p:nvSpPr>
-        <p:spPr/>
-        <p:txBody>
-          <a:bodyPr/>
-          <a:lstStyle/>
-          <a:p>
-            <a:r>
-              <a:rPr lang="en-US" dirty="0"/>
-              <a:t>Add a Slide Title - 4</a:t>
-            </a:r>
-          </a:p>
-        </p:txBody>
-      </p:sp>
-      <p:sp>
-        <p:nvSpPr>
-          <p:cNvPr id="5" name="Content Placeholder 4"/>
-          <p:cNvSpPr>
-            <a:spLocks noGrp="1"/>
-          </p:cNvSpPr>
-          <p:nvPr>
-            <p:ph idx="1"/>
-          </p:nvPr>
-        </p:nvSpPr>
-        <p:spPr/>
-        <p:txBody>
-          <a:bodyPr/>
-          <a:lstStyle/>
-          <a:p>
-            <a:endParaRPr lang="en-US"/>
-          </a:p>
-        </p:txBody>
-      </p:sp>
-      <p:sp>
-        <p:nvSpPr>
-          <p:cNvPr id="6" name="Text Placeholder 5"/>
-          <p:cNvSpPr>
-            <a:spLocks noGrp="1"/>
-          </p:cNvSpPr>
-          <p:nvPr>
-            <p:ph type="body" sz="half" idx="2"/>
-          </p:nvPr>
-        </p:nvSpPr>
-        <p:spPr/>
-        <p:txBody>
-          <a:bodyPr/>
-          <a:lstStyle/>
-          <a:p>
-            <a:endParaRPr lang="en-US"/>
-          </a:p>
-        </p:txBody>
-      </p:sp>
-    </p:spTree>
-    <p:extLst>
-      <p:ext uri="{BB962C8B-B14F-4D97-AF65-F5344CB8AC3E}">
-        <p14:creationId xmlns:p14="http://schemas.microsoft.com/office/powerpoint/2010/main" val="4101607575"/>
-      </p:ext>
-    </p:extLst>
-  </p:cSld>
-  <p:clrMapOvr>
-    <a:masterClrMapping/>
-  </p:clrMapOvr>
-  <mc:AlternateContent xmlns:mc="http://schemas.openxmlformats.org/markup-compatibility/2006" xmlns:p14="http://schemas.microsoft.com/office/powerpoint/2010/main">
-    <mc:Choice Requires="p14">
-      <p:transition spd="med" p14:dur="700">
-        <p:fade/>
-      </p:transition>
-    </mc:Choice>
-    <mc:Fallback xmlns="">
-      <p:transition spd="med">
-        <p:fade/>
-      </p:transition>
-    </mc:Fallback>
-  </mc:AlternateContent>
-</p:sld>
-</file>
-
-<file path=ppt/slides/slide11.xml><?xml version="1.0" encoding="utf-8"?>
 <p:sld xmlns:a="http://schemas.openxmlformats.org/drawingml/2006/main" xmlns:r="http://schemas.openxmlformats.org/officeDocument/2006/relationships" xmlns:p="http://schemas.openxmlformats.org/presentationml/2006/main">
   <p:cSld>
     <p:spTree>
@@ -19451,37 +20871,6 @@
           </a:p>
         </p:txBody>
       </p:sp>
-      <p:graphicFrame>
-        <p:nvGraphicFramePr>
-          <p:cNvPr id="5" name="Content Placeholder 5" descr="Clustered column chart showing the values of 3 series for 4 categories">
-            <a:extLst>
-              <a:ext uri="{FF2B5EF4-FFF2-40B4-BE49-F238E27FC236}">
-                <a16:creationId xmlns:a16="http://schemas.microsoft.com/office/drawing/2014/main" id="{EEE37507-6119-40D6-9A81-740241351D33}"/>
-              </a:ext>
-            </a:extLst>
-          </p:cNvPr>
-          <p:cNvGraphicFramePr>
-            <a:graphicFrameLocks noGrp="1"/>
-          </p:cNvGraphicFramePr>
-          <p:nvPr>
-            <p:ph idx="1"/>
-            <p:extLst>
-              <p:ext uri="{D42A27DB-BD31-4B8C-83A1-F6EECF244321}">
-                <p14:modId xmlns:p14="http://schemas.microsoft.com/office/powerpoint/2010/main" val="2528736421"/>
-              </p:ext>
-            </p:extLst>
-          </p:nvPr>
-        </p:nvGraphicFramePr>
-        <p:xfrm>
-          <a:off x="542925" y="571500"/>
-          <a:ext cx="6218238" cy="5715000"/>
-        </p:xfrm>
-        <a:graphic>
-          <a:graphicData uri="http://schemas.openxmlformats.org/drawingml/2006/chart">
-            <c:chart xmlns:c="http://schemas.openxmlformats.org/drawingml/2006/chart" xmlns:r="http://schemas.openxmlformats.org/officeDocument/2006/relationships" r:id="rId2"/>
-          </a:graphicData>
-        </a:graphic>
-      </p:graphicFrame>
       <p:graphicFrame>
         <p:nvGraphicFramePr>
           <p:cNvPr id="6" name="Content Placeholder 4">
@@ -19731,6 +21120,31 @@
           </a:graphicData>
         </a:graphic>
       </p:graphicFrame>
+      <p:sp>
+        <p:nvSpPr>
+          <p:cNvPr id="13" name="Content Placeholder 12">
+            <a:extLst>
+              <a:ext uri="{FF2B5EF4-FFF2-40B4-BE49-F238E27FC236}">
+                <a16:creationId xmlns:a16="http://schemas.microsoft.com/office/drawing/2014/main" id="{14C6E1B7-AEDE-485A-8EE1-9D9ECCE55996}"/>
+              </a:ext>
+            </a:extLst>
+          </p:cNvPr>
+          <p:cNvSpPr>
+            <a:spLocks noGrp="1"/>
+          </p:cNvSpPr>
+          <p:nvPr>
+            <p:ph idx="1"/>
+          </p:nvPr>
+        </p:nvSpPr>
+        <p:spPr/>
+        <p:txBody>
+          <a:bodyPr/>
+          <a:lstStyle/>
+          <a:p>
+            <a:endParaRPr lang="en-IE"/>
+          </a:p>
+        </p:txBody>
+      </p:sp>
     </p:spTree>
     <p:extLst>
       <p:ext uri="{BB962C8B-B14F-4D97-AF65-F5344CB8AC3E}">
@@ -19808,7 +21222,7 @@
         <p:spPr/>
         <p:txBody>
           <a:bodyPr>
-            <a:normAutofit lnSpcReduction="10000"/>
+            <a:normAutofit/>
           </a:bodyPr>
           <a:lstStyle/>
           <a:p>
@@ -19850,14 +21264,13 @@
           <a:p>
             <a:r>
               <a:rPr lang="en-US" dirty="0"/>
-              <a:t>Conclusions.</a:t>
+              <a:t>Conclusions &amp; </a:t>
             </a:r>
-          </a:p>
-          <a:p>
             <a:r>
-              <a:rPr lang="en-US" dirty="0"/>
+              <a:rPr lang="en-US"/>
               <a:t>Future Work.</a:t>
             </a:r>
+            <a:endParaRPr lang="en-US" dirty="0"/>
           </a:p>
           <a:p>
             <a:endParaRPr lang="en-US" dirty="0"/>
@@ -20601,31 +22014,644 @@
           </a:p>
         </p:txBody>
       </p:sp>
-      <p:sp>
-        <p:nvSpPr>
-          <p:cNvPr id="3" name="Content Placeholder 2">
+      <p:pic>
+        <p:nvPicPr>
+          <p:cNvPr id="5" name="Picture 4">
             <a:extLst>
               <a:ext uri="{FF2B5EF4-FFF2-40B4-BE49-F238E27FC236}">
-                <a16:creationId xmlns:a16="http://schemas.microsoft.com/office/drawing/2014/main" id="{3CE7D79B-B7EF-4ED8-87AB-506B5A49EF77}"/>
+                <a16:creationId xmlns:a16="http://schemas.microsoft.com/office/drawing/2014/main" id="{672FF174-7E0B-494A-8454-8EDF5CC55EF6}"/>
               </a:ext>
             </a:extLst>
           </p:cNvPr>
-          <p:cNvSpPr>
-            <a:spLocks noGrp="1"/>
+          <p:cNvPicPr>
+            <a:picLocks noChangeAspect="1"/>
+          </p:cNvPicPr>
+          <p:nvPr/>
+        </p:nvPicPr>
+        <p:blipFill>
+          <a:blip r:embed="rId2"/>
+          <a:stretch>
+            <a:fillRect/>
+          </a:stretch>
+        </p:blipFill>
+        <p:spPr>
+          <a:xfrm>
+            <a:off x="267744" y="4140870"/>
+            <a:ext cx="1374209" cy="1963156"/>
+          </a:xfrm>
+          <a:prstGeom prst="rect">
+            <a:avLst/>
+          </a:prstGeom>
+        </p:spPr>
+      </p:pic>
+      <p:sp>
+        <p:nvSpPr>
+          <p:cNvPr id="7" name="Content Placeholder 2">
+            <a:extLst>
+              <a:ext uri="{FF2B5EF4-FFF2-40B4-BE49-F238E27FC236}">
+                <a16:creationId xmlns:a16="http://schemas.microsoft.com/office/drawing/2014/main" id="{AFA58F2E-7CE2-4219-8D53-0F65F9FB604C}"/>
+              </a:ext>
+            </a:extLst>
+          </p:cNvPr>
+          <p:cNvSpPr txBox="1">
+            <a:spLocks/>
           </p:cNvSpPr>
-          <p:nvPr>
-            <p:ph idx="1"/>
-          </p:nvPr>
+          <p:nvPr/>
         </p:nvSpPr>
-        <p:spPr/>
+        <p:spPr>
+          <a:xfrm>
+            <a:off x="6096000" y="1524000"/>
+            <a:ext cx="4454047" cy="3809999"/>
+          </a:xfrm>
+          <a:prstGeom prst="rect">
+            <a:avLst/>
+          </a:prstGeom>
+        </p:spPr>
         <p:txBody>
-          <a:bodyPr/>
-          <a:lstStyle/>
+          <a:bodyPr vert="horz" lIns="91440" tIns="45720" rIns="91440" bIns="45720" rtlCol="0">
+            <a:normAutofit/>
+          </a:bodyPr>
+          <a:lstStyle>
+            <a:lvl1pPr marL="228600" indent="-228600" algn="l" defTabSz="914400" rtl="0" eaLnBrk="1" latinLnBrk="0" hangingPunct="1">
+              <a:lnSpc>
+                <a:spcPct val="90000"/>
+              </a:lnSpc>
+              <a:spcBef>
+                <a:spcPts val="1800"/>
+              </a:spcBef>
+              <a:buClr>
+                <a:schemeClr val="accent1">
+                  <a:lumMod val="75000"/>
+                </a:schemeClr>
+              </a:buClr>
+              <a:buSzPct val="100000"/>
+              <a:buFont typeface="Arial" pitchFamily="34" charset="0"/>
+              <a:buChar char="▪"/>
+              <a:defRPr sz="2000" kern="1200">
+                <a:solidFill>
+                  <a:schemeClr val="tx1"/>
+                </a:solidFill>
+                <a:latin typeface="+mn-lt"/>
+                <a:ea typeface="+mn-ea"/>
+                <a:cs typeface="+mn-cs"/>
+              </a:defRPr>
+            </a:lvl1pPr>
+            <a:lvl2pPr marL="457200" indent="-182880" algn="l" defTabSz="914400" rtl="0" eaLnBrk="1" latinLnBrk="0" hangingPunct="1">
+              <a:lnSpc>
+                <a:spcPct val="90000"/>
+              </a:lnSpc>
+              <a:spcBef>
+                <a:spcPts val="1200"/>
+              </a:spcBef>
+              <a:buClr>
+                <a:schemeClr val="accent1">
+                  <a:lumMod val="75000"/>
+                </a:schemeClr>
+              </a:buClr>
+              <a:buSzPct val="100000"/>
+              <a:buFont typeface="Arial" pitchFamily="34" charset="0"/>
+              <a:buChar char="▪"/>
+              <a:defRPr sz="1800" kern="1200">
+                <a:solidFill>
+                  <a:schemeClr val="tx1"/>
+                </a:solidFill>
+                <a:latin typeface="+mn-lt"/>
+                <a:ea typeface="+mn-ea"/>
+                <a:cs typeface="+mn-cs"/>
+              </a:defRPr>
+            </a:lvl2pPr>
+            <a:lvl3pPr marL="685800" indent="-179388" algn="l" defTabSz="914400" rtl="0" eaLnBrk="1" latinLnBrk="0" hangingPunct="1">
+              <a:lnSpc>
+                <a:spcPct val="90000"/>
+              </a:lnSpc>
+              <a:spcBef>
+                <a:spcPts val="800"/>
+              </a:spcBef>
+              <a:buClr>
+                <a:schemeClr val="accent1">
+                  <a:lumMod val="75000"/>
+                </a:schemeClr>
+              </a:buClr>
+              <a:buSzPct val="100000"/>
+              <a:buFont typeface="Arial" pitchFamily="34" charset="0"/>
+              <a:buChar char="▪"/>
+              <a:defRPr sz="1600" kern="1200">
+                <a:solidFill>
+                  <a:schemeClr val="tx1"/>
+                </a:solidFill>
+                <a:latin typeface="+mn-lt"/>
+                <a:ea typeface="+mn-ea"/>
+                <a:cs typeface="+mn-cs"/>
+              </a:defRPr>
+            </a:lvl3pPr>
+            <a:lvl4pPr marL="914400" indent="-182880" algn="l" defTabSz="914400" rtl="0" eaLnBrk="1" latinLnBrk="0" hangingPunct="1">
+              <a:lnSpc>
+                <a:spcPct val="90000"/>
+              </a:lnSpc>
+              <a:spcBef>
+                <a:spcPts val="800"/>
+              </a:spcBef>
+              <a:buClr>
+                <a:schemeClr val="accent1">
+                  <a:lumMod val="75000"/>
+                </a:schemeClr>
+              </a:buClr>
+              <a:buSzPct val="100000"/>
+              <a:buFont typeface="Arial" pitchFamily="34" charset="0"/>
+              <a:buChar char="▪"/>
+              <a:defRPr sz="1400" kern="1200">
+                <a:solidFill>
+                  <a:schemeClr val="tx1"/>
+                </a:solidFill>
+                <a:latin typeface="+mn-lt"/>
+                <a:ea typeface="+mn-ea"/>
+                <a:cs typeface="+mn-cs"/>
+              </a:defRPr>
+            </a:lvl4pPr>
+            <a:lvl5pPr marL="1143000" indent="-179388" algn="l" defTabSz="914400" rtl="0" eaLnBrk="1" latinLnBrk="0" hangingPunct="1">
+              <a:lnSpc>
+                <a:spcPct val="90000"/>
+              </a:lnSpc>
+              <a:spcBef>
+                <a:spcPts val="600"/>
+              </a:spcBef>
+              <a:buClr>
+                <a:schemeClr val="accent1">
+                  <a:lumMod val="75000"/>
+                </a:schemeClr>
+              </a:buClr>
+              <a:buSzPct val="100000"/>
+              <a:buFont typeface="Arial" pitchFamily="34" charset="0"/>
+              <a:buChar char="▪"/>
+              <a:defRPr sz="1400" kern="1200">
+                <a:solidFill>
+                  <a:schemeClr val="tx1"/>
+                </a:solidFill>
+                <a:latin typeface="+mn-lt"/>
+                <a:ea typeface="+mn-ea"/>
+                <a:cs typeface="+mn-cs"/>
+              </a:defRPr>
+            </a:lvl5pPr>
+            <a:lvl6pPr marL="1371600" indent="-182880" algn="l" defTabSz="914400" rtl="0" eaLnBrk="1" latinLnBrk="0" hangingPunct="1">
+              <a:lnSpc>
+                <a:spcPct val="90000"/>
+              </a:lnSpc>
+              <a:spcBef>
+                <a:spcPts val="600"/>
+              </a:spcBef>
+              <a:buClr>
+                <a:schemeClr val="accent1">
+                  <a:lumMod val="75000"/>
+                </a:schemeClr>
+              </a:buClr>
+              <a:buSzPct val="100000"/>
+              <a:buFont typeface="Arial" pitchFamily="34" charset="0"/>
+              <a:buChar char="▪"/>
+              <a:defRPr sz="1400" kern="1200">
+                <a:solidFill>
+                  <a:schemeClr val="tx1"/>
+                </a:solidFill>
+                <a:latin typeface="+mn-lt"/>
+                <a:ea typeface="+mn-ea"/>
+                <a:cs typeface="+mn-cs"/>
+              </a:defRPr>
+            </a:lvl6pPr>
+            <a:lvl7pPr marL="1600200" indent="-179388" algn="l" defTabSz="914400" rtl="0" eaLnBrk="1" latinLnBrk="0" hangingPunct="1">
+              <a:lnSpc>
+                <a:spcPct val="90000"/>
+              </a:lnSpc>
+              <a:spcBef>
+                <a:spcPts val="600"/>
+              </a:spcBef>
+              <a:buClr>
+                <a:schemeClr val="accent1">
+                  <a:lumMod val="75000"/>
+                </a:schemeClr>
+              </a:buClr>
+              <a:buSzPct val="100000"/>
+              <a:buFont typeface="Arial" pitchFamily="34" charset="0"/>
+              <a:buChar char="▪"/>
+              <a:defRPr sz="1400" kern="1200">
+                <a:solidFill>
+                  <a:schemeClr val="tx1"/>
+                </a:solidFill>
+                <a:latin typeface="+mn-lt"/>
+                <a:ea typeface="+mn-ea"/>
+                <a:cs typeface="+mn-cs"/>
+              </a:defRPr>
+            </a:lvl7pPr>
+            <a:lvl8pPr marL="1828800" indent="-182880" algn="l" defTabSz="914400" rtl="0" eaLnBrk="1" latinLnBrk="0" hangingPunct="1">
+              <a:lnSpc>
+                <a:spcPct val="90000"/>
+              </a:lnSpc>
+              <a:spcBef>
+                <a:spcPts val="600"/>
+              </a:spcBef>
+              <a:buClr>
+                <a:schemeClr val="accent1">
+                  <a:lumMod val="75000"/>
+                </a:schemeClr>
+              </a:buClr>
+              <a:buSzPct val="100000"/>
+              <a:buFont typeface="Arial" pitchFamily="34" charset="0"/>
+              <a:buChar char="▪"/>
+              <a:defRPr sz="1400" kern="1200">
+                <a:solidFill>
+                  <a:schemeClr val="tx1"/>
+                </a:solidFill>
+                <a:latin typeface="+mn-lt"/>
+                <a:ea typeface="+mn-ea"/>
+                <a:cs typeface="+mn-cs"/>
+              </a:defRPr>
+            </a:lvl8pPr>
+            <a:lvl9pPr marL="1878012" indent="0" algn="l" defTabSz="914400" rtl="0" eaLnBrk="1" latinLnBrk="0" hangingPunct="1">
+              <a:lnSpc>
+                <a:spcPct val="90000"/>
+              </a:lnSpc>
+              <a:spcBef>
+                <a:spcPts val="600"/>
+              </a:spcBef>
+              <a:buClr>
+                <a:schemeClr val="accent1">
+                  <a:lumMod val="75000"/>
+                </a:schemeClr>
+              </a:buClr>
+              <a:buSzPct val="100000"/>
+              <a:buFont typeface="Arial" pitchFamily="34" charset="0"/>
+              <a:buNone/>
+              <a:defRPr sz="1400" kern="1200">
+                <a:solidFill>
+                  <a:schemeClr val="tx1"/>
+                </a:solidFill>
+                <a:latin typeface="+mn-lt"/>
+                <a:ea typeface="+mn-ea"/>
+                <a:cs typeface="+mn-cs"/>
+              </a:defRPr>
+            </a:lvl9pPr>
+          </a:lstStyle>
           <a:p>
-            <a:endParaRPr lang="en-IE"/>
+            <a:pPr marL="0" indent="0" algn="ctr">
+              <a:buFont typeface="Arial" pitchFamily="34" charset="0"/>
+              <a:buNone/>
+            </a:pPr>
+            <a:r>
+              <a:rPr lang="en-US" dirty="0">
+                <a:solidFill>
+                  <a:schemeClr val="accent1">
+                    <a:lumMod val="75000"/>
+                  </a:schemeClr>
+                </a:solidFill>
+              </a:rPr>
+              <a:t>Research Questions</a:t>
+            </a:r>
+          </a:p>
+          <a:p>
+            <a:r>
+              <a:rPr lang="en-US" dirty="0"/>
+              <a:t>What algorithms to choose.</a:t>
+            </a:r>
+          </a:p>
+          <a:p>
+            <a:r>
+              <a:rPr lang="en-US" dirty="0"/>
+              <a:t>How do the questions relate to these algorithms.</a:t>
+            </a:r>
+          </a:p>
+          <a:p>
+            <a:r>
+              <a:rPr lang="en-US" dirty="0"/>
+              <a:t>How easy can a person identify the pattern of the algorithm to use for a question.</a:t>
+            </a:r>
+          </a:p>
+          <a:p>
+            <a:endParaRPr lang="en-US" dirty="0"/>
           </a:p>
         </p:txBody>
       </p:sp>
+      <p:sp>
+        <p:nvSpPr>
+          <p:cNvPr id="8" name="Content Placeholder 2">
+            <a:extLst>
+              <a:ext uri="{FF2B5EF4-FFF2-40B4-BE49-F238E27FC236}">
+                <a16:creationId xmlns:a16="http://schemas.microsoft.com/office/drawing/2014/main" id="{DEF56C26-EE52-4B06-8A84-EAB5E12FCC84}"/>
+              </a:ext>
+            </a:extLst>
+          </p:cNvPr>
+          <p:cNvSpPr txBox="1">
+            <a:spLocks/>
+          </p:cNvSpPr>
+          <p:nvPr/>
+        </p:nvSpPr>
+        <p:spPr>
+          <a:xfrm>
+            <a:off x="1468677" y="1524000"/>
+            <a:ext cx="4454047" cy="3809999"/>
+          </a:xfrm>
+          <a:prstGeom prst="rect">
+            <a:avLst/>
+          </a:prstGeom>
+        </p:spPr>
+        <p:txBody>
+          <a:bodyPr vert="horz" lIns="91440" tIns="45720" rIns="91440" bIns="45720" rtlCol="0">
+            <a:normAutofit/>
+          </a:bodyPr>
+          <a:lstStyle>
+            <a:lvl1pPr marL="228600" indent="-228600" algn="l" defTabSz="914400" rtl="0" eaLnBrk="1" latinLnBrk="0" hangingPunct="1">
+              <a:lnSpc>
+                <a:spcPct val="90000"/>
+              </a:lnSpc>
+              <a:spcBef>
+                <a:spcPts val="1800"/>
+              </a:spcBef>
+              <a:buClr>
+                <a:schemeClr val="accent1">
+                  <a:lumMod val="75000"/>
+                </a:schemeClr>
+              </a:buClr>
+              <a:buSzPct val="100000"/>
+              <a:buFont typeface="Arial" pitchFamily="34" charset="0"/>
+              <a:buChar char="▪"/>
+              <a:defRPr sz="2000" kern="1200">
+                <a:solidFill>
+                  <a:schemeClr val="tx1"/>
+                </a:solidFill>
+                <a:latin typeface="+mn-lt"/>
+                <a:ea typeface="+mn-ea"/>
+                <a:cs typeface="+mn-cs"/>
+              </a:defRPr>
+            </a:lvl1pPr>
+            <a:lvl2pPr marL="457200" indent="-182880" algn="l" defTabSz="914400" rtl="0" eaLnBrk="1" latinLnBrk="0" hangingPunct="1">
+              <a:lnSpc>
+                <a:spcPct val="90000"/>
+              </a:lnSpc>
+              <a:spcBef>
+                <a:spcPts val="1200"/>
+              </a:spcBef>
+              <a:buClr>
+                <a:schemeClr val="accent1">
+                  <a:lumMod val="75000"/>
+                </a:schemeClr>
+              </a:buClr>
+              <a:buSzPct val="100000"/>
+              <a:buFont typeface="Arial" pitchFamily="34" charset="0"/>
+              <a:buChar char="▪"/>
+              <a:defRPr sz="1800" kern="1200">
+                <a:solidFill>
+                  <a:schemeClr val="tx1"/>
+                </a:solidFill>
+                <a:latin typeface="+mn-lt"/>
+                <a:ea typeface="+mn-ea"/>
+                <a:cs typeface="+mn-cs"/>
+              </a:defRPr>
+            </a:lvl2pPr>
+            <a:lvl3pPr marL="685800" indent="-179388" algn="l" defTabSz="914400" rtl="0" eaLnBrk="1" latinLnBrk="0" hangingPunct="1">
+              <a:lnSpc>
+                <a:spcPct val="90000"/>
+              </a:lnSpc>
+              <a:spcBef>
+                <a:spcPts val="800"/>
+              </a:spcBef>
+              <a:buClr>
+                <a:schemeClr val="accent1">
+                  <a:lumMod val="75000"/>
+                </a:schemeClr>
+              </a:buClr>
+              <a:buSzPct val="100000"/>
+              <a:buFont typeface="Arial" pitchFamily="34" charset="0"/>
+              <a:buChar char="▪"/>
+              <a:defRPr sz="1600" kern="1200">
+                <a:solidFill>
+                  <a:schemeClr val="tx1"/>
+                </a:solidFill>
+                <a:latin typeface="+mn-lt"/>
+                <a:ea typeface="+mn-ea"/>
+                <a:cs typeface="+mn-cs"/>
+              </a:defRPr>
+            </a:lvl3pPr>
+            <a:lvl4pPr marL="914400" indent="-182880" algn="l" defTabSz="914400" rtl="0" eaLnBrk="1" latinLnBrk="0" hangingPunct="1">
+              <a:lnSpc>
+                <a:spcPct val="90000"/>
+              </a:lnSpc>
+              <a:spcBef>
+                <a:spcPts val="800"/>
+              </a:spcBef>
+              <a:buClr>
+                <a:schemeClr val="accent1">
+                  <a:lumMod val="75000"/>
+                </a:schemeClr>
+              </a:buClr>
+              <a:buSzPct val="100000"/>
+              <a:buFont typeface="Arial" pitchFamily="34" charset="0"/>
+              <a:buChar char="▪"/>
+              <a:defRPr sz="1400" kern="1200">
+                <a:solidFill>
+                  <a:schemeClr val="tx1"/>
+                </a:solidFill>
+                <a:latin typeface="+mn-lt"/>
+                <a:ea typeface="+mn-ea"/>
+                <a:cs typeface="+mn-cs"/>
+              </a:defRPr>
+            </a:lvl4pPr>
+            <a:lvl5pPr marL="1143000" indent="-179388" algn="l" defTabSz="914400" rtl="0" eaLnBrk="1" latinLnBrk="0" hangingPunct="1">
+              <a:lnSpc>
+                <a:spcPct val="90000"/>
+              </a:lnSpc>
+              <a:spcBef>
+                <a:spcPts val="600"/>
+              </a:spcBef>
+              <a:buClr>
+                <a:schemeClr val="accent1">
+                  <a:lumMod val="75000"/>
+                </a:schemeClr>
+              </a:buClr>
+              <a:buSzPct val="100000"/>
+              <a:buFont typeface="Arial" pitchFamily="34" charset="0"/>
+              <a:buChar char="▪"/>
+              <a:defRPr sz="1400" kern="1200">
+                <a:solidFill>
+                  <a:schemeClr val="tx1"/>
+                </a:solidFill>
+                <a:latin typeface="+mn-lt"/>
+                <a:ea typeface="+mn-ea"/>
+                <a:cs typeface="+mn-cs"/>
+              </a:defRPr>
+            </a:lvl5pPr>
+            <a:lvl6pPr marL="1371600" indent="-182880" algn="l" defTabSz="914400" rtl="0" eaLnBrk="1" latinLnBrk="0" hangingPunct="1">
+              <a:lnSpc>
+                <a:spcPct val="90000"/>
+              </a:lnSpc>
+              <a:spcBef>
+                <a:spcPts val="600"/>
+              </a:spcBef>
+              <a:buClr>
+                <a:schemeClr val="accent1">
+                  <a:lumMod val="75000"/>
+                </a:schemeClr>
+              </a:buClr>
+              <a:buSzPct val="100000"/>
+              <a:buFont typeface="Arial" pitchFamily="34" charset="0"/>
+              <a:buChar char="▪"/>
+              <a:defRPr sz="1400" kern="1200">
+                <a:solidFill>
+                  <a:schemeClr val="tx1"/>
+                </a:solidFill>
+                <a:latin typeface="+mn-lt"/>
+                <a:ea typeface="+mn-ea"/>
+                <a:cs typeface="+mn-cs"/>
+              </a:defRPr>
+            </a:lvl6pPr>
+            <a:lvl7pPr marL="1600200" indent="-179388" algn="l" defTabSz="914400" rtl="0" eaLnBrk="1" latinLnBrk="0" hangingPunct="1">
+              <a:lnSpc>
+                <a:spcPct val="90000"/>
+              </a:lnSpc>
+              <a:spcBef>
+                <a:spcPts val="600"/>
+              </a:spcBef>
+              <a:buClr>
+                <a:schemeClr val="accent1">
+                  <a:lumMod val="75000"/>
+                </a:schemeClr>
+              </a:buClr>
+              <a:buSzPct val="100000"/>
+              <a:buFont typeface="Arial" pitchFamily="34" charset="0"/>
+              <a:buChar char="▪"/>
+              <a:defRPr sz="1400" kern="1200">
+                <a:solidFill>
+                  <a:schemeClr val="tx1"/>
+                </a:solidFill>
+                <a:latin typeface="+mn-lt"/>
+                <a:ea typeface="+mn-ea"/>
+                <a:cs typeface="+mn-cs"/>
+              </a:defRPr>
+            </a:lvl7pPr>
+            <a:lvl8pPr marL="1828800" indent="-182880" algn="l" defTabSz="914400" rtl="0" eaLnBrk="1" latinLnBrk="0" hangingPunct="1">
+              <a:lnSpc>
+                <a:spcPct val="90000"/>
+              </a:lnSpc>
+              <a:spcBef>
+                <a:spcPts val="600"/>
+              </a:spcBef>
+              <a:buClr>
+                <a:schemeClr val="accent1">
+                  <a:lumMod val="75000"/>
+                </a:schemeClr>
+              </a:buClr>
+              <a:buSzPct val="100000"/>
+              <a:buFont typeface="Arial" pitchFamily="34" charset="0"/>
+              <a:buChar char="▪"/>
+              <a:defRPr sz="1400" kern="1200">
+                <a:solidFill>
+                  <a:schemeClr val="tx1"/>
+                </a:solidFill>
+                <a:latin typeface="+mn-lt"/>
+                <a:ea typeface="+mn-ea"/>
+                <a:cs typeface="+mn-cs"/>
+              </a:defRPr>
+            </a:lvl8pPr>
+            <a:lvl9pPr marL="1878012" indent="0" algn="l" defTabSz="914400" rtl="0" eaLnBrk="1" latinLnBrk="0" hangingPunct="1">
+              <a:lnSpc>
+                <a:spcPct val="90000"/>
+              </a:lnSpc>
+              <a:spcBef>
+                <a:spcPts val="600"/>
+              </a:spcBef>
+              <a:buClr>
+                <a:schemeClr val="accent1">
+                  <a:lumMod val="75000"/>
+                </a:schemeClr>
+              </a:buClr>
+              <a:buSzPct val="100000"/>
+              <a:buFont typeface="Arial" pitchFamily="34" charset="0"/>
+              <a:buNone/>
+              <a:defRPr sz="1400" kern="1200">
+                <a:solidFill>
+                  <a:schemeClr val="tx1"/>
+                </a:solidFill>
+                <a:latin typeface="+mn-lt"/>
+                <a:ea typeface="+mn-ea"/>
+                <a:cs typeface="+mn-cs"/>
+              </a:defRPr>
+            </a:lvl9pPr>
+          </a:lstStyle>
+          <a:p>
+            <a:pPr marL="0" indent="0" algn="ctr">
+              <a:buFont typeface="Arial" pitchFamily="34" charset="0"/>
+              <a:buNone/>
+            </a:pPr>
+            <a:r>
+              <a:rPr lang="en-US" dirty="0">
+                <a:solidFill>
+                  <a:schemeClr val="accent1">
+                    <a:lumMod val="75000"/>
+                  </a:schemeClr>
+                </a:solidFill>
+              </a:rPr>
+              <a:t>Related Works</a:t>
+            </a:r>
+          </a:p>
+          <a:p>
+            <a:r>
+              <a:rPr lang="en-US" dirty="0"/>
+              <a:t>Related works were good, but limiting.</a:t>
+            </a:r>
+          </a:p>
+          <a:p>
+            <a:r>
+              <a:rPr lang="en-US" dirty="0"/>
+              <a:t>5-10 questions per section.</a:t>
+            </a:r>
+          </a:p>
+          <a:p>
+            <a:pPr lvl="1"/>
+            <a:r>
+              <a:rPr lang="en-US" dirty="0"/>
+              <a:t>Overlapping ideas.</a:t>
+            </a:r>
+          </a:p>
+          <a:p>
+            <a:r>
+              <a:rPr lang="en-US" dirty="0"/>
+              <a:t>Try to show the flexibility of algorithms.</a:t>
+            </a:r>
+          </a:p>
+          <a:p>
+            <a:endParaRPr lang="en-US" dirty="0"/>
+          </a:p>
+          <a:p>
+            <a:endParaRPr lang="en-US" dirty="0"/>
+          </a:p>
+        </p:txBody>
+      </p:sp>
+      <p:pic>
+        <p:nvPicPr>
+          <p:cNvPr id="12" name="Picture 11">
+            <a:extLst>
+              <a:ext uri="{FF2B5EF4-FFF2-40B4-BE49-F238E27FC236}">
+                <a16:creationId xmlns:a16="http://schemas.microsoft.com/office/drawing/2014/main" id="{BE51E714-F40C-4ABC-A935-169B978955CC}"/>
+              </a:ext>
+            </a:extLst>
+          </p:cNvPr>
+          <p:cNvPicPr>
+            <a:picLocks noChangeAspect="1"/>
+          </p:cNvPicPr>
+          <p:nvPr/>
+        </p:nvPicPr>
+        <p:blipFill>
+          <a:blip r:embed="rId3"/>
+          <a:stretch>
+            <a:fillRect/>
+          </a:stretch>
+        </p:blipFill>
+        <p:spPr>
+          <a:xfrm>
+            <a:off x="9541570" y="388932"/>
+            <a:ext cx="2363506" cy="1890805"/>
+          </a:xfrm>
+          <a:prstGeom prst="rect">
+            <a:avLst/>
+          </a:prstGeom>
+        </p:spPr>
+      </p:pic>
     </p:spTree>
     <p:extLst>
       <p:ext uri="{BB962C8B-B14F-4D97-AF65-F5344CB8AC3E}">
@@ -20714,14 +22740,21 @@
             <a:pPr lvl="1"/>
             <a:r>
               <a:rPr lang="en-US" dirty="0"/>
-              <a:t>Active user base.</a:t>
+              <a:t>Active community.</a:t>
             </a:r>
           </a:p>
           <a:p>
             <a:pPr lvl="1"/>
             <a:r>
               <a:rPr lang="en-US" dirty="0"/>
-              <a:t>Online judge system.</a:t>
+              <a:t>Online judge system. Important.</a:t>
+            </a:r>
+          </a:p>
+          <a:p>
+            <a:pPr lvl="1"/>
+            <a:r>
+              <a:rPr lang="en-US" dirty="0"/>
+              <a:t>Wide range of questions.</a:t>
             </a:r>
           </a:p>
           <a:p>
@@ -20884,7 +22917,7 @@
           <a:p>
             <a:r>
               <a:rPr lang="en-US" dirty="0"/>
-              <a:t>Title and content layout with SmartArt</a:t>
+              <a:t>Methodology</a:t>
             </a:r>
           </a:p>
         </p:txBody>
@@ -20973,7 +23006,7 @@
           <a:p>
             <a:r>
               <a:rPr lang="en-US" dirty="0"/>
-              <a:t>Add a Slide Title - 1</a:t>
+              <a:t>Software Problems</a:t>
             </a:r>
           </a:p>
         </p:txBody>
@@ -21056,87 +23089,72 @@
           <a:p>
             <a:r>
               <a:rPr lang="en-US" dirty="0"/>
-              <a:t>Add a Slide Title - 2</a:t>
+              <a:t>Results</a:t>
             </a:r>
           </a:p>
         </p:txBody>
       </p:sp>
-      <p:sp>
-        <p:nvSpPr>
-          <p:cNvPr id="3" name="Text Placeholder 2"/>
-          <p:cNvSpPr>
-            <a:spLocks noGrp="1"/>
-          </p:cNvSpPr>
-          <p:nvPr>
-            <p:ph type="body" idx="1"/>
-          </p:nvPr>
-        </p:nvSpPr>
-        <p:spPr/>
-        <p:txBody>
-          <a:bodyPr/>
-          <a:lstStyle/>
-          <a:p>
-            <a:endParaRPr lang="en-US"/>
-          </a:p>
-        </p:txBody>
-      </p:sp>
-      <p:sp>
-        <p:nvSpPr>
-          <p:cNvPr id="4" name="Content Placeholder 3"/>
-          <p:cNvSpPr>
-            <a:spLocks noGrp="1"/>
-          </p:cNvSpPr>
+      <p:graphicFrame>
+        <p:nvGraphicFramePr>
+          <p:cNvPr id="11" name="Content Placeholder 10">
+            <a:extLst>
+              <a:ext uri="{FF2B5EF4-FFF2-40B4-BE49-F238E27FC236}">
+                <a16:creationId xmlns:a16="http://schemas.microsoft.com/office/drawing/2014/main" id="{29772847-2290-4CDA-9B30-C1275EB39081}"/>
+              </a:ext>
+            </a:extLst>
+          </p:cNvPr>
+          <p:cNvGraphicFramePr>
+            <a:graphicFrameLocks noGrp="1"/>
+          </p:cNvGraphicFramePr>
           <p:nvPr>
             <p:ph sz="half" idx="2"/>
+            <p:extLst>
+              <p:ext uri="{D42A27DB-BD31-4B8C-83A1-F6EECF244321}">
+                <p14:modId xmlns:p14="http://schemas.microsoft.com/office/powerpoint/2010/main" val="995048311"/>
+              </p:ext>
+            </p:extLst>
           </p:nvPr>
-        </p:nvSpPr>
-        <p:spPr/>
-        <p:txBody>
-          <a:bodyPr/>
-          <a:lstStyle/>
-          <a:p>
-            <a:endParaRPr lang="en-US"/>
-          </a:p>
-        </p:txBody>
-      </p:sp>
-      <p:sp>
-        <p:nvSpPr>
-          <p:cNvPr id="5" name="Text Placeholder 4"/>
-          <p:cNvSpPr>
-            <a:spLocks noGrp="1"/>
-          </p:cNvSpPr>
+        </p:nvGraphicFramePr>
+        <p:xfrm>
+          <a:off x="1107508" y="1818322"/>
+          <a:ext cx="4759893" cy="3567870"/>
+        </p:xfrm>
+        <a:graphic>
+          <a:graphicData uri="http://schemas.openxmlformats.org/drawingml/2006/chart">
+            <c:chart xmlns:c="http://schemas.openxmlformats.org/drawingml/2006/chart" xmlns:r="http://schemas.openxmlformats.org/officeDocument/2006/relationships" r:id="rId2"/>
+          </a:graphicData>
+        </a:graphic>
+      </p:graphicFrame>
+      <p:graphicFrame>
+        <p:nvGraphicFramePr>
+          <p:cNvPr id="12" name="Content Placeholder 10">
+            <a:extLst>
+              <a:ext uri="{FF2B5EF4-FFF2-40B4-BE49-F238E27FC236}">
+                <a16:creationId xmlns:a16="http://schemas.microsoft.com/office/drawing/2014/main" id="{5DB8A0E4-C6A0-4D81-AA6B-A6938402556A}"/>
+              </a:ext>
+            </a:extLst>
+          </p:cNvPr>
+          <p:cNvGraphicFramePr>
+            <a:graphicFrameLocks/>
+          </p:cNvGraphicFramePr>
           <p:nvPr>
-            <p:ph type="body" sz="quarter" idx="3"/>
+            <p:extLst>
+              <p:ext uri="{D42A27DB-BD31-4B8C-83A1-F6EECF244321}">
+                <p14:modId xmlns:p14="http://schemas.microsoft.com/office/powerpoint/2010/main" val="3027857231"/>
+              </p:ext>
+            </p:extLst>
           </p:nvPr>
-        </p:nvSpPr>
-        <p:spPr/>
-        <p:txBody>
-          <a:bodyPr/>
-          <a:lstStyle/>
-          <a:p>
-            <a:endParaRPr lang="en-US"/>
-          </a:p>
-        </p:txBody>
-      </p:sp>
-      <p:sp>
-        <p:nvSpPr>
-          <p:cNvPr id="6" name="Content Placeholder 5"/>
-          <p:cNvSpPr>
-            <a:spLocks noGrp="1"/>
-          </p:cNvSpPr>
-          <p:nvPr>
-            <p:ph sz="quarter" idx="4"/>
-          </p:nvPr>
-        </p:nvSpPr>
-        <p:spPr/>
-        <p:txBody>
-          <a:bodyPr/>
-          <a:lstStyle/>
-          <a:p>
-            <a:endParaRPr lang="en-US"/>
-          </a:p>
-        </p:txBody>
-      </p:sp>
+        </p:nvGraphicFramePr>
+        <p:xfrm>
+          <a:off x="5982220" y="1818322"/>
+          <a:ext cx="4759893" cy="3567870"/>
+        </p:xfrm>
+        <a:graphic>
+          <a:graphicData uri="http://schemas.openxmlformats.org/drawingml/2006/chart">
+            <c:chart xmlns:c="http://schemas.openxmlformats.org/drawingml/2006/chart" xmlns:r="http://schemas.openxmlformats.org/officeDocument/2006/relationships" r:id="rId3"/>
+          </a:graphicData>
+        </a:graphic>
+      </p:graphicFrame>
     </p:spTree>
     <p:extLst>
       <p:ext uri="{BB962C8B-B14F-4D97-AF65-F5344CB8AC3E}">
@@ -21179,10 +23197,189 @@
           <a:chExt cx="0" cy="0"/>
         </a:xfrm>
       </p:grpSpPr>
+      <p:sp>
+        <p:nvSpPr>
+          <p:cNvPr id="2" name="Title 1">
+            <a:extLst>
+              <a:ext uri="{FF2B5EF4-FFF2-40B4-BE49-F238E27FC236}">
+                <a16:creationId xmlns:a16="http://schemas.microsoft.com/office/drawing/2014/main" id="{AC4C1F66-37CF-45FA-A5ED-0469AD68DEDE}"/>
+              </a:ext>
+            </a:extLst>
+          </p:cNvPr>
+          <p:cNvSpPr>
+            <a:spLocks noGrp="1"/>
+          </p:cNvSpPr>
+          <p:nvPr>
+            <p:ph type="title"/>
+          </p:nvPr>
+        </p:nvSpPr>
+        <p:spPr/>
+        <p:txBody>
+          <a:bodyPr>
+            <a:normAutofit/>
+          </a:bodyPr>
+          <a:lstStyle/>
+          <a:p>
+            <a:r>
+              <a:rPr lang="en-US" dirty="0"/>
+              <a:t>   </a:t>
+            </a:r>
+            <a:br>
+              <a:rPr lang="en-US" dirty="0"/>
+            </a:br>
+            <a:r>
+              <a:rPr lang="en-US" dirty="0"/>
+              <a:t>Conclusions &amp; Future Work</a:t>
+            </a:r>
+            <a:endParaRPr lang="en-IE" dirty="0"/>
+          </a:p>
+        </p:txBody>
+      </p:sp>
+      <p:sp>
+        <p:nvSpPr>
+          <p:cNvPr id="3" name="Text Placeholder 2">
+            <a:extLst>
+              <a:ext uri="{FF2B5EF4-FFF2-40B4-BE49-F238E27FC236}">
+                <a16:creationId xmlns:a16="http://schemas.microsoft.com/office/drawing/2014/main" id="{F2278F28-1BF1-44C4-B9CD-E3DB596AA501}"/>
+              </a:ext>
+            </a:extLst>
+          </p:cNvPr>
+          <p:cNvSpPr>
+            <a:spLocks noGrp="1"/>
+          </p:cNvSpPr>
+          <p:nvPr>
+            <p:ph type="body" idx="1"/>
+          </p:nvPr>
+        </p:nvSpPr>
+        <p:spPr/>
+        <p:txBody>
+          <a:bodyPr/>
+          <a:lstStyle/>
+          <a:p>
+            <a:pPr algn="ctr"/>
+            <a:r>
+              <a:rPr lang="en-IE" dirty="0"/>
+              <a:t>Conclusion</a:t>
+            </a:r>
+          </a:p>
+        </p:txBody>
+      </p:sp>
+      <p:sp>
+        <p:nvSpPr>
+          <p:cNvPr id="4" name="Content Placeholder 3">
+            <a:extLst>
+              <a:ext uri="{FF2B5EF4-FFF2-40B4-BE49-F238E27FC236}">
+                <a16:creationId xmlns:a16="http://schemas.microsoft.com/office/drawing/2014/main" id="{00A6DA6E-D7AE-49B2-9898-F3D68D5F2697}"/>
+              </a:ext>
+            </a:extLst>
+          </p:cNvPr>
+          <p:cNvSpPr>
+            <a:spLocks noGrp="1"/>
+          </p:cNvSpPr>
+          <p:nvPr>
+            <p:ph sz="half" idx="2"/>
+          </p:nvPr>
+        </p:nvSpPr>
+        <p:spPr/>
+        <p:txBody>
+          <a:bodyPr/>
+          <a:lstStyle/>
+          <a:p>
+            <a:r>
+              <a:rPr lang="en-IE" dirty="0"/>
+              <a:t>Readers learn that the patterns for standard algorithms are flexible.</a:t>
+            </a:r>
+          </a:p>
+          <a:p>
+            <a:r>
+              <a:rPr lang="en-IE" dirty="0"/>
+              <a:t>Understanding the standard algorithms is useful for interviews.</a:t>
+            </a:r>
+          </a:p>
+          <a:p>
+            <a:r>
+              <a:rPr lang="en-IE" dirty="0"/>
+              <a:t>The approach taken was manual, which was close to the interview experience. </a:t>
+            </a:r>
+          </a:p>
+          <a:p>
+            <a:endParaRPr lang="en-IE" dirty="0"/>
+          </a:p>
+        </p:txBody>
+      </p:sp>
+      <p:sp>
+        <p:nvSpPr>
+          <p:cNvPr id="5" name="Text Placeholder 4">
+            <a:extLst>
+              <a:ext uri="{FF2B5EF4-FFF2-40B4-BE49-F238E27FC236}">
+                <a16:creationId xmlns:a16="http://schemas.microsoft.com/office/drawing/2014/main" id="{47F53951-9A0A-454D-A95E-96CE7457B960}"/>
+              </a:ext>
+            </a:extLst>
+          </p:cNvPr>
+          <p:cNvSpPr>
+            <a:spLocks noGrp="1"/>
+          </p:cNvSpPr>
+          <p:nvPr>
+            <p:ph type="body" sz="quarter" idx="3"/>
+          </p:nvPr>
+        </p:nvSpPr>
+        <p:spPr/>
+        <p:txBody>
+          <a:bodyPr/>
+          <a:lstStyle/>
+          <a:p>
+            <a:pPr algn="ctr"/>
+            <a:r>
+              <a:rPr lang="en-IE" dirty="0"/>
+              <a:t>Future Work</a:t>
+            </a:r>
+          </a:p>
+        </p:txBody>
+      </p:sp>
+      <p:sp>
+        <p:nvSpPr>
+          <p:cNvPr id="6" name="Content Placeholder 5">
+            <a:extLst>
+              <a:ext uri="{FF2B5EF4-FFF2-40B4-BE49-F238E27FC236}">
+                <a16:creationId xmlns:a16="http://schemas.microsoft.com/office/drawing/2014/main" id="{4A53D386-D218-42B7-A2B6-57CECE4226FD}"/>
+              </a:ext>
+            </a:extLst>
+          </p:cNvPr>
+          <p:cNvSpPr>
+            <a:spLocks noGrp="1"/>
+          </p:cNvSpPr>
+          <p:nvPr>
+            <p:ph sz="quarter" idx="4"/>
+          </p:nvPr>
+        </p:nvSpPr>
+        <p:spPr/>
+        <p:txBody>
+          <a:bodyPr/>
+          <a:lstStyle/>
+          <a:p>
+            <a:r>
+              <a:rPr lang="en-IE" dirty="0"/>
+              <a:t>Pilot study for future improvement.</a:t>
+            </a:r>
+          </a:p>
+          <a:p>
+            <a:r>
+              <a:rPr lang="en-IE" dirty="0"/>
+              <a:t>Machine learning.</a:t>
+            </a:r>
+          </a:p>
+          <a:p>
+            <a:r>
+              <a:rPr lang="en-IE" dirty="0"/>
+              <a:t>Develop an automatic validator of similarity.</a:t>
+            </a:r>
+          </a:p>
+        </p:txBody>
+      </p:sp>
     </p:spTree>
     <p:extLst>
       <p:ext uri="{BB962C8B-B14F-4D97-AF65-F5344CB8AC3E}">
-        <p14:creationId xmlns:p14="http://schemas.microsoft.com/office/powerpoint/2010/main" val="1544302913"/>
+        <p14:creationId xmlns:p14="http://schemas.microsoft.com/office/powerpoint/2010/main" val="3291626524"/>
       </p:ext>
     </p:extLst>
   </p:cSld>

</xml_diff>

<commit_message>
Added in more slides' contents
</commit_message>
<xml_diff>
--- a/presentation/New Thesis Presentation.pptx
+++ b/presentation/New Thesis Presentation.pptx
@@ -529,7 +529,7 @@
                 <c:formatCode>General</c:formatCode>
                 <c:ptCount val="1"/>
                 <c:pt idx="0">
-                  <c:v>2</c:v>
+                  <c:v>3</c:v>
                 </c:pt>
               </c:numCache>
             </c:numRef>
@@ -935,7 +935,7 @@
             </a:r>
             <a:r>
               <a:rPr lang="en-IE" baseline="0" dirty="0"/>
-              <a:t> Structure </a:t>
+              <a:t> Structures </a:t>
             </a:r>
             <a:endParaRPr lang="en-IE" dirty="0"/>
           </a:p>
@@ -22060,7 +22060,7 @@
         </p:nvSpPr>
         <p:spPr>
           <a:xfrm>
-            <a:off x="6096000" y="1524000"/>
+            <a:off x="5922724" y="1523999"/>
             <a:ext cx="4454047" cy="3809999"/>
           </a:xfrm>
           <a:prstGeom prst="rect">
@@ -22320,7 +22320,7 @@
           <a:p>
             <a:r>
               <a:rPr lang="en-US" dirty="0"/>
-              <a:t>How easy can a person identify the pattern of the algorithm to use for a question.</a:t>
+              <a:t>How easily can a person identify which algorithmic pattern to apply to a question.</a:t>
             </a:r>
           </a:p>
           <a:p>
@@ -22652,6 +22652,276 @@
           </a:prstGeom>
         </p:spPr>
       </p:pic>
+      <p:graphicFrame>
+        <p:nvGraphicFramePr>
+          <p:cNvPr id="4" name="Table 3">
+            <a:extLst>
+              <a:ext uri="{FF2B5EF4-FFF2-40B4-BE49-F238E27FC236}">
+                <a16:creationId xmlns:a16="http://schemas.microsoft.com/office/drawing/2014/main" id="{40445462-2E50-4BF0-AD31-07AF04B9D0BA}"/>
+              </a:ext>
+            </a:extLst>
+          </p:cNvPr>
+          <p:cNvGraphicFramePr>
+            <a:graphicFrameLocks noGrp="1"/>
+          </p:cNvGraphicFramePr>
+          <p:nvPr>
+            <p:extLst>
+              <p:ext uri="{D42A27DB-BD31-4B8C-83A1-F6EECF244321}">
+                <p14:modId xmlns:p14="http://schemas.microsoft.com/office/powerpoint/2010/main" val="554706290"/>
+              </p:ext>
+            </p:extLst>
+          </p:nvPr>
+        </p:nvGraphicFramePr>
+        <p:xfrm>
+          <a:off x="6096000" y="4254906"/>
+          <a:ext cx="5021133" cy="1849120"/>
+        </p:xfrm>
+        <a:graphic>
+          <a:graphicData uri="http://schemas.openxmlformats.org/drawingml/2006/table">
+            <a:tbl>
+              <a:tblPr firstRow="1" bandRow="1">
+                <a:tableStyleId>{BC89EF96-8CEA-46FF-86C4-4CE0E7609802}</a:tableStyleId>
+              </a:tblPr>
+              <a:tblGrid>
+                <a:gridCol w="2513146">
+                  <a:extLst>
+                    <a:ext uri="{9D8B030D-6E8A-4147-A177-3AD203B41FA5}">
+                      <a16:colId xmlns:a16="http://schemas.microsoft.com/office/drawing/2014/main" val="3965407158"/>
+                    </a:ext>
+                  </a:extLst>
+                </a:gridCol>
+                <a:gridCol w="2507987">
+                  <a:extLst>
+                    <a:ext uri="{9D8B030D-6E8A-4147-A177-3AD203B41FA5}">
+                      <a16:colId xmlns:a16="http://schemas.microsoft.com/office/drawing/2014/main" val="2551764477"/>
+                    </a:ext>
+                  </a:extLst>
+                </a:gridCol>
+              </a:tblGrid>
+              <a:tr h="217693">
+                <a:tc gridSpan="2">
+                  <a:txBody>
+                    <a:bodyPr/>
+                    <a:lstStyle/>
+                    <a:p>
+                      <a:pPr algn="ctr"/>
+                      <a:r>
+                        <a:rPr lang="en-IE" dirty="0"/>
+                        <a:t>Algorithms</a:t>
+                      </a:r>
+                    </a:p>
+                  </a:txBody>
+                  <a:tcPr>
+                    <a:lnL w="12700" cap="flat" cmpd="sng" algn="ctr">
+                      <a:solidFill>
+                        <a:schemeClr val="tx1"/>
+                      </a:solidFill>
+                      <a:prstDash val="solid"/>
+                      <a:round/>
+                      <a:headEnd type="none" w="med" len="med"/>
+                      <a:tailEnd type="none" w="med" len="med"/>
+                    </a:lnL>
+                  </a:tcPr>
+                </a:tc>
+                <a:tc hMerge="1">
+                  <a:txBody>
+                    <a:bodyPr/>
+                    <a:lstStyle/>
+                    <a:p>
+                      <a:endParaRPr lang="en-IE" dirty="0"/>
+                    </a:p>
+                  </a:txBody>
+                  <a:tcPr>
+                    <a:lnL w="12700" cap="flat" cmpd="sng" algn="ctr">
+                      <a:solidFill>
+                        <a:schemeClr val="tx1"/>
+                      </a:solidFill>
+                      <a:prstDash val="solid"/>
+                      <a:round/>
+                      <a:headEnd type="none" w="med" len="med"/>
+                      <a:tailEnd type="none" w="med" len="med"/>
+                    </a:lnL>
+                  </a:tcPr>
+                </a:tc>
+                <a:extLst>
+                  <a:ext uri="{0D108BD9-81ED-4DB2-BD59-A6C34878D82A}">
+                    <a16:rowId xmlns:a16="http://schemas.microsoft.com/office/drawing/2014/main" val="478065654"/>
+                  </a:ext>
+                </a:extLst>
+              </a:tr>
+              <a:tr h="370840">
+                <a:tc>
+                  <a:txBody>
+                    <a:bodyPr/>
+                    <a:lstStyle/>
+                    <a:p>
+                      <a:r>
+                        <a:rPr lang="en-IE" dirty="0"/>
+                        <a:t>Palindrome</a:t>
+                      </a:r>
+                    </a:p>
+                  </a:txBody>
+                  <a:tcPr>
+                    <a:lnL w="12700" cap="flat" cmpd="sng" algn="ctr">
+                      <a:solidFill>
+                        <a:schemeClr val="tx1"/>
+                      </a:solidFill>
+                      <a:prstDash val="solid"/>
+                      <a:round/>
+                      <a:headEnd type="none" w="med" len="med"/>
+                      <a:tailEnd type="none" w="med" len="med"/>
+                    </a:lnL>
+                  </a:tcPr>
+                </a:tc>
+                <a:tc>
+                  <a:txBody>
+                    <a:bodyPr/>
+                    <a:lstStyle/>
+                    <a:p>
+                      <a:r>
+                        <a:rPr lang="en-IE" dirty="0"/>
+                        <a:t>Merge Sort</a:t>
+                      </a:r>
+                    </a:p>
+                  </a:txBody>
+                  <a:tcPr/>
+                </a:tc>
+                <a:extLst>
+                  <a:ext uri="{0D108BD9-81ED-4DB2-BD59-A6C34878D82A}">
+                    <a16:rowId xmlns:a16="http://schemas.microsoft.com/office/drawing/2014/main" val="586004726"/>
+                  </a:ext>
+                </a:extLst>
+              </a:tr>
+              <a:tr h="370840">
+                <a:tc>
+                  <a:txBody>
+                    <a:bodyPr/>
+                    <a:lstStyle/>
+                    <a:p>
+                      <a:r>
+                        <a:rPr lang="en-IE" dirty="0"/>
+                        <a:t>Binary Search</a:t>
+                      </a:r>
+                    </a:p>
+                  </a:txBody>
+                  <a:tcPr>
+                    <a:lnL w="12700" cap="flat" cmpd="sng" algn="ctr">
+                      <a:solidFill>
+                        <a:schemeClr val="tx1"/>
+                      </a:solidFill>
+                      <a:prstDash val="solid"/>
+                      <a:round/>
+                      <a:headEnd type="none" w="med" len="med"/>
+                      <a:tailEnd type="none" w="med" len="med"/>
+                    </a:lnL>
+                  </a:tcPr>
+                </a:tc>
+                <a:tc>
+                  <a:txBody>
+                    <a:bodyPr/>
+                    <a:lstStyle/>
+                    <a:p>
+                      <a:r>
+                        <a:rPr lang="en-IE" dirty="0"/>
+                        <a:t>Tree Traversal</a:t>
+                      </a:r>
+                    </a:p>
+                  </a:txBody>
+                  <a:tcPr/>
+                </a:tc>
+                <a:extLst>
+                  <a:ext uri="{0D108BD9-81ED-4DB2-BD59-A6C34878D82A}">
+                    <a16:rowId xmlns:a16="http://schemas.microsoft.com/office/drawing/2014/main" val="3567618768"/>
+                  </a:ext>
+                </a:extLst>
+              </a:tr>
+              <a:tr h="370840">
+                <a:tc>
+                  <a:txBody>
+                    <a:bodyPr/>
+                    <a:lstStyle/>
+                    <a:p>
+                      <a:r>
+                        <a:rPr lang="en-IE" dirty="0"/>
+                        <a:t>Breadth-First Search</a:t>
+                      </a:r>
+                    </a:p>
+                  </a:txBody>
+                  <a:tcPr>
+                    <a:lnL w="12700" cap="flat" cmpd="sng" algn="ctr">
+                      <a:solidFill>
+                        <a:schemeClr val="tx1"/>
+                      </a:solidFill>
+                      <a:prstDash val="solid"/>
+                      <a:round/>
+                      <a:headEnd type="none" w="med" len="med"/>
+                      <a:tailEnd type="none" w="med" len="med"/>
+                    </a:lnL>
+                  </a:tcPr>
+                </a:tc>
+                <a:tc>
+                  <a:txBody>
+                    <a:bodyPr/>
+                    <a:lstStyle/>
+                    <a:p>
+                      <a:r>
+                        <a:rPr lang="en-IE" dirty="0"/>
+                        <a:t>Depth-First Search</a:t>
+                      </a:r>
+                    </a:p>
+                  </a:txBody>
+                  <a:tcPr/>
+                </a:tc>
+                <a:extLst>
+                  <a:ext uri="{0D108BD9-81ED-4DB2-BD59-A6C34878D82A}">
+                    <a16:rowId xmlns:a16="http://schemas.microsoft.com/office/drawing/2014/main" val="3129771711"/>
+                  </a:ext>
+                </a:extLst>
+              </a:tr>
+              <a:tr h="370840">
+                <a:tc>
+                  <a:txBody>
+                    <a:bodyPr/>
+                    <a:lstStyle/>
+                    <a:p>
+                      <a:r>
+                        <a:rPr lang="en-IE" dirty="0"/>
+                        <a:t>Dynamic Programming</a:t>
+                      </a:r>
+                    </a:p>
+                  </a:txBody>
+                  <a:tcPr>
+                    <a:lnL w="12700" cap="flat" cmpd="sng" algn="ctr">
+                      <a:solidFill>
+                        <a:schemeClr val="tx1"/>
+                      </a:solidFill>
+                      <a:prstDash val="solid"/>
+                      <a:round/>
+                      <a:headEnd type="none" w="med" len="med"/>
+                      <a:tailEnd type="none" w="med" len="med"/>
+                    </a:lnL>
+                  </a:tcPr>
+                </a:tc>
+                <a:tc>
+                  <a:txBody>
+                    <a:bodyPr/>
+                    <a:lstStyle/>
+                    <a:p>
+                      <a:endParaRPr lang="en-IE" dirty="0"/>
+                    </a:p>
+                  </a:txBody>
+                  <a:tcPr/>
+                </a:tc>
+                <a:extLst>
+                  <a:ext uri="{0D108BD9-81ED-4DB2-BD59-A6C34878D82A}">
+                    <a16:rowId xmlns:a16="http://schemas.microsoft.com/office/drawing/2014/main" val="61501767"/>
+                  </a:ext>
+                </a:extLst>
+              </a:tr>
+            </a:tbl>
+          </a:graphicData>
+        </a:graphic>
+      </p:graphicFrame>
     </p:spTree>
     <p:extLst>
       <p:ext uri="{BB962C8B-B14F-4D97-AF65-F5344CB8AC3E}">
@@ -22850,7 +23120,7 @@
         </p:blipFill>
         <p:spPr>
           <a:xfrm>
-            <a:off x="7356171" y="3521072"/>
+            <a:off x="5162550" y="3630610"/>
             <a:ext cx="4495800" cy="2486025"/>
           </a:xfrm>
           <a:prstGeom prst="rect">
@@ -23110,7 +23380,7 @@
             <p:ph sz="half" idx="2"/>
             <p:extLst>
               <p:ext uri="{D42A27DB-BD31-4B8C-83A1-F6EECF244321}">
-                <p14:modId xmlns:p14="http://schemas.microsoft.com/office/powerpoint/2010/main" val="995048311"/>
+                <p14:modId xmlns:p14="http://schemas.microsoft.com/office/powerpoint/2010/main" val="3749858720"/>
               </p:ext>
             </p:extLst>
           </p:nvPr>
@@ -23140,7 +23410,7 @@
           <p:nvPr>
             <p:extLst>
               <p:ext uri="{D42A27DB-BD31-4B8C-83A1-F6EECF244321}">
-                <p14:modId xmlns:p14="http://schemas.microsoft.com/office/powerpoint/2010/main" val="3027857231"/>
+                <p14:modId xmlns:p14="http://schemas.microsoft.com/office/powerpoint/2010/main" val="3682360989"/>
               </p:ext>
             </p:extLst>
           </p:nvPr>

</xml_diff>

<commit_message>
Added in contents for all slides now
</commit_message>
<xml_diff>
--- a/presentation/New Thesis Presentation.pptx
+++ b/presentation/New Thesis Presentation.pptx
@@ -17,7 +17,7 @@
     <p:sldId id="262" r:id="rId5"/>
     <p:sldId id="263" r:id="rId6"/>
     <p:sldId id="264" r:id="rId7"/>
-    <p:sldId id="265" r:id="rId8"/>
+    <p:sldId id="273" r:id="rId8"/>
     <p:sldId id="266" r:id="rId9"/>
     <p:sldId id="272" r:id="rId10"/>
     <p:sldId id="271" r:id="rId11"/>
@@ -150,11 +150,7 @@
         <p14:section name="Methodology" id="{68B5FE72-28C3-4FC2-9103-7D3861B07DC9}">
           <p14:sldIdLst>
             <p14:sldId id="264"/>
-          </p14:sldIdLst>
-        </p14:section>
-        <p14:section name="Software Problems" id="{F05FFA77-A518-42B9-97EC-3D8BDEC2B7D1}">
-          <p14:sldIdLst>
-            <p14:sldId id="265"/>
+            <p14:sldId id="273"/>
           </p14:sldIdLst>
         </p14:section>
         <p14:section name="Results" id="{57C4D59E-E16A-4749-A106-7DE7A07CCEF6}">
@@ -3506,15 +3502,15 @@
       </dgm:t>
     </dgm:pt>
     <dgm:pt modelId="{A6406C01-7E83-4650-8EF5-394419DCB348}">
-      <dgm:prSet phldrT="[Text]"/>
+      <dgm:prSet phldrT="[Text]" custT="1"/>
       <dgm:spPr/>
       <dgm:t>
         <a:bodyPr/>
         <a:lstStyle/>
         <a:p>
           <a:r>
-            <a:rPr lang="en-US" dirty="0"/>
-            <a:t>Step 1 Title</a:t>
+            <a:rPr lang="en-US" sz="1400" dirty="0"/>
+            <a:t>1.Judge pattern</a:t>
           </a:r>
         </a:p>
       </dgm:t>
@@ -3555,7 +3551,7 @@
         <a:p>
           <a:r>
             <a:rPr lang="en-US" dirty="0"/>
-            <a:t>Task description</a:t>
+            <a:t>Take a moment to find which pattern suits the question.</a:t>
           </a:r>
         </a:p>
       </dgm:t>
@@ -3588,15 +3584,15 @@
       </dgm:t>
     </dgm:pt>
     <dgm:pt modelId="{5D952622-A79E-41E4-BBC2-6212DEFFA91C}">
-      <dgm:prSet phldrT="[Text]"/>
+      <dgm:prSet phldrT="[Text]" custT="1"/>
       <dgm:spPr/>
       <dgm:t>
         <a:bodyPr/>
         <a:lstStyle/>
         <a:p>
           <a:r>
-            <a:rPr lang="en-US" dirty="0"/>
-            <a:t>Step 2 Title</a:t>
+            <a:rPr lang="en-US" sz="1400" dirty="0"/>
+            <a:t>2.Solve</a:t>
           </a:r>
         </a:p>
       </dgm:t>
@@ -3628,7 +3624,7 @@
         </a:p>
       </dgm:t>
     </dgm:pt>
-    <dgm:pt modelId="{5248D9DA-6444-46F6-8D28-C8BB2253AAD1}">
+    <dgm:pt modelId="{4D81F10E-EC5A-4E19-86A9-E1EC9E8FE7EE}">
       <dgm:prSet phldrT="[Text]"/>
       <dgm:spPr/>
       <dgm:t>
@@ -3637,7 +3633,7 @@
         <a:p>
           <a:r>
             <a:rPr lang="en-US" dirty="0"/>
-            <a:t>Task description</a:t>
+            <a:t>Use the pattern to solve the question.</a:t>
           </a:r>
         </a:p>
       </dgm:t>
@@ -3647,29 +3643,70 @@
         </a:ext>
       </dgm:extLst>
     </dgm:pt>
-    <dgm:pt modelId="{A8533F77-F094-4EDB-BCC7-35E0D6A46B71}" type="parTrans" cxnId="{35AF286C-A401-4C08-B8A3-F38B03322BD8}">
+    <dgm:pt modelId="{DDB61D46-FD93-4FEA-8F78-A90D117CFC55}" type="parTrans" cxnId="{A0509747-4D7D-4B79-8B80-8C33FC5AED50}">
       <dgm:prSet/>
       <dgm:spPr/>
       <dgm:t>
         <a:bodyPr/>
         <a:lstStyle/>
         <a:p>
-          <a:endParaRPr lang="en-US"/>
+          <a:endParaRPr lang="en-IE"/>
         </a:p>
       </dgm:t>
     </dgm:pt>
-    <dgm:pt modelId="{011B552E-515A-4C41-B810-0D2552861422}" type="sibTrans" cxnId="{35AF286C-A401-4C08-B8A3-F38B03322BD8}">
+    <dgm:pt modelId="{E5D817EA-A609-46B8-86CA-0F5A4499E6D0}" type="sibTrans" cxnId="{A0509747-4D7D-4B79-8B80-8C33FC5AED50}">
       <dgm:prSet/>
       <dgm:spPr/>
       <dgm:t>
         <a:bodyPr/>
         <a:lstStyle/>
         <a:p>
-          <a:endParaRPr lang="en-US"/>
+          <a:endParaRPr lang="en-IE"/>
         </a:p>
       </dgm:t>
     </dgm:pt>
-    <dgm:pt modelId="{50706FFE-8A00-485D-9FF7-8D310692C602}">
+    <dgm:pt modelId="{C52F0273-7772-4791-A6F2-7BB5F0272993}">
+      <dgm:prSet phldrT="[Text]" custT="1"/>
+      <dgm:spPr/>
+      <dgm:t>
+        <a:bodyPr/>
+        <a:lstStyle/>
+        <a:p>
+          <a:r>
+            <a:rPr lang="en-US" sz="1400" dirty="0"/>
+            <a:t>3.Compare</a:t>
+          </a:r>
+        </a:p>
+      </dgm:t>
+      <dgm:extLst>
+        <a:ext uri="{E40237B7-FDA0-4F09-8148-C483321AD2D9}">
+          <dgm14:cNvPr xmlns:dgm14="http://schemas.microsoft.com/office/drawing/2010/diagram" id="0" name="" title="Step 2 - task description"/>
+        </a:ext>
+      </dgm:extLst>
+    </dgm:pt>
+    <dgm:pt modelId="{63E4A569-BCF5-411F-9F52-2A5CD259630A}" type="parTrans" cxnId="{E0E61378-68AB-4BEB-B2AB-B75E2C8D656B}">
+      <dgm:prSet/>
+      <dgm:spPr/>
+      <dgm:t>
+        <a:bodyPr/>
+        <a:lstStyle/>
+        <a:p>
+          <a:endParaRPr lang="en-IE"/>
+        </a:p>
+      </dgm:t>
+    </dgm:pt>
+    <dgm:pt modelId="{3D3FC60A-EF73-473C-80C3-C83C89B3FC7D}" type="sibTrans" cxnId="{E0E61378-68AB-4BEB-B2AB-B75E2C8D656B}">
+      <dgm:prSet/>
+      <dgm:spPr/>
+      <dgm:t>
+        <a:bodyPr/>
+        <a:lstStyle/>
+        <a:p>
+          <a:endParaRPr lang="en-IE"/>
+        </a:p>
+      </dgm:t>
+    </dgm:pt>
+    <dgm:pt modelId="{A838ED4D-D83E-4164-A021-BD960464C6F4}">
       <dgm:prSet phldrT="[Text]"/>
       <dgm:spPr/>
       <dgm:t>
@@ -3678,76 +3715,35 @@
         <a:p>
           <a:r>
             <a:rPr lang="en-US" dirty="0"/>
-            <a:t>Step 3 Title</a:t>
+            <a:t>Compare Control Flow Graphs.</a:t>
           </a:r>
         </a:p>
       </dgm:t>
       <dgm:extLst>
         <a:ext uri="{E40237B7-FDA0-4F09-8148-C483321AD2D9}">
-          <dgm14:cNvPr xmlns:dgm14="http://schemas.microsoft.com/office/drawing/2010/diagram" id="0" name="" title="Step 3 title"/>
+          <dgm14:cNvPr xmlns:dgm14="http://schemas.microsoft.com/office/drawing/2010/diagram" id="0" name="" title="Step 2 - task description"/>
         </a:ext>
       </dgm:extLst>
     </dgm:pt>
-    <dgm:pt modelId="{EF44BD91-19A4-424B-BA32-4A5492B6E40B}" type="parTrans" cxnId="{7599CECE-5293-4C57-A979-D096C99254C7}">
+    <dgm:pt modelId="{F242E185-648F-4934-8358-9ED9DBF93A25}" type="parTrans" cxnId="{AE161ECE-B837-460C-AD62-BBACEED6E0FB}">
       <dgm:prSet/>
       <dgm:spPr/>
       <dgm:t>
         <a:bodyPr/>
         <a:lstStyle/>
         <a:p>
-          <a:endParaRPr lang="en-US"/>
+          <a:endParaRPr lang="en-IE"/>
         </a:p>
       </dgm:t>
     </dgm:pt>
-    <dgm:pt modelId="{CD03DFF4-D962-46D6-AFFA-2A87FD08403E}" type="sibTrans" cxnId="{7599CECE-5293-4C57-A979-D096C99254C7}">
+    <dgm:pt modelId="{4AC57226-A52F-47FE-A11F-18E943D58644}" type="sibTrans" cxnId="{AE161ECE-B837-460C-AD62-BBACEED6E0FB}">
       <dgm:prSet/>
       <dgm:spPr/>
       <dgm:t>
         <a:bodyPr/>
         <a:lstStyle/>
         <a:p>
-          <a:endParaRPr lang="en-US"/>
-        </a:p>
-      </dgm:t>
-    </dgm:pt>
-    <dgm:pt modelId="{3A9B5D84-CB00-4BC9-ADB2-5CF832F36763}">
-      <dgm:prSet phldrT="[Text]"/>
-      <dgm:spPr/>
-      <dgm:t>
-        <a:bodyPr/>
-        <a:lstStyle/>
-        <a:p>
-          <a:r>
-            <a:rPr lang="en-US" dirty="0"/>
-            <a:t>Task description</a:t>
-          </a:r>
-        </a:p>
-      </dgm:t>
-      <dgm:extLst>
-        <a:ext uri="{E40237B7-FDA0-4F09-8148-C483321AD2D9}">
-          <dgm14:cNvPr xmlns:dgm14="http://schemas.microsoft.com/office/drawing/2010/diagram" id="0" name="" title="Step 3 - task description"/>
-        </a:ext>
-      </dgm:extLst>
-    </dgm:pt>
-    <dgm:pt modelId="{BD57EC4A-052D-4824-8820-064BAC997A9B}" type="parTrans" cxnId="{11A0AF47-4BCA-470E-92BF-7B388FFB0DE8}">
-      <dgm:prSet/>
-      <dgm:spPr/>
-      <dgm:t>
-        <a:bodyPr/>
-        <a:lstStyle/>
-        <a:p>
-          <a:endParaRPr lang="en-US"/>
-        </a:p>
-      </dgm:t>
-    </dgm:pt>
-    <dgm:pt modelId="{98E878CF-4A49-4E76-BD23-AE7C5290BAFD}" type="sibTrans" cxnId="{11A0AF47-4BCA-470E-92BF-7B388FFB0DE8}">
-      <dgm:prSet/>
-      <dgm:spPr/>
-      <dgm:t>
-        <a:bodyPr/>
-        <a:lstStyle/>
-        <a:p>
-          <a:endParaRPr lang="en-US"/>
+          <a:endParaRPr lang="en-IE"/>
         </a:p>
       </dgm:t>
     </dgm:pt>
@@ -3827,28 +3823,28 @@
       <dgm:prSet presAssocID="{5D952622-A79E-41E4-BBC2-6212DEFFA91C}" presName="aSpace" presStyleCnt="0"/>
       <dgm:spPr/>
     </dgm:pt>
-    <dgm:pt modelId="{E8F3A685-8F9F-4BAC-8C8B-A1DE5AA41F3A}" type="pres">
-      <dgm:prSet presAssocID="{50706FFE-8A00-485D-9FF7-8D310692C602}" presName="compNode" presStyleCnt="0"/>
+    <dgm:pt modelId="{6D79BFDD-A668-4332-A6A3-3C223F866246}" type="pres">
+      <dgm:prSet presAssocID="{C52F0273-7772-4791-A6F2-7BB5F0272993}" presName="compNode" presStyleCnt="0"/>
       <dgm:spPr/>
     </dgm:pt>
-    <dgm:pt modelId="{84BFA617-6CAF-4DA9-A086-82BCA61093BE}" type="pres">
-      <dgm:prSet presAssocID="{50706FFE-8A00-485D-9FF7-8D310692C602}" presName="noGeometry" presStyleCnt="0"/>
+    <dgm:pt modelId="{E95792D7-6D31-4754-87FE-7E8A06967568}" type="pres">
+      <dgm:prSet presAssocID="{C52F0273-7772-4791-A6F2-7BB5F0272993}" presName="noGeometry" presStyleCnt="0"/>
       <dgm:spPr/>
     </dgm:pt>
-    <dgm:pt modelId="{4BF699B1-BE15-42D1-9784-AA33CF29870E}" type="pres">
-      <dgm:prSet presAssocID="{50706FFE-8A00-485D-9FF7-8D310692C602}" presName="childTextVisible" presStyleLbl="bgAccFollowNode1" presStyleIdx="2" presStyleCnt="3">
+    <dgm:pt modelId="{6E145DEC-2848-4448-9465-8BB01E14F3F8}" type="pres">
+      <dgm:prSet presAssocID="{C52F0273-7772-4791-A6F2-7BB5F0272993}" presName="childTextVisible" presStyleLbl="bgAccFollowNode1" presStyleIdx="2" presStyleCnt="3">
         <dgm:presLayoutVars>
           <dgm:bulletEnabled val="1"/>
         </dgm:presLayoutVars>
       </dgm:prSet>
       <dgm:spPr/>
     </dgm:pt>
-    <dgm:pt modelId="{F0925EF4-86E2-4748-BA70-94AAF55AB064}" type="pres">
-      <dgm:prSet presAssocID="{50706FFE-8A00-485D-9FF7-8D310692C602}" presName="childTextHidden" presStyleLbl="bgAccFollowNode1" presStyleIdx="2" presStyleCnt="3"/>
+    <dgm:pt modelId="{D072D9E0-6C7E-48DD-AB18-CBBAA19C0074}" type="pres">
+      <dgm:prSet presAssocID="{C52F0273-7772-4791-A6F2-7BB5F0272993}" presName="childTextHidden" presStyleLbl="bgAccFollowNode1" presStyleIdx="2" presStyleCnt="3"/>
       <dgm:spPr/>
     </dgm:pt>
-    <dgm:pt modelId="{78E9A4E4-18A9-4B73-8007-A63A71C71937}" type="pres">
-      <dgm:prSet presAssocID="{50706FFE-8A00-485D-9FF7-8D310692C602}" presName="parentText" presStyleLbl="node1" presStyleIdx="2" presStyleCnt="3">
+    <dgm:pt modelId="{E78312BB-2607-4A05-B057-C99ACE75C09C}" type="pres">
+      <dgm:prSet presAssocID="{C52F0273-7772-4791-A6F2-7BB5F0272993}" presName="parentText" presStyleLbl="node1" presStyleIdx="2" presStyleCnt="3">
         <dgm:presLayoutVars>
           <dgm:chMax val="1"/>
           <dgm:bulletEnabled val="1"/>
@@ -3860,20 +3856,20 @@
   <dgm:cxnLst>
     <dgm:cxn modelId="{99E34304-5770-4691-A3EE-6A7C8B9ACD53}" type="presOf" srcId="{E4E9F0D0-FF23-4B59-9B97-973BCBE5DC65}" destId="{610B5FFC-C0C9-444C-9F7A-14D1B54F604D}" srcOrd="0" destOrd="0" presId="urn:microsoft.com/office/officeart/2005/8/layout/hProcess6"/>
     <dgm:cxn modelId="{81ACEA16-295B-4802-A889-1DC375F525AB}" type="presOf" srcId="{A6406C01-7E83-4650-8EF5-394419DCB348}" destId="{47DA5750-48DC-4E4F-815D-0B05DBC30DAB}" srcOrd="0" destOrd="0" presId="urn:microsoft.com/office/officeart/2005/8/layout/hProcess6"/>
+    <dgm:cxn modelId="{0422B620-B5A9-490F-B07F-1DD5C2D2B78A}" type="presOf" srcId="{A838ED4D-D83E-4164-A021-BD960464C6F4}" destId="{6E145DEC-2848-4448-9465-8BB01E14F3F8}" srcOrd="0" destOrd="0" presId="urn:microsoft.com/office/officeart/2005/8/layout/hProcess6"/>
     <dgm:cxn modelId="{130B0544-2388-4104-A721-8D29E7C77420}" type="presOf" srcId="{5D952622-A79E-41E4-BBC2-6212DEFFA91C}" destId="{EE8733A1-7662-4D0A-B39E-2218596CC81C}" srcOrd="0" destOrd="0" presId="urn:microsoft.com/office/officeart/2005/8/layout/hProcess6"/>
     <dgm:cxn modelId="{31498E67-CEA0-4571-B7AB-26A2113144F6}" type="presOf" srcId="{FBA29113-7A70-4E0E-B036-871C49B835F1}" destId="{8734DFB3-ADD8-4FD2-87D8-1981AA0ADD0B}" srcOrd="0" destOrd="0" presId="urn:microsoft.com/office/officeart/2005/8/layout/hProcess6"/>
-    <dgm:cxn modelId="{11A0AF47-4BCA-470E-92BF-7B388FFB0DE8}" srcId="{50706FFE-8A00-485D-9FF7-8D310692C602}" destId="{3A9B5D84-CB00-4BC9-ADB2-5CF832F36763}" srcOrd="0" destOrd="0" parTransId="{BD57EC4A-052D-4824-8820-064BAC997A9B}" sibTransId="{98E878CF-4A49-4E76-BD23-AE7C5290BAFD}"/>
+    <dgm:cxn modelId="{A0509747-4D7D-4B79-8B80-8C33FC5AED50}" srcId="{5D952622-A79E-41E4-BBC2-6212DEFFA91C}" destId="{4D81F10E-EC5A-4E19-86A9-E1EC9E8FE7EE}" srcOrd="0" destOrd="0" parTransId="{DDB61D46-FD93-4FEA-8F78-A90D117CFC55}" sibTransId="{E5D817EA-A609-46B8-86CA-0F5A4499E6D0}"/>
     <dgm:cxn modelId="{019AA969-1A2B-48C0-B7C9-005E817BC2CB}" type="presOf" srcId="{E4E9F0D0-FF23-4B59-9B97-973BCBE5DC65}" destId="{FB705FC1-639E-4064-8E9A-A79870DE5273}" srcOrd="1" destOrd="0" presId="urn:microsoft.com/office/officeart/2005/8/layout/hProcess6"/>
-    <dgm:cxn modelId="{35AF286C-A401-4C08-B8A3-F38B03322BD8}" srcId="{5D952622-A79E-41E4-BBC2-6212DEFFA91C}" destId="{5248D9DA-6444-46F6-8D28-C8BB2253AAD1}" srcOrd="0" destOrd="0" parTransId="{A8533F77-F094-4EDB-BCC7-35E0D6A46B71}" sibTransId="{011B552E-515A-4C41-B810-0D2552861422}"/>
-    <dgm:cxn modelId="{F36BB86E-E9BB-4DBF-9DFE-F8050046ED1F}" type="presOf" srcId="{3A9B5D84-CB00-4BC9-ADB2-5CF832F36763}" destId="{4BF699B1-BE15-42D1-9784-AA33CF29870E}" srcOrd="0" destOrd="0" presId="urn:microsoft.com/office/officeart/2005/8/layout/hProcess6"/>
-    <dgm:cxn modelId="{BA539253-48E3-447C-8770-C31D10399C4A}" type="presOf" srcId="{50706FFE-8A00-485D-9FF7-8D310692C602}" destId="{78E9A4E4-18A9-4B73-8007-A63A71C71937}" srcOrd="0" destOrd="0" presId="urn:microsoft.com/office/officeart/2005/8/layout/hProcess6"/>
-    <dgm:cxn modelId="{D2E26D7D-A939-4166-987B-3E9E5A080266}" type="presOf" srcId="{3A9B5D84-CB00-4BC9-ADB2-5CF832F36763}" destId="{F0925EF4-86E2-4748-BA70-94AAF55AB064}" srcOrd="1" destOrd="0" presId="urn:microsoft.com/office/officeart/2005/8/layout/hProcess6"/>
+    <dgm:cxn modelId="{E0E61378-68AB-4BEB-B2AB-B75E2C8D656B}" srcId="{FBA29113-7A70-4E0E-B036-871C49B835F1}" destId="{C52F0273-7772-4791-A6F2-7BB5F0272993}" srcOrd="2" destOrd="0" parTransId="{63E4A569-BCF5-411F-9F52-2A5CD259630A}" sibTransId="{3D3FC60A-EF73-473C-80C3-C83C89B3FC7D}"/>
+    <dgm:cxn modelId="{742BC37D-EEB5-4C90-B879-2E4F9952824C}" type="presOf" srcId="{4D81F10E-EC5A-4E19-86A9-E1EC9E8FE7EE}" destId="{00D2DC2C-7CA2-4A4B-B66D-3DDCAB7DC8E9}" srcOrd="0" destOrd="0" presId="urn:microsoft.com/office/officeart/2005/8/layout/hProcess6"/>
+    <dgm:cxn modelId="{7BDF6B84-96DD-47E7-80F2-F058E17268DE}" type="presOf" srcId="{A838ED4D-D83E-4164-A021-BD960464C6F4}" destId="{D072D9E0-6C7E-48DD-AB18-CBBAA19C0074}" srcOrd="1" destOrd="0" presId="urn:microsoft.com/office/officeart/2005/8/layout/hProcess6"/>
     <dgm:cxn modelId="{4D956F8D-5727-488A-93AF-F33602655A44}" srcId="{FBA29113-7A70-4E0E-B036-871C49B835F1}" destId="{A6406C01-7E83-4650-8EF5-394419DCB348}" srcOrd="0" destOrd="0" parTransId="{2586B3BB-DA8B-42DF-AC9A-77CE21607FD0}" sibTransId="{7C5B61F0-A4F6-4FCA-B552-36151F31051E}"/>
     <dgm:cxn modelId="{37A3A996-9723-4BDB-8959-9D9B7799BD9A}" srcId="{A6406C01-7E83-4650-8EF5-394419DCB348}" destId="{E4E9F0D0-FF23-4B59-9B97-973BCBE5DC65}" srcOrd="0" destOrd="0" parTransId="{E9237435-F938-45D4-8BF4-6D5D4DFF850F}" sibTransId="{D32B195A-7CAD-474B-B79C-BE4BB171E742}"/>
-    <dgm:cxn modelId="{E23D729A-C2FC-40CD-8A08-F5EBB66CF80B}" type="presOf" srcId="{5248D9DA-6444-46F6-8D28-C8BB2253AAD1}" destId="{072FB640-0A28-40E8-9C0C-86BAF45C6EF0}" srcOrd="1" destOrd="0" presId="urn:microsoft.com/office/officeart/2005/8/layout/hProcess6"/>
     <dgm:cxn modelId="{A22BDB9A-90BB-4DA2-8850-00D4F1D3B898}" srcId="{FBA29113-7A70-4E0E-B036-871C49B835F1}" destId="{5D952622-A79E-41E4-BBC2-6212DEFFA91C}" srcOrd="1" destOrd="0" parTransId="{10627A68-BE4B-4A4A-9EC9-4CFEF1E4DF39}" sibTransId="{092BAEF3-D9F2-476B-9A0B-6F14CC814529}"/>
-    <dgm:cxn modelId="{AE4FA1B2-1FFD-4999-BFB4-0E2A9E4BEBBB}" type="presOf" srcId="{5248D9DA-6444-46F6-8D28-C8BB2253AAD1}" destId="{00D2DC2C-7CA2-4A4B-B66D-3DDCAB7DC8E9}" srcOrd="0" destOrd="0" presId="urn:microsoft.com/office/officeart/2005/8/layout/hProcess6"/>
-    <dgm:cxn modelId="{7599CECE-5293-4C57-A979-D096C99254C7}" srcId="{FBA29113-7A70-4E0E-B036-871C49B835F1}" destId="{50706FFE-8A00-485D-9FF7-8D310692C602}" srcOrd="2" destOrd="0" parTransId="{EF44BD91-19A4-424B-BA32-4A5492B6E40B}" sibTransId="{CD03DFF4-D962-46D6-AFFA-2A87FD08403E}"/>
+    <dgm:cxn modelId="{79188EAA-F069-453D-BD08-CD75C48059AE}" type="presOf" srcId="{4D81F10E-EC5A-4E19-86A9-E1EC9E8FE7EE}" destId="{072FB640-0A28-40E8-9C0C-86BAF45C6EF0}" srcOrd="1" destOrd="0" presId="urn:microsoft.com/office/officeart/2005/8/layout/hProcess6"/>
+    <dgm:cxn modelId="{AE161ECE-B837-460C-AD62-BBACEED6E0FB}" srcId="{C52F0273-7772-4791-A6F2-7BB5F0272993}" destId="{A838ED4D-D83E-4164-A021-BD960464C6F4}" srcOrd="0" destOrd="0" parTransId="{F242E185-648F-4934-8358-9ED9DBF93A25}" sibTransId="{4AC57226-A52F-47FE-A11F-18E943D58644}"/>
+    <dgm:cxn modelId="{C2D3C6DF-ABCE-4F49-AB33-162124EF407E}" type="presOf" srcId="{C52F0273-7772-4791-A6F2-7BB5F0272993}" destId="{E78312BB-2607-4A05-B057-C99ACE75C09C}" srcOrd="0" destOrd="0" presId="urn:microsoft.com/office/officeart/2005/8/layout/hProcess6"/>
     <dgm:cxn modelId="{FF0D50D3-9477-4407-8F44-B60B9728DED7}" type="presParOf" srcId="{8734DFB3-ADD8-4FD2-87D8-1981AA0ADD0B}" destId="{5C04AEFB-7132-4B28-A7D3-862245070A8D}" srcOrd="0" destOrd="0" presId="urn:microsoft.com/office/officeart/2005/8/layout/hProcess6"/>
     <dgm:cxn modelId="{126CE751-65CF-4E60-902C-2D0B01478834}" type="presParOf" srcId="{5C04AEFB-7132-4B28-A7D3-862245070A8D}" destId="{358F74AC-FC7D-465B-BD12-B6CCC00F3D29}" srcOrd="0" destOrd="0" presId="urn:microsoft.com/office/officeart/2005/8/layout/hProcess6"/>
     <dgm:cxn modelId="{C6915109-771C-43AE-A4C7-A411D8E5978F}" type="presParOf" srcId="{5C04AEFB-7132-4B28-A7D3-862245070A8D}" destId="{610B5FFC-C0C9-444C-9F7A-14D1B54F604D}" srcOrd="1" destOrd="0" presId="urn:microsoft.com/office/officeart/2005/8/layout/hProcess6"/>
@@ -3886,11 +3882,11 @@
     <dgm:cxn modelId="{F573A08D-1388-4362-9D10-155655876363}" type="presParOf" srcId="{CA708D38-D093-4C16-A955-CF2CAC7F0A99}" destId="{072FB640-0A28-40E8-9C0C-86BAF45C6EF0}" srcOrd="2" destOrd="0" presId="urn:microsoft.com/office/officeart/2005/8/layout/hProcess6"/>
     <dgm:cxn modelId="{7ADF5CCF-F26A-45B5-9692-98B07AFD46A1}" type="presParOf" srcId="{CA708D38-D093-4C16-A955-CF2CAC7F0A99}" destId="{EE8733A1-7662-4D0A-B39E-2218596CC81C}" srcOrd="3" destOrd="0" presId="urn:microsoft.com/office/officeart/2005/8/layout/hProcess6"/>
     <dgm:cxn modelId="{985C18C8-95A3-4479-821C-610A2BAFFFF3}" type="presParOf" srcId="{8734DFB3-ADD8-4FD2-87D8-1981AA0ADD0B}" destId="{E0D7C734-E391-436F-996C-E60442F50A17}" srcOrd="3" destOrd="0" presId="urn:microsoft.com/office/officeart/2005/8/layout/hProcess6"/>
-    <dgm:cxn modelId="{951CD7FA-A9B4-463F-BD0D-452C521FF523}" type="presParOf" srcId="{8734DFB3-ADD8-4FD2-87D8-1981AA0ADD0B}" destId="{E8F3A685-8F9F-4BAC-8C8B-A1DE5AA41F3A}" srcOrd="4" destOrd="0" presId="urn:microsoft.com/office/officeart/2005/8/layout/hProcess6"/>
-    <dgm:cxn modelId="{E08D8862-B273-4AA6-9A90-754366CE4945}" type="presParOf" srcId="{E8F3A685-8F9F-4BAC-8C8B-A1DE5AA41F3A}" destId="{84BFA617-6CAF-4DA9-A086-82BCA61093BE}" srcOrd="0" destOrd="0" presId="urn:microsoft.com/office/officeart/2005/8/layout/hProcess6"/>
-    <dgm:cxn modelId="{69392B4C-2A7B-41A4-A48C-35E312A6434A}" type="presParOf" srcId="{E8F3A685-8F9F-4BAC-8C8B-A1DE5AA41F3A}" destId="{4BF699B1-BE15-42D1-9784-AA33CF29870E}" srcOrd="1" destOrd="0" presId="urn:microsoft.com/office/officeart/2005/8/layout/hProcess6"/>
-    <dgm:cxn modelId="{29F5DEAB-A9C8-47F8-A089-1585C323795A}" type="presParOf" srcId="{E8F3A685-8F9F-4BAC-8C8B-A1DE5AA41F3A}" destId="{F0925EF4-86E2-4748-BA70-94AAF55AB064}" srcOrd="2" destOrd="0" presId="urn:microsoft.com/office/officeart/2005/8/layout/hProcess6"/>
-    <dgm:cxn modelId="{E9A57A1B-DDAF-4905-B46C-246DB5E9FB2A}" type="presParOf" srcId="{E8F3A685-8F9F-4BAC-8C8B-A1DE5AA41F3A}" destId="{78E9A4E4-18A9-4B73-8007-A63A71C71937}" srcOrd="3" destOrd="0" presId="urn:microsoft.com/office/officeart/2005/8/layout/hProcess6"/>
+    <dgm:cxn modelId="{E0BAF798-396E-45AF-A049-DF49EFAC87DA}" type="presParOf" srcId="{8734DFB3-ADD8-4FD2-87D8-1981AA0ADD0B}" destId="{6D79BFDD-A668-4332-A6A3-3C223F866246}" srcOrd="4" destOrd="0" presId="urn:microsoft.com/office/officeart/2005/8/layout/hProcess6"/>
+    <dgm:cxn modelId="{E43AC380-BEFA-4254-8654-3B5F13F82380}" type="presParOf" srcId="{6D79BFDD-A668-4332-A6A3-3C223F866246}" destId="{E95792D7-6D31-4754-87FE-7E8A06967568}" srcOrd="0" destOrd="0" presId="urn:microsoft.com/office/officeart/2005/8/layout/hProcess6"/>
+    <dgm:cxn modelId="{B082B30A-3533-4787-8907-FF10311AAF34}" type="presParOf" srcId="{6D79BFDD-A668-4332-A6A3-3C223F866246}" destId="{6E145DEC-2848-4448-9465-8BB01E14F3F8}" srcOrd="1" destOrd="0" presId="urn:microsoft.com/office/officeart/2005/8/layout/hProcess6"/>
+    <dgm:cxn modelId="{3AE208A7-57F4-4DBB-8951-E4DE9B63D6A1}" type="presParOf" srcId="{6D79BFDD-A668-4332-A6A3-3C223F866246}" destId="{D072D9E0-6C7E-48DD-AB18-CBBAA19C0074}" srcOrd="2" destOrd="0" presId="urn:microsoft.com/office/officeart/2005/8/layout/hProcess6"/>
+    <dgm:cxn modelId="{90ED7CC0-9263-4EA0-A262-436614CA019A}" type="presParOf" srcId="{6D79BFDD-A668-4332-A6A3-3C223F866246}" destId="{E78312BB-2607-4A05-B057-C99ACE75C09C}" srcOrd="3" destOrd="0" presId="urn:microsoft.com/office/officeart/2005/8/layout/hProcess6"/>
   </dgm:cxnLst>
   <dgm:bg/>
   <dgm:whole/>
@@ -3917,8 +3913,8 @@
       </dsp:nvSpPr>
       <dsp:spPr>
         <a:xfrm>
-          <a:off x="623515" y="823134"/>
-          <a:ext cx="2475309" cy="2163731"/>
+          <a:off x="976200" y="0"/>
+          <a:ext cx="2659242" cy="2324513"/>
         </a:xfrm>
         <a:prstGeom prst="rightArrow">
           <a:avLst>
@@ -3964,12 +3960,12 @@
         <a:fontRef idx="minor"/>
       </dsp:style>
       <dsp:txBody>
-        <a:bodyPr spcFirstLastPara="0" vert="horz" wrap="square" lIns="45720" tIns="11430" rIns="22860" bIns="11430" numCol="1" spcCol="1270" anchor="ctr" anchorCtr="0">
+        <a:bodyPr spcFirstLastPara="0" vert="horz" wrap="square" lIns="50800" tIns="12700" rIns="25400" bIns="12700" numCol="1" spcCol="1270" anchor="ctr" anchorCtr="0">
           <a:noAutofit/>
         </a:bodyPr>
         <a:lstStyle/>
         <a:p>
-          <a:pPr marL="0" lvl="0" indent="0" algn="ctr" defTabSz="800100">
+          <a:pPr marL="0" lvl="0" indent="0" algn="ctr" defTabSz="889000">
             <a:lnSpc>
               <a:spcPct val="90000"/>
             </a:lnSpc>
@@ -3982,14 +3978,14 @@
             <a:buNone/>
           </a:pPr>
           <a:r>
-            <a:rPr lang="en-US" sz="1800" kern="1200" dirty="0"/>
-            <a:t>Task description</a:t>
+            <a:rPr lang="en-US" sz="2000" kern="1200" dirty="0"/>
+            <a:t>Take a moment to find which pattern suits the question.</a:t>
           </a:r>
         </a:p>
       </dsp:txBody>
       <dsp:txXfrm>
-        <a:off x="1242342" y="1147694"/>
-        <a:ext cx="1206713" cy="1514611"/>
+        <a:off x="1641011" y="348677"/>
+        <a:ext cx="1296381" cy="1627159"/>
       </dsp:txXfrm>
     </dsp:sp>
     <dsp:sp modelId="{47DA5750-48DC-4E4F-815D-0B05DBC30DAB}">
@@ -3999,8 +3995,8 @@
       </dsp:nvSpPr>
       <dsp:spPr>
         <a:xfrm>
-          <a:off x="4688" y="1286172"/>
-          <a:ext cx="1237654" cy="1237654"/>
+          <a:off x="311389" y="497445"/>
+          <a:ext cx="1329621" cy="1329621"/>
         </a:xfrm>
         <a:prstGeom prst="ellipse">
           <a:avLst/>
@@ -4043,12 +4039,12 @@
         </a:fontRef>
       </dsp:style>
       <dsp:txBody>
-        <a:bodyPr spcFirstLastPara="0" vert="horz" wrap="square" lIns="15240" tIns="15240" rIns="15240" bIns="15240" numCol="1" spcCol="1270" anchor="ctr" anchorCtr="0">
+        <a:bodyPr spcFirstLastPara="0" vert="horz" wrap="square" lIns="8890" tIns="8890" rIns="8890" bIns="8890" numCol="1" spcCol="1270" anchor="ctr" anchorCtr="0">
           <a:noAutofit/>
         </a:bodyPr>
         <a:lstStyle/>
         <a:p>
-          <a:pPr marL="0" lvl="0" indent="0" algn="ctr" defTabSz="1066800">
+          <a:pPr marL="0" lvl="0" indent="0" algn="ctr" defTabSz="622300">
             <a:lnSpc>
               <a:spcPct val="90000"/>
             </a:lnSpc>
@@ -4061,14 +4057,14 @@
             <a:buNone/>
           </a:pPr>
           <a:r>
-            <a:rPr lang="en-US" sz="2400" kern="1200" dirty="0"/>
-            <a:t>Step 1 Title</a:t>
+            <a:rPr lang="en-US" sz="1400" kern="1200" dirty="0"/>
+            <a:t>1.Judge pattern</a:t>
           </a:r>
         </a:p>
       </dsp:txBody>
       <dsp:txXfrm>
-        <a:off x="185938" y="1467422"/>
-        <a:ext cx="875154" cy="875154"/>
+        <a:off x="506107" y="692163"/>
+        <a:ext cx="940185" cy="940185"/>
       </dsp:txXfrm>
     </dsp:sp>
     <dsp:sp modelId="{00D2DC2C-7CA2-4A4B-B66D-3DDCAB7DC8E9}">
@@ -4078,8 +4074,8 @@
       </dsp:nvSpPr>
       <dsp:spPr>
         <a:xfrm>
-          <a:off x="3872358" y="823134"/>
-          <a:ext cx="2475309" cy="2163731"/>
+          <a:off x="4476658" y="0"/>
+          <a:ext cx="2659242" cy="2324513"/>
         </a:xfrm>
         <a:prstGeom prst="rightArrow">
           <a:avLst>
@@ -4125,12 +4121,12 @@
         <a:fontRef idx="minor"/>
       </dsp:style>
       <dsp:txBody>
-        <a:bodyPr spcFirstLastPara="0" vert="horz" wrap="square" lIns="45720" tIns="11430" rIns="22860" bIns="11430" numCol="1" spcCol="1270" anchor="ctr" anchorCtr="0">
+        <a:bodyPr spcFirstLastPara="0" vert="horz" wrap="square" lIns="50800" tIns="12700" rIns="25400" bIns="12700" numCol="1" spcCol="1270" anchor="ctr" anchorCtr="0">
           <a:noAutofit/>
         </a:bodyPr>
         <a:lstStyle/>
         <a:p>
-          <a:pPr marL="0" lvl="0" indent="0" algn="ctr" defTabSz="800100">
+          <a:pPr marL="0" lvl="0" indent="0" algn="ctr" defTabSz="889000">
             <a:lnSpc>
               <a:spcPct val="90000"/>
             </a:lnSpc>
@@ -4143,14 +4139,14 @@
             <a:buNone/>
           </a:pPr>
           <a:r>
-            <a:rPr lang="en-US" sz="1800" kern="1200" dirty="0"/>
-            <a:t>Task description</a:t>
+            <a:rPr lang="en-US" sz="2000" kern="1200" dirty="0"/>
+            <a:t>Use the pattern to solve the question.</a:t>
           </a:r>
         </a:p>
       </dsp:txBody>
       <dsp:txXfrm>
-        <a:off x="4491186" y="1147694"/>
-        <a:ext cx="1206713" cy="1514611"/>
+        <a:off x="5141469" y="348677"/>
+        <a:ext cx="1296381" cy="1627159"/>
       </dsp:txXfrm>
     </dsp:sp>
     <dsp:sp modelId="{EE8733A1-7662-4D0A-B39E-2218596CC81C}">
@@ -4160,8 +4156,8 @@
       </dsp:nvSpPr>
       <dsp:spPr>
         <a:xfrm>
-          <a:off x="3253531" y="1286172"/>
-          <a:ext cx="1237654" cy="1237654"/>
+          <a:off x="3811847" y="497445"/>
+          <a:ext cx="1329621" cy="1329621"/>
         </a:xfrm>
         <a:prstGeom prst="ellipse">
           <a:avLst/>
@@ -4204,12 +4200,12 @@
         </a:fontRef>
       </dsp:style>
       <dsp:txBody>
-        <a:bodyPr spcFirstLastPara="0" vert="horz" wrap="square" lIns="15240" tIns="15240" rIns="15240" bIns="15240" numCol="1" spcCol="1270" anchor="ctr" anchorCtr="0">
+        <a:bodyPr spcFirstLastPara="0" vert="horz" wrap="square" lIns="8890" tIns="8890" rIns="8890" bIns="8890" numCol="1" spcCol="1270" anchor="ctr" anchorCtr="0">
           <a:noAutofit/>
         </a:bodyPr>
         <a:lstStyle/>
         <a:p>
-          <a:pPr marL="0" lvl="0" indent="0" algn="ctr" defTabSz="1066800">
+          <a:pPr marL="0" lvl="0" indent="0" algn="ctr" defTabSz="622300">
             <a:lnSpc>
               <a:spcPct val="90000"/>
             </a:lnSpc>
@@ -4222,25 +4218,25 @@
             <a:buNone/>
           </a:pPr>
           <a:r>
-            <a:rPr lang="en-US" sz="2400" kern="1200" dirty="0"/>
-            <a:t>Step 2 Title</a:t>
+            <a:rPr lang="en-US" sz="1400" kern="1200" dirty="0"/>
+            <a:t>2.Solve</a:t>
           </a:r>
         </a:p>
       </dsp:txBody>
       <dsp:txXfrm>
-        <a:off x="3434781" y="1467422"/>
-        <a:ext cx="875154" cy="875154"/>
+        <a:off x="4006565" y="692163"/>
+        <a:ext cx="940185" cy="940185"/>
       </dsp:txXfrm>
     </dsp:sp>
-    <dsp:sp modelId="{4BF699B1-BE15-42D1-9784-AA33CF29870E}">
+    <dsp:sp modelId="{6E145DEC-2848-4448-9465-8BB01E14F3F8}">
       <dsp:nvSpPr>
         <dsp:cNvPr id="0" name=""/>
         <dsp:cNvSpPr/>
       </dsp:nvSpPr>
       <dsp:spPr>
         <a:xfrm>
-          <a:off x="7121202" y="823134"/>
-          <a:ext cx="2475309" cy="2163731"/>
+          <a:off x="7977116" y="0"/>
+          <a:ext cx="2659242" cy="2324513"/>
         </a:xfrm>
         <a:prstGeom prst="rightArrow">
           <a:avLst>
@@ -4286,12 +4282,12 @@
         <a:fontRef idx="minor"/>
       </dsp:style>
       <dsp:txBody>
-        <a:bodyPr spcFirstLastPara="0" vert="horz" wrap="square" lIns="45720" tIns="11430" rIns="22860" bIns="11430" numCol="1" spcCol="1270" anchor="ctr" anchorCtr="0">
+        <a:bodyPr spcFirstLastPara="0" vert="horz" wrap="square" lIns="50800" tIns="12700" rIns="25400" bIns="12700" numCol="1" spcCol="1270" anchor="ctr" anchorCtr="0">
           <a:noAutofit/>
         </a:bodyPr>
         <a:lstStyle/>
         <a:p>
-          <a:pPr marL="0" lvl="0" indent="0" algn="ctr" defTabSz="800100">
+          <a:pPr marL="0" lvl="0" indent="0" algn="ctr" defTabSz="889000">
             <a:lnSpc>
               <a:spcPct val="90000"/>
             </a:lnSpc>
@@ -4304,25 +4300,25 @@
             <a:buNone/>
           </a:pPr>
           <a:r>
-            <a:rPr lang="en-US" sz="1800" kern="1200" dirty="0"/>
-            <a:t>Task description</a:t>
+            <a:rPr lang="en-US" sz="2000" kern="1200" dirty="0"/>
+            <a:t>Compare Control Flow Graphs.</a:t>
           </a:r>
         </a:p>
       </dsp:txBody>
       <dsp:txXfrm>
-        <a:off x="7740029" y="1147694"/>
-        <a:ext cx="1206713" cy="1514611"/>
+        <a:off x="8641926" y="348677"/>
+        <a:ext cx="1296381" cy="1627159"/>
       </dsp:txXfrm>
     </dsp:sp>
-    <dsp:sp modelId="{78E9A4E4-18A9-4B73-8007-A63A71C71937}">
+    <dsp:sp modelId="{E78312BB-2607-4A05-B057-C99ACE75C09C}">
       <dsp:nvSpPr>
         <dsp:cNvPr id="0" name=""/>
         <dsp:cNvSpPr/>
       </dsp:nvSpPr>
       <dsp:spPr>
         <a:xfrm>
-          <a:off x="6502375" y="1286172"/>
-          <a:ext cx="1237654" cy="1237654"/>
+          <a:off x="7312305" y="497445"/>
+          <a:ext cx="1329621" cy="1329621"/>
         </a:xfrm>
         <a:prstGeom prst="ellipse">
           <a:avLst/>
@@ -4365,12 +4361,12 @@
         </a:fontRef>
       </dsp:style>
       <dsp:txBody>
-        <a:bodyPr spcFirstLastPara="0" vert="horz" wrap="square" lIns="15240" tIns="15240" rIns="15240" bIns="15240" numCol="1" spcCol="1270" anchor="ctr" anchorCtr="0">
+        <a:bodyPr spcFirstLastPara="0" vert="horz" wrap="square" lIns="8890" tIns="8890" rIns="8890" bIns="8890" numCol="1" spcCol="1270" anchor="ctr" anchorCtr="0">
           <a:noAutofit/>
         </a:bodyPr>
         <a:lstStyle/>
         <a:p>
-          <a:pPr marL="0" lvl="0" indent="0" algn="ctr" defTabSz="1066800">
+          <a:pPr marL="0" lvl="0" indent="0" algn="ctr" defTabSz="622300">
             <a:lnSpc>
               <a:spcPct val="90000"/>
             </a:lnSpc>
@@ -4383,14 +4379,14 @@
             <a:buNone/>
           </a:pPr>
           <a:r>
-            <a:rPr lang="en-US" sz="2400" kern="1200" dirty="0"/>
-            <a:t>Step 3 Title</a:t>
+            <a:rPr lang="en-US" sz="1400" kern="1200" dirty="0"/>
+            <a:t>3.Compare</a:t>
           </a:r>
         </a:p>
       </dsp:txBody>
       <dsp:txXfrm>
-        <a:off x="6683625" y="1467422"/>
-        <a:ext cx="875154" cy="875154"/>
+        <a:off x="7507023" y="692163"/>
+        <a:ext cx="940185" cy="940185"/>
       </dsp:txXfrm>
     </dsp:sp>
   </dsp:spTree>
@@ -5807,7 +5803,7 @@
           <a:p>
             <a:fld id="{59041DB8-B66F-4DC8-A96E-33677E0F90FF}" type="datetimeFigureOut">
               <a:rPr lang="en-US" smtClean="0"/>
-              <a:t>1/16/2018</a:t>
+              <a:t>1/17/2018</a:t>
             </a:fld>
             <a:endParaRPr lang="en-US"/>
           </a:p>
@@ -5972,7 +5968,7 @@
           <a:p>
             <a:fld id="{DEB49C4A-65AC-492D-9701-81B46C3AD0E4}" type="datetimeFigureOut">
               <a:rPr lang="en-US" smtClean="0"/>
-              <a:t>1/16/2018</a:t>
+              <a:t>1/17/2018</a:t>
             </a:fld>
             <a:endParaRPr lang="en-US"/>
           </a:p>
@@ -8464,7 +8460,7 @@
           <a:p>
             <a:fld id="{384A29A4-78C8-47AB-BA06-22CB45938951}" type="datetime1">
               <a:rPr lang="en-US" smtClean="0"/>
-              <a:t>1/16/2018</a:t>
+              <a:t>1/17/2018</a:t>
             </a:fld>
             <a:endParaRPr lang="en-US"/>
           </a:p>
@@ -8659,7 +8655,7 @@
           <a:p>
             <a:fld id="{E1ED4ACF-2D82-46F2-A8E9-23963AA34E86}" type="datetime1">
               <a:rPr lang="en-US" smtClean="0"/>
-              <a:t>1/16/2018</a:t>
+              <a:t>1/17/2018</a:t>
             </a:fld>
             <a:endParaRPr lang="en-US"/>
           </a:p>
@@ -8843,7 +8839,7 @@
           <a:p>
             <a:fld id="{AE374B5B-21A0-4192-BF4C-38187F1A68D8}" type="datetime1">
               <a:rPr lang="en-US" smtClean="0"/>
-              <a:t>1/16/2018</a:t>
+              <a:t>1/17/2018</a:t>
             </a:fld>
             <a:endParaRPr lang="en-US"/>
           </a:p>
@@ -11184,7 +11180,7 @@
           <a:p>
             <a:fld id="{33B5CF7C-B333-48E1-A4A6-83A3C8B73AC0}" type="datetime1">
               <a:rPr lang="en-US" smtClean="0"/>
-              <a:t>1/16/2018</a:t>
+              <a:t>1/17/2018</a:t>
             </a:fld>
             <a:endParaRPr lang="en-US"/>
           </a:p>
@@ -11637,7 +11633,7 @@
           <a:p>
             <a:fld id="{AE320762-5CBF-4210-AB54-376B091119F8}" type="datetime1">
               <a:rPr lang="en-US" smtClean="0"/>
-              <a:t>1/16/2018</a:t>
+              <a:t>1/17/2018</a:t>
             </a:fld>
             <a:endParaRPr lang="en-US"/>
           </a:p>
@@ -11769,7 +11765,7 @@
           <a:p>
             <a:fld id="{7F0DB371-BF5F-4058-A212-1A908E4D2674}" type="datetime1">
               <a:rPr lang="en-US" smtClean="0"/>
-              <a:t>1/16/2018</a:t>
+              <a:t>1/17/2018</a:t>
             </a:fld>
             <a:endParaRPr lang="en-US"/>
           </a:p>
@@ -13702,7 +13698,7 @@
           <a:p>
             <a:fld id="{60A4083B-90AA-48CF-BAD5-00AA24D7F288}" type="datetime1">
               <a:rPr lang="en-US" smtClean="0"/>
-              <a:t>1/16/2018</a:t>
+              <a:t>1/17/2018</a:t>
             </a:fld>
             <a:endParaRPr lang="en-US"/>
           </a:p>
@@ -15961,7 +15957,7 @@
             <a:fld id="{F5BAF629-ECA2-4CF3-B790-9D9BDED98269}" type="datetime1">
               <a:rPr lang="en-US" smtClean="0"/>
               <a:pPr/>
-              <a:t>1/16/2018</a:t>
+              <a:t>1/17/2018</a:t>
             </a:fld>
             <a:endParaRPr lang="en-US"/>
           </a:p>
@@ -20256,7 +20252,7 @@
             <a:fld id="{B51B2453-8663-4C69-AF73-9FD7B1DEC5D0}" type="datetime1">
               <a:rPr lang="en-US" smtClean="0"/>
               <a:pPr/>
-              <a:t>1/16/2018</a:t>
+              <a:t>1/17/2018</a:t>
             </a:fld>
             <a:endParaRPr lang="en-US" dirty="0"/>
           </a:p>
@@ -21251,9 +21247,10 @@
           </a:p>
           <a:p>
             <a:r>
-              <a:rPr lang="en-US" dirty="0"/>
-              <a:t>Software Problems.</a:t>
+              <a:rPr lang="en-US"/>
+              <a:t>Concrete Example.</a:t>
             </a:r>
+            <a:endParaRPr lang="en-US" dirty="0"/>
           </a:p>
           <a:p>
             <a:r>
@@ -21264,13 +21261,8 @@
           <a:p>
             <a:r>
               <a:rPr lang="en-US" dirty="0"/>
-              <a:t>Conclusions &amp; </a:t>
+              <a:t>Conclusions &amp; Future Work.</a:t>
             </a:r>
-            <a:r>
-              <a:rPr lang="en-US"/>
-              <a:t>Future Work.</a:t>
-            </a:r>
-            <a:endParaRPr lang="en-US" dirty="0"/>
           </a:p>
           <a:p>
             <a:endParaRPr lang="en-US" dirty="0"/>
@@ -21613,25 +21605,25 @@
                   </a:schemeClr>
                 </a:solidFill>
               </a:rPr>
-              <a:t>Project Goals</a:t>
+              <a:t>Contributions</a:t>
             </a:r>
           </a:p>
           <a:p>
             <a:r>
               <a:rPr lang="en-US" dirty="0"/>
-              <a:t>Identify patterns related to standard algorithms.</a:t>
+              <a:t>Mastering the fundamental algorithms is important. </a:t>
             </a:r>
           </a:p>
           <a:p>
             <a:r>
               <a:rPr lang="en-US" dirty="0"/>
-              <a:t>Apply these patterns to interview questions.</a:t>
+              <a:t>Identify the patterns of these algorithms.</a:t>
             </a:r>
           </a:p>
           <a:p>
             <a:r>
               <a:rPr lang="en-US" dirty="0"/>
-              <a:t>Provide a guidance for programmers to better their abilities.</a:t>
+              <a:t>Provide a guidance for programmers to better their abilities and prepare them for real world interview questions.</a:t>
             </a:r>
           </a:p>
           <a:p>
@@ -23202,14 +23194,14 @@
             <p:ph idx="1"/>
             <p:extLst>
               <p:ext uri="{D42A27DB-BD31-4B8C-83A1-F6EECF244321}">
-                <p14:modId xmlns:p14="http://schemas.microsoft.com/office/powerpoint/2010/main" val="662401178"/>
+                <p14:modId xmlns:p14="http://schemas.microsoft.com/office/powerpoint/2010/main" val="2518927358"/>
               </p:ext>
             </p:extLst>
           </p:nvPr>
         </p:nvGraphicFramePr>
         <p:xfrm>
-          <a:off x="1295400" y="1981200"/>
-          <a:ext cx="9601200" cy="3810000"/>
+          <a:off x="739034" y="1646238"/>
+          <a:ext cx="10947749" cy="2324513"/>
         </p:xfrm>
         <a:graphic>
           <a:graphicData uri="http://schemas.openxmlformats.org/drawingml/2006/diagram">
@@ -23217,6 +23209,137 @@
           </a:graphicData>
         </a:graphic>
       </p:graphicFrame>
+      <p:sp>
+        <p:nvSpPr>
+          <p:cNvPr id="11" name="TextBox 10">
+            <a:extLst>
+              <a:ext uri="{FF2B5EF4-FFF2-40B4-BE49-F238E27FC236}">
+                <a16:creationId xmlns:a16="http://schemas.microsoft.com/office/drawing/2014/main" id="{5A4C3579-618C-4613-BEBC-B6FA064328DE}"/>
+              </a:ext>
+            </a:extLst>
+          </p:cNvPr>
+          <p:cNvSpPr txBox="1"/>
+          <p:nvPr/>
+        </p:nvSpPr>
+        <p:spPr>
+          <a:xfrm>
+            <a:off x="7996824" y="4789970"/>
+            <a:ext cx="3689959" cy="646331"/>
+          </a:xfrm>
+          <a:prstGeom prst="rect">
+            <a:avLst/>
+          </a:prstGeom>
+          <a:noFill/>
+        </p:spPr>
+        <p:txBody>
+          <a:bodyPr wrap="square" rtlCol="0">
+            <a:spAutoFit/>
+          </a:bodyPr>
+          <a:lstStyle/>
+          <a:p>
+            <a:pPr marL="285750" indent="-285750">
+              <a:buClr>
+                <a:schemeClr val="accent1">
+                  <a:lumMod val="75000"/>
+                </a:schemeClr>
+              </a:buClr>
+              <a:buFont typeface="Arial" panose="020B0604020202020204" pitchFamily="34" charset="0"/>
+              <a:buChar char="•"/>
+            </a:pPr>
+            <a:r>
+              <a:rPr lang="en-IE" dirty="0"/>
+              <a:t>Adding a node or edge.</a:t>
+            </a:r>
+          </a:p>
+          <a:p>
+            <a:pPr marL="285750" indent="-285750">
+              <a:buClr>
+                <a:schemeClr val="accent1">
+                  <a:lumMod val="75000"/>
+                </a:schemeClr>
+              </a:buClr>
+              <a:buFont typeface="Arial" panose="020B0604020202020204" pitchFamily="34" charset="0"/>
+              <a:buChar char="•"/>
+            </a:pPr>
+            <a:r>
+              <a:rPr lang="en-IE" dirty="0"/>
+              <a:t>Deleting a node or edge.</a:t>
+            </a:r>
+          </a:p>
+        </p:txBody>
+      </p:sp>
+      <p:sp>
+        <p:nvSpPr>
+          <p:cNvPr id="12" name="TextBox 11">
+            <a:extLst>
+              <a:ext uri="{FF2B5EF4-FFF2-40B4-BE49-F238E27FC236}">
+                <a16:creationId xmlns:a16="http://schemas.microsoft.com/office/drawing/2014/main" id="{FD1EDFE0-B163-45E7-84F1-3EB1A33814AB}"/>
+              </a:ext>
+            </a:extLst>
+          </p:cNvPr>
+          <p:cNvSpPr txBox="1"/>
+          <p:nvPr/>
+        </p:nvSpPr>
+        <p:spPr>
+          <a:xfrm>
+            <a:off x="7996824" y="4384110"/>
+            <a:ext cx="3689959" cy="369332"/>
+          </a:xfrm>
+          <a:prstGeom prst="rect">
+            <a:avLst/>
+          </a:prstGeom>
+          <a:noFill/>
+        </p:spPr>
+        <p:txBody>
+          <a:bodyPr wrap="square" rtlCol="0">
+            <a:spAutoFit/>
+          </a:bodyPr>
+          <a:lstStyle/>
+          <a:p>
+            <a:pPr algn="ctr"/>
+            <a:r>
+              <a:rPr lang="en-IE" dirty="0">
+                <a:solidFill>
+                  <a:schemeClr val="accent1">
+                    <a:lumMod val="75000"/>
+                  </a:schemeClr>
+                </a:solidFill>
+              </a:rPr>
+              <a:t>Edit Operations</a:t>
+            </a:r>
+          </a:p>
+        </p:txBody>
+      </p:sp>
+      <p:pic>
+        <p:nvPicPr>
+          <p:cNvPr id="16" name="Picture 15">
+            <a:extLst>
+              <a:ext uri="{FF2B5EF4-FFF2-40B4-BE49-F238E27FC236}">
+                <a16:creationId xmlns:a16="http://schemas.microsoft.com/office/drawing/2014/main" id="{D830F796-48B1-4733-8011-462C10B26E13}"/>
+              </a:ext>
+            </a:extLst>
+          </p:cNvPr>
+          <p:cNvPicPr>
+            <a:picLocks noChangeAspect="1"/>
+          </p:cNvPicPr>
+          <p:nvPr/>
+        </p:nvPicPr>
+        <p:blipFill>
+          <a:blip r:embed="rId7"/>
+          <a:stretch>
+            <a:fillRect/>
+          </a:stretch>
+        </p:blipFill>
+        <p:spPr>
+          <a:xfrm>
+            <a:off x="1453019" y="3848006"/>
+            <a:ext cx="3373677" cy="2530258"/>
+          </a:xfrm>
+          <a:prstGeom prst="rect">
+            <a:avLst/>
+          </a:prstGeom>
+        </p:spPr>
+      </p:pic>
     </p:spTree>
     <p:extLst>
       <p:ext uri="{BB962C8B-B14F-4D97-AF65-F5344CB8AC3E}">
@@ -23261,7 +23384,13 @@
       </p:grpSpPr>
       <p:sp>
         <p:nvSpPr>
-          <p:cNvPr id="2" name="Title 1"/>
+          <p:cNvPr id="2" name="Title 1">
+            <a:extLst>
+              <a:ext uri="{FF2B5EF4-FFF2-40B4-BE49-F238E27FC236}">
+                <a16:creationId xmlns:a16="http://schemas.microsoft.com/office/drawing/2014/main" id="{BD803771-CCD8-4DD3-A556-0917C45D63C5}"/>
+              </a:ext>
+            </a:extLst>
+          </p:cNvPr>
           <p:cNvSpPr>
             <a:spLocks noGrp="1"/>
           </p:cNvSpPr>
@@ -23275,35 +23404,201 @@
           <a:lstStyle/>
           <a:p>
             <a:r>
-              <a:rPr lang="en-US" dirty="0"/>
-              <a:t>Software Problems</a:t>
+              <a:rPr lang="en-IE" dirty="0"/>
+              <a:t>Concrete Example</a:t>
             </a:r>
           </a:p>
         </p:txBody>
       </p:sp>
-      <p:sp>
-        <p:nvSpPr>
-          <p:cNvPr id="3" name="Text Placeholder 2"/>
-          <p:cNvSpPr>
-            <a:spLocks noGrp="1"/>
-          </p:cNvSpPr>
-          <p:nvPr>
-            <p:ph type="body" idx="1"/>
-          </p:nvPr>
-        </p:nvSpPr>
-        <p:spPr/>
-        <p:txBody>
-          <a:bodyPr/>
-          <a:lstStyle/>
-          <a:p>
-            <a:endParaRPr lang="en-US"/>
-          </a:p>
-        </p:txBody>
-      </p:sp>
+      <p:grpSp>
+        <p:nvGrpSpPr>
+          <p:cNvPr id="11" name="Group 10">
+            <a:extLst>
+              <a:ext uri="{FF2B5EF4-FFF2-40B4-BE49-F238E27FC236}">
+                <a16:creationId xmlns:a16="http://schemas.microsoft.com/office/drawing/2014/main" id="{A531D020-DDCC-4ED7-876B-16BCD3B272EB}"/>
+              </a:ext>
+            </a:extLst>
+          </p:cNvPr>
+          <p:cNvGrpSpPr/>
+          <p:nvPr/>
+        </p:nvGrpSpPr>
+        <p:grpSpPr>
+          <a:xfrm>
+            <a:off x="633014" y="1952419"/>
+            <a:ext cx="4763165" cy="3590162"/>
+            <a:chOff x="633014" y="1952419"/>
+            <a:chExt cx="4763165" cy="3590162"/>
+          </a:xfrm>
+        </p:grpSpPr>
+        <p:pic>
+          <p:nvPicPr>
+            <p:cNvPr id="4" name="Picture 3">
+              <a:extLst>
+                <a:ext uri="{FF2B5EF4-FFF2-40B4-BE49-F238E27FC236}">
+                  <a16:creationId xmlns:a16="http://schemas.microsoft.com/office/drawing/2014/main" id="{866DBAAF-99E2-4FDE-BCEE-545FDF8DA51C}"/>
+                </a:ext>
+              </a:extLst>
+            </p:cNvPr>
+            <p:cNvPicPr>
+              <a:picLocks noChangeAspect="1"/>
+            </p:cNvPicPr>
+            <p:nvPr/>
+          </p:nvPicPr>
+          <p:blipFill>
+            <a:blip r:embed="rId2"/>
+            <a:stretch>
+              <a:fillRect/>
+            </a:stretch>
+          </p:blipFill>
+          <p:spPr>
+            <a:xfrm>
+              <a:off x="633014" y="1952419"/>
+              <a:ext cx="4763165" cy="2953162"/>
+            </a:xfrm>
+            <a:prstGeom prst="rect">
+              <a:avLst/>
+            </a:prstGeom>
+          </p:spPr>
+        </p:pic>
+        <p:sp>
+          <p:nvSpPr>
+            <p:cNvPr id="7" name="TextBox 6">
+              <a:extLst>
+                <a:ext uri="{FF2B5EF4-FFF2-40B4-BE49-F238E27FC236}">
+                  <a16:creationId xmlns:a16="http://schemas.microsoft.com/office/drawing/2014/main" id="{BB59F632-2050-4BA8-9102-A1A3F6E5B6EB}"/>
+                </a:ext>
+              </a:extLst>
+            </p:cNvPr>
+            <p:cNvSpPr txBox="1"/>
+            <p:nvPr/>
+          </p:nvSpPr>
+          <p:spPr>
+            <a:xfrm>
+              <a:off x="633014" y="5173249"/>
+              <a:ext cx="3312685" cy="369332"/>
+            </a:xfrm>
+            <a:prstGeom prst="rect">
+              <a:avLst/>
+            </a:prstGeom>
+            <a:noFill/>
+          </p:spPr>
+          <p:txBody>
+            <a:bodyPr wrap="square" rtlCol="0">
+              <a:spAutoFit/>
+            </a:bodyPr>
+            <a:lstStyle/>
+            <a:p>
+              <a:r>
+                <a:rPr lang="en-IE" dirty="0"/>
+                <a:t>CFG for Palindrome Algorithm</a:t>
+              </a:r>
+            </a:p>
+          </p:txBody>
+        </p:sp>
+      </p:grpSp>
+      <p:grpSp>
+        <p:nvGrpSpPr>
+          <p:cNvPr id="9" name="Group 8">
+            <a:extLst>
+              <a:ext uri="{FF2B5EF4-FFF2-40B4-BE49-F238E27FC236}">
+                <a16:creationId xmlns:a16="http://schemas.microsoft.com/office/drawing/2014/main" id="{7E52C5A6-FB7A-4086-87F4-D504568A538F}"/>
+              </a:ext>
+            </a:extLst>
+          </p:cNvPr>
+          <p:cNvGrpSpPr/>
+          <p:nvPr/>
+        </p:nvGrpSpPr>
+        <p:grpSpPr>
+          <a:xfrm>
+            <a:off x="6096000" y="1648438"/>
+            <a:ext cx="4885714" cy="4171142"/>
+            <a:chOff x="6096000" y="1648438"/>
+            <a:chExt cx="4885714" cy="4171142"/>
+          </a:xfrm>
+        </p:grpSpPr>
+        <p:pic>
+          <p:nvPicPr>
+            <p:cNvPr id="6" name="Picture 5">
+              <a:extLst>
+                <a:ext uri="{FF2B5EF4-FFF2-40B4-BE49-F238E27FC236}">
+                  <a16:creationId xmlns:a16="http://schemas.microsoft.com/office/drawing/2014/main" id="{74D4A7EB-B680-4C2F-9D7F-711F143BB7F7}"/>
+                </a:ext>
+              </a:extLst>
+            </p:cNvPr>
+            <p:cNvPicPr>
+              <a:picLocks noChangeAspect="1"/>
+            </p:cNvPicPr>
+            <p:nvPr/>
+          </p:nvPicPr>
+          <p:blipFill>
+            <a:blip r:embed="rId3"/>
+            <a:stretch>
+              <a:fillRect/>
+            </a:stretch>
+          </p:blipFill>
+          <p:spPr>
+            <a:xfrm>
+              <a:off x="6096000" y="1648438"/>
+              <a:ext cx="4885714" cy="3257143"/>
+            </a:xfrm>
+            <a:prstGeom prst="rect">
+              <a:avLst/>
+            </a:prstGeom>
+          </p:spPr>
+        </p:pic>
+        <p:sp>
+          <p:nvSpPr>
+            <p:cNvPr id="8" name="TextBox 7">
+              <a:extLst>
+                <a:ext uri="{FF2B5EF4-FFF2-40B4-BE49-F238E27FC236}">
+                  <a16:creationId xmlns:a16="http://schemas.microsoft.com/office/drawing/2014/main" id="{B6740902-04FF-45F8-992F-99CF91B66082}"/>
+                </a:ext>
+              </a:extLst>
+            </p:cNvPr>
+            <p:cNvSpPr txBox="1"/>
+            <p:nvPr/>
+          </p:nvSpPr>
+          <p:spPr>
+            <a:xfrm>
+              <a:off x="6096000" y="5173249"/>
+              <a:ext cx="3312685" cy="646331"/>
+            </a:xfrm>
+            <a:prstGeom prst="rect">
+              <a:avLst/>
+            </a:prstGeom>
+            <a:noFill/>
+          </p:spPr>
+          <p:txBody>
+            <a:bodyPr wrap="square" rtlCol="0">
+              <a:spAutoFit/>
+            </a:bodyPr>
+            <a:lstStyle/>
+            <a:p>
+              <a:r>
+                <a:rPr lang="en-IE" dirty="0"/>
+                <a:t>CFG for </a:t>
+              </a:r>
+              <a:r>
+                <a:rPr lang="en-IE" dirty="0" err="1"/>
+                <a:t>TwoSum</a:t>
+              </a:r>
+              <a:r>
+                <a:rPr lang="en-IE" dirty="0"/>
+                <a:t> question on </a:t>
+              </a:r>
+              <a:r>
+                <a:rPr lang="en-IE" dirty="0" err="1"/>
+                <a:t>LeetCode</a:t>
+              </a:r>
+              <a:endParaRPr lang="en-IE" dirty="0"/>
+            </a:p>
+          </p:txBody>
+        </p:sp>
+      </p:grpSp>
     </p:spTree>
     <p:extLst>
       <p:ext uri="{BB962C8B-B14F-4D97-AF65-F5344CB8AC3E}">
-        <p14:creationId xmlns:p14="http://schemas.microsoft.com/office/powerpoint/2010/main" val="2362296366"/>
+        <p14:creationId xmlns:p14="http://schemas.microsoft.com/office/powerpoint/2010/main" val="3019517497"/>
       </p:ext>
     </p:extLst>
   </p:cSld>

</xml_diff>

<commit_message>
Added in notes. Need to work on 'The Problem' slides
</commit_message>
<xml_diff>
--- a/presentation/New Thesis Presentation.pptx
+++ b/presentation/New Thesis Presentation.pptx
@@ -137,7 +137,7 @@
             <p14:sldId id="270"/>
           </p14:sldIdLst>
         </p14:section>
-        <p14:section name="Problem Formulation" id="{92D61348-CFE0-4D0C-BA3B-13C5B85AF057}">
+        <p14:section name="The Problem" id="{92D61348-CFE0-4D0C-BA3B-13C5B85AF057}">
           <p14:sldIdLst>
             <p14:sldId id="262"/>
           </p14:sldIdLst>
@@ -3892,7 +3892,7 @@
   <dgm:whole/>
   <dgm:extLst>
     <a:ext uri="http://schemas.microsoft.com/office/drawing/2008/diagram">
-      <dsp:dataModelExt xmlns:dsp="http://schemas.microsoft.com/office/drawing/2008/diagram" relId="rId6" minVer="http://schemas.openxmlformats.org/drawingml/2006/diagram"/>
+      <dsp:dataModelExt xmlns:dsp="http://schemas.microsoft.com/office/drawing/2008/diagram" relId="rId7" minVer="http://schemas.openxmlformats.org/drawingml/2006/diagram"/>
     </a:ext>
   </dgm:extLst>
 </dgm:dataModel>
@@ -6279,7 +6279,108 @@
           <a:bodyPr/>
           <a:lstStyle/>
           <a:p>
+            <a:r>
+              <a:rPr lang="en-IE" dirty="0"/>
+              <a:t>Hi and welcome to my presentation on my Masters’ Project and Thesis, titled:. My supervisor was </a:t>
+            </a:r>
+            <a:r>
+              <a:rPr lang="en-IE" dirty="0" err="1"/>
+              <a:t>Dr.</a:t>
+            </a:r>
+            <a:r>
+              <a:rPr lang="en-IE" dirty="0"/>
+              <a:t> Hao Wu.</a:t>
+            </a:r>
+          </a:p>
+        </p:txBody>
+      </p:sp>
+      <p:sp>
+        <p:nvSpPr>
+          <p:cNvPr id="4" name="Slide Number Placeholder 3"/>
+          <p:cNvSpPr>
+            <a:spLocks noGrp="1"/>
+          </p:cNvSpPr>
+          <p:nvPr>
+            <p:ph type="sldNum" sz="quarter" idx="10"/>
+          </p:nvPr>
+        </p:nvSpPr>
+        <p:spPr/>
+        <p:txBody>
+          <a:bodyPr/>
+          <a:lstStyle/>
+          <a:p>
+            <a:fld id="{82869989-EB00-4EE7-BCB5-25BDC5BB29F8}" type="slidenum">
+              <a:rPr lang="en-US" smtClean="0"/>
+              <a:t>1</a:t>
+            </a:fld>
             <a:endParaRPr lang="en-US"/>
+          </a:p>
+        </p:txBody>
+      </p:sp>
+    </p:spTree>
+    <p:extLst>
+      <p:ext uri="{BB962C8B-B14F-4D97-AF65-F5344CB8AC3E}">
+        <p14:creationId xmlns:p14="http://schemas.microsoft.com/office/powerpoint/2010/main" val="4166916286"/>
+      </p:ext>
+    </p:extLst>
+  </p:cSld>
+  <p:clrMapOvr>
+    <a:masterClrMapping/>
+  </p:clrMapOvr>
+</p:notes>
+</file>
+
+<file path=ppt/notesSlides/notesSlide2.xml><?xml version="1.0" encoding="utf-8"?>
+<p:notes xmlns:a="http://schemas.openxmlformats.org/drawingml/2006/main" xmlns:r="http://schemas.openxmlformats.org/officeDocument/2006/relationships" xmlns:p="http://schemas.openxmlformats.org/presentationml/2006/main">
+  <p:cSld>
+    <p:spTree>
+      <p:nvGrpSpPr>
+        <p:cNvPr id="1" name=""/>
+        <p:cNvGrpSpPr/>
+        <p:nvPr/>
+      </p:nvGrpSpPr>
+      <p:grpSpPr>
+        <a:xfrm>
+          <a:off x="0" y="0"/>
+          <a:ext cx="0" cy="0"/>
+          <a:chOff x="0" y="0"/>
+          <a:chExt cx="0" cy="0"/>
+        </a:xfrm>
+      </p:grpSpPr>
+      <p:sp>
+        <p:nvSpPr>
+          <p:cNvPr id="2" name="Slide Image Placeholder 1"/>
+          <p:cNvSpPr>
+            <a:spLocks noGrp="1" noRot="1" noChangeAspect="1"/>
+          </p:cNvSpPr>
+          <p:nvPr>
+            <p:ph type="sldImg"/>
+          </p:nvPr>
+        </p:nvSpPr>
+        <p:spPr/>
+      </p:sp>
+      <p:sp>
+        <p:nvSpPr>
+          <p:cNvPr id="3" name="Notes Placeholder 2"/>
+          <p:cNvSpPr>
+            <a:spLocks noGrp="1"/>
+          </p:cNvSpPr>
+          <p:nvPr>
+            <p:ph type="body" idx="1"/>
+          </p:nvPr>
+        </p:nvSpPr>
+        <p:spPr/>
+        <p:txBody>
+          <a:bodyPr/>
+          <a:lstStyle/>
+          <a:p>
+            <a:r>
+              <a:rPr lang="en-US" dirty="0"/>
+              <a:t>I will be covering the following topic areas, followed by some brief questions and a short demo. </a:t>
+            </a:r>
+          </a:p>
+          <a:p>
+            <a:endParaRPr lang="en-US" dirty="0"/>
           </a:p>
         </p:txBody>
       </p:sp>
@@ -6310,6 +6411,988 @@
     <p:extLst>
       <p:ext uri="{BB962C8B-B14F-4D97-AF65-F5344CB8AC3E}">
         <p14:creationId xmlns:p14="http://schemas.microsoft.com/office/powerpoint/2010/main" val="1980303916"/>
+      </p:ext>
+    </p:extLst>
+  </p:cSld>
+  <p:clrMapOvr>
+    <a:masterClrMapping/>
+  </p:clrMapOvr>
+</p:notes>
+</file>
+
+<file path=ppt/notesSlides/notesSlide3.xml><?xml version="1.0" encoding="utf-8"?>
+<p:notes xmlns:a="http://schemas.openxmlformats.org/drawingml/2006/main" xmlns:r="http://schemas.openxmlformats.org/officeDocument/2006/relationships" xmlns:p="http://schemas.openxmlformats.org/presentationml/2006/main">
+  <p:cSld>
+    <p:spTree>
+      <p:nvGrpSpPr>
+        <p:cNvPr id="1" name=""/>
+        <p:cNvGrpSpPr/>
+        <p:nvPr/>
+      </p:nvGrpSpPr>
+      <p:grpSpPr>
+        <a:xfrm>
+          <a:off x="0" y="0"/>
+          <a:ext cx="0" cy="0"/>
+          <a:chOff x="0" y="0"/>
+          <a:chExt cx="0" cy="0"/>
+        </a:xfrm>
+      </p:grpSpPr>
+      <p:sp>
+        <p:nvSpPr>
+          <p:cNvPr id="2" name="Slide Image Placeholder 1"/>
+          <p:cNvSpPr>
+            <a:spLocks noGrp="1" noRot="1" noChangeAspect="1"/>
+          </p:cNvSpPr>
+          <p:nvPr>
+            <p:ph type="sldImg"/>
+          </p:nvPr>
+        </p:nvSpPr>
+        <p:spPr/>
+      </p:sp>
+      <p:sp>
+        <p:nvSpPr>
+          <p:cNvPr id="3" name="Notes Placeholder 2"/>
+          <p:cNvSpPr>
+            <a:spLocks noGrp="1"/>
+          </p:cNvSpPr>
+          <p:nvPr>
+            <p:ph type="body" idx="1"/>
+          </p:nvPr>
+        </p:nvSpPr>
+        <p:spPr/>
+        <p:txBody>
+          <a:bodyPr/>
+          <a:lstStyle/>
+          <a:p>
+            <a:r>
+              <a:rPr lang="en-IE" dirty="0"/>
+              <a:t>Interviews are becoming more technical. </a:t>
+            </a:r>
+          </a:p>
+          <a:p>
+            <a:r>
+              <a:rPr lang="en-IE" dirty="0"/>
+              <a:t>I have been through numerous interviews over the past 2 years, due to me finishing my undergraduate here in Maynooth and also with the requirement of my to complete a placement for my MSc. </a:t>
+            </a:r>
+          </a:p>
+          <a:p>
+            <a:r>
+              <a:rPr lang="en-IE" dirty="0"/>
+              <a:t>Many companies are using these technical tests to examine potential employees. These tests usually have a whiteboarding section. These can be quite stressful as the candidate must code freely in front of experienced programmers. </a:t>
+            </a:r>
+          </a:p>
+          <a:p>
+            <a:r>
+              <a:rPr lang="en-IE" dirty="0"/>
+              <a:t>One thing I personally noticed is that the questions had a bit of repetition amongst them. These were similarly styled solutions to unrelated questions. They seemed to be based off algorithms I had learned whilst taking an algorithm course.</a:t>
+            </a:r>
+          </a:p>
+          <a:p>
+            <a:r>
+              <a:rPr lang="en-IE" dirty="0"/>
+              <a:t>I noticed binary search appeared a few times. </a:t>
+            </a:r>
+          </a:p>
+          <a:p>
+            <a:r>
+              <a:rPr lang="en-IE" dirty="0"/>
+              <a:t>Therefore, there must have been some form of pattern underneath. </a:t>
+            </a:r>
+          </a:p>
+          <a:p>
+            <a:r>
+              <a:rPr lang="en-IE" dirty="0"/>
+              <a:t>Therefore, we wanted to discover if there is a relationship between standard algorithms a programmer learned in a course and the interview questions.</a:t>
+            </a:r>
+          </a:p>
+        </p:txBody>
+      </p:sp>
+      <p:sp>
+        <p:nvSpPr>
+          <p:cNvPr id="4" name="Slide Number Placeholder 3"/>
+          <p:cNvSpPr>
+            <a:spLocks noGrp="1"/>
+          </p:cNvSpPr>
+          <p:nvPr>
+            <p:ph type="sldNum" sz="quarter" idx="10"/>
+          </p:nvPr>
+        </p:nvSpPr>
+        <p:spPr/>
+        <p:txBody>
+          <a:bodyPr/>
+          <a:lstStyle/>
+          <a:p>
+            <a:fld id="{82869989-EB00-4EE7-BCB5-25BDC5BB29F8}" type="slidenum">
+              <a:rPr lang="en-US" smtClean="0"/>
+              <a:t>3</a:t>
+            </a:fld>
+            <a:endParaRPr lang="en-US"/>
+          </a:p>
+        </p:txBody>
+      </p:sp>
+    </p:spTree>
+    <p:extLst>
+      <p:ext uri="{BB962C8B-B14F-4D97-AF65-F5344CB8AC3E}">
+        <p14:creationId xmlns:p14="http://schemas.microsoft.com/office/powerpoint/2010/main" val="1537279811"/>
+      </p:ext>
+    </p:extLst>
+  </p:cSld>
+  <p:clrMapOvr>
+    <a:masterClrMapping/>
+  </p:clrMapOvr>
+</p:notes>
+</file>
+
+<file path=ppt/notesSlides/notesSlide4.xml><?xml version="1.0" encoding="utf-8"?>
+<p:notes xmlns:a="http://schemas.openxmlformats.org/drawingml/2006/main" xmlns:r="http://schemas.openxmlformats.org/officeDocument/2006/relationships" xmlns:p="http://schemas.openxmlformats.org/presentationml/2006/main">
+  <p:cSld>
+    <p:spTree>
+      <p:nvGrpSpPr>
+        <p:cNvPr id="1" name=""/>
+        <p:cNvGrpSpPr/>
+        <p:nvPr/>
+      </p:nvGrpSpPr>
+      <p:grpSpPr>
+        <a:xfrm>
+          <a:off x="0" y="0"/>
+          <a:ext cx="0" cy="0"/>
+          <a:chOff x="0" y="0"/>
+          <a:chExt cx="0" cy="0"/>
+        </a:xfrm>
+      </p:grpSpPr>
+      <p:sp>
+        <p:nvSpPr>
+          <p:cNvPr id="2" name="Slide Image Placeholder 1"/>
+          <p:cNvSpPr>
+            <a:spLocks noGrp="1" noRot="1" noChangeAspect="1"/>
+          </p:cNvSpPr>
+          <p:nvPr>
+            <p:ph type="sldImg"/>
+          </p:nvPr>
+        </p:nvSpPr>
+        <p:spPr/>
+      </p:sp>
+      <p:sp>
+        <p:nvSpPr>
+          <p:cNvPr id="3" name="Notes Placeholder 2"/>
+          <p:cNvSpPr>
+            <a:spLocks noGrp="1"/>
+          </p:cNvSpPr>
+          <p:nvPr>
+            <p:ph type="body" idx="1"/>
+          </p:nvPr>
+        </p:nvSpPr>
+        <p:spPr/>
+        <p:txBody>
+          <a:bodyPr/>
+          <a:lstStyle/>
+          <a:p>
+            <a:r>
+              <a:rPr lang="en-IE" dirty="0"/>
+              <a:t>To be able to tackle the problem of helping interviewees prepare better for interviews, we first have to know where the industry was. </a:t>
+            </a:r>
+          </a:p>
+          <a:p>
+            <a:r>
+              <a:rPr lang="en-IE" dirty="0"/>
+              <a:t>We found interview preparatory books to be closely related, i.e. “Cracking the Coding Interview” by Gayle </a:t>
+            </a:r>
+            <a:r>
+              <a:rPr lang="en-IE" dirty="0" err="1"/>
+              <a:t>Lackmann</a:t>
+            </a:r>
+            <a:r>
+              <a:rPr lang="en-IE" dirty="0"/>
+              <a:t>.</a:t>
+            </a:r>
+          </a:p>
+          <a:p>
+            <a:r>
+              <a:rPr lang="en-IE" dirty="0"/>
+              <a:t>These books have sections candidates should prepare for interviews, such as Searching, Sorting, Recursion. </a:t>
+            </a:r>
+          </a:p>
+          <a:p>
+            <a:r>
+              <a:rPr lang="en-IE" dirty="0"/>
+              <a:t>These are useful as they have some questions on each topic area along with suggested solutions. </a:t>
+            </a:r>
+          </a:p>
+          <a:p>
+            <a:r>
+              <a:rPr lang="en-IE" dirty="0"/>
+              <a:t>But we find these to be an inefficient use of time, as a candidate can not prepare 50+ questions before an interview. </a:t>
+            </a:r>
+          </a:p>
+          <a:p>
+            <a:r>
+              <a:rPr lang="en-IE" dirty="0"/>
+              <a:t>There would be overlapping ideas that should be focused on more. </a:t>
+            </a:r>
+          </a:p>
+          <a:p>
+            <a:r>
+              <a:rPr lang="en-IE" dirty="0"/>
+              <a:t>Ex: If there are 4 questions solved using </a:t>
+            </a:r>
+            <a:r>
+              <a:rPr lang="en-IE" dirty="0" err="1"/>
+              <a:t>MergeSort</a:t>
+            </a:r>
+            <a:r>
+              <a:rPr lang="en-IE" dirty="0"/>
+              <a:t>, they all share common key steps. But if the book does not show that the same steps are taken, only altered to suit the question, then the book is limiting the readers’ ability to think outside the box and apply the patterns in different ways. </a:t>
+            </a:r>
+          </a:p>
+          <a:p>
+            <a:r>
+              <a:rPr lang="en-IE" dirty="0"/>
+              <a:t>Our approach is to show the reader that being comfortable with the patterns will result in them being flexible in thought, such that readers can apply a standard algorithm to multiple questions and not just limited cases.</a:t>
+            </a:r>
+          </a:p>
+          <a:p>
+            <a:endParaRPr lang="en-IE" dirty="0"/>
+          </a:p>
+          <a:p>
+            <a:r>
+              <a:rPr lang="en-IE" dirty="0"/>
+              <a:t>Research Qs:</a:t>
+            </a:r>
+          </a:p>
+          <a:p>
+            <a:r>
+              <a:rPr lang="en-IE" dirty="0"/>
+              <a:t>This then lead us to develop 3 Research Qs that attempt to solve the problem of helping interviewees prepare for interviews efficiently. </a:t>
+            </a:r>
+          </a:p>
+          <a:p>
+            <a:r>
+              <a:rPr lang="en-IE" dirty="0"/>
+              <a:t>Q1. What standard algorithms do we choose to focus on. </a:t>
+            </a:r>
+          </a:p>
+          <a:p>
+            <a:r>
+              <a:rPr lang="en-IE" dirty="0"/>
+              <a:t>Q2. How do the questions relate to these algorithms and their patterns. </a:t>
+            </a:r>
+          </a:p>
+          <a:p>
+            <a:r>
+              <a:rPr lang="en-IE" dirty="0"/>
+              <a:t>Q3. How easy can a person identify which algorithmic pattern to apply to a question. </a:t>
+            </a:r>
+          </a:p>
+          <a:p>
+            <a:endParaRPr lang="en-IE" dirty="0"/>
+          </a:p>
+        </p:txBody>
+      </p:sp>
+      <p:sp>
+        <p:nvSpPr>
+          <p:cNvPr id="4" name="Slide Number Placeholder 3"/>
+          <p:cNvSpPr>
+            <a:spLocks noGrp="1"/>
+          </p:cNvSpPr>
+          <p:nvPr>
+            <p:ph type="sldNum" sz="quarter" idx="10"/>
+          </p:nvPr>
+        </p:nvSpPr>
+        <p:spPr/>
+        <p:txBody>
+          <a:bodyPr/>
+          <a:lstStyle/>
+          <a:p>
+            <a:fld id="{82869989-EB00-4EE7-BCB5-25BDC5BB29F8}" type="slidenum">
+              <a:rPr lang="en-US" smtClean="0"/>
+              <a:t>4</a:t>
+            </a:fld>
+            <a:endParaRPr lang="en-US"/>
+          </a:p>
+        </p:txBody>
+      </p:sp>
+    </p:spTree>
+    <p:extLst>
+      <p:ext uri="{BB962C8B-B14F-4D97-AF65-F5344CB8AC3E}">
+        <p14:creationId xmlns:p14="http://schemas.microsoft.com/office/powerpoint/2010/main" val="3763571035"/>
+      </p:ext>
+    </p:extLst>
+  </p:cSld>
+  <p:clrMapOvr>
+    <a:masterClrMapping/>
+  </p:clrMapOvr>
+</p:notes>
+</file>
+
+<file path=ppt/notesSlides/notesSlide5.xml><?xml version="1.0" encoding="utf-8"?>
+<p:notes xmlns:a="http://schemas.openxmlformats.org/drawingml/2006/main" xmlns:r="http://schemas.openxmlformats.org/officeDocument/2006/relationships" xmlns:p="http://schemas.openxmlformats.org/presentationml/2006/main">
+  <p:cSld>
+    <p:spTree>
+      <p:nvGrpSpPr>
+        <p:cNvPr id="1" name=""/>
+        <p:cNvGrpSpPr/>
+        <p:nvPr/>
+      </p:nvGrpSpPr>
+      <p:grpSpPr>
+        <a:xfrm>
+          <a:off x="0" y="0"/>
+          <a:ext cx="0" cy="0"/>
+          <a:chOff x="0" y="0"/>
+          <a:chExt cx="0" cy="0"/>
+        </a:xfrm>
+      </p:grpSpPr>
+      <p:sp>
+        <p:nvSpPr>
+          <p:cNvPr id="2" name="Slide Image Placeholder 1"/>
+          <p:cNvSpPr>
+            <a:spLocks noGrp="1" noRot="1" noChangeAspect="1"/>
+          </p:cNvSpPr>
+          <p:nvPr>
+            <p:ph type="sldImg"/>
+          </p:nvPr>
+        </p:nvSpPr>
+        <p:spPr/>
+      </p:sp>
+      <p:sp>
+        <p:nvSpPr>
+          <p:cNvPr id="3" name="Notes Placeholder 2"/>
+          <p:cNvSpPr>
+            <a:spLocks noGrp="1"/>
+          </p:cNvSpPr>
+          <p:nvPr>
+            <p:ph type="body" idx="1"/>
+          </p:nvPr>
+        </p:nvSpPr>
+        <p:spPr/>
+        <p:txBody>
+          <a:bodyPr/>
+          <a:lstStyle/>
+          <a:p>
+            <a:r>
+              <a:rPr lang="en-IE" dirty="0"/>
+              <a:t>We chose </a:t>
+            </a:r>
+            <a:r>
+              <a:rPr lang="en-IE" dirty="0" err="1"/>
+              <a:t>LeetCode</a:t>
+            </a:r>
+            <a:r>
+              <a:rPr lang="en-IE" dirty="0"/>
+              <a:t> as the question bank. </a:t>
+            </a:r>
+          </a:p>
+          <a:p>
+            <a:r>
+              <a:rPr lang="en-IE" dirty="0"/>
+              <a:t>This is because it had some important qualities. </a:t>
+            </a:r>
+          </a:p>
+          <a:p>
+            <a:pPr marL="228600" indent="-228600">
+              <a:buAutoNum type="arabicPeriod"/>
+            </a:pPr>
+            <a:r>
+              <a:rPr lang="en-IE" dirty="0"/>
+              <a:t>There is an active community. There was new questions added regularly, new test cases were validated and a forum to help people with issues or just general discussion of solutions. </a:t>
+            </a:r>
+          </a:p>
+          <a:p>
+            <a:pPr marL="228600" indent="-228600">
+              <a:buAutoNum type="arabicPeriod"/>
+            </a:pPr>
+            <a:r>
+              <a:rPr lang="en-IE" dirty="0"/>
+              <a:t>There existed an online judge system. This meant that any bias that we might have had  was nullified. Our solutions would only be accepted if they passes their test cases. </a:t>
+            </a:r>
+          </a:p>
+          <a:p>
+            <a:pPr marL="228600" indent="-228600">
+              <a:buAutoNum type="arabicPeriod"/>
+            </a:pPr>
+            <a:r>
+              <a:rPr lang="en-IE" dirty="0"/>
+              <a:t>We wanted a wide range of questions to choose from. This meant we could choose from varied types of questions to gather our data.</a:t>
+            </a:r>
+          </a:p>
+          <a:p>
+            <a:pPr marL="0" indent="0">
+              <a:buNone/>
+            </a:pPr>
+            <a:endParaRPr lang="en-IE" dirty="0"/>
+          </a:p>
+          <a:p>
+            <a:pPr marL="0" indent="0">
+              <a:buNone/>
+            </a:pPr>
+            <a:r>
+              <a:rPr lang="en-IE" dirty="0"/>
+              <a:t>For this project we chose Java as the language. Any language would have been acceptable really as we are only giving pseudocode which shows the abstracted ideas of the patterns. </a:t>
+            </a:r>
+            <a:r>
+              <a:rPr lang="en-IE" dirty="0" err="1"/>
+              <a:t>LeetCode</a:t>
+            </a:r>
+            <a:r>
+              <a:rPr lang="en-IE" dirty="0"/>
+              <a:t> is compatible with major languages like C# and Python. It even supports newer languages like </a:t>
+            </a:r>
+            <a:r>
+              <a:rPr lang="en-IE" dirty="0" err="1"/>
+              <a:t>Kotlin</a:t>
+            </a:r>
+            <a:r>
+              <a:rPr lang="en-IE" dirty="0"/>
+              <a:t>. </a:t>
+            </a:r>
+          </a:p>
+          <a:p>
+            <a:pPr marL="0" indent="0">
+              <a:buNone/>
+            </a:pPr>
+            <a:endParaRPr lang="en-IE" dirty="0"/>
+          </a:p>
+        </p:txBody>
+      </p:sp>
+      <p:sp>
+        <p:nvSpPr>
+          <p:cNvPr id="4" name="Slide Number Placeholder 3"/>
+          <p:cNvSpPr>
+            <a:spLocks noGrp="1"/>
+          </p:cNvSpPr>
+          <p:nvPr>
+            <p:ph type="sldNum" sz="quarter" idx="10"/>
+          </p:nvPr>
+        </p:nvSpPr>
+        <p:spPr/>
+        <p:txBody>
+          <a:bodyPr/>
+          <a:lstStyle/>
+          <a:p>
+            <a:fld id="{82869989-EB00-4EE7-BCB5-25BDC5BB29F8}" type="slidenum">
+              <a:rPr lang="en-US" smtClean="0"/>
+              <a:t>5</a:t>
+            </a:fld>
+            <a:endParaRPr lang="en-US"/>
+          </a:p>
+        </p:txBody>
+      </p:sp>
+    </p:spTree>
+    <p:extLst>
+      <p:ext uri="{BB962C8B-B14F-4D97-AF65-F5344CB8AC3E}">
+        <p14:creationId xmlns:p14="http://schemas.microsoft.com/office/powerpoint/2010/main" val="3338003154"/>
+      </p:ext>
+    </p:extLst>
+  </p:cSld>
+  <p:clrMapOvr>
+    <a:masterClrMapping/>
+  </p:clrMapOvr>
+</p:notes>
+</file>
+
+<file path=ppt/notesSlides/notesSlide6.xml><?xml version="1.0" encoding="utf-8"?>
+<p:notes xmlns:a="http://schemas.openxmlformats.org/drawingml/2006/main" xmlns:r="http://schemas.openxmlformats.org/officeDocument/2006/relationships" xmlns:p="http://schemas.openxmlformats.org/presentationml/2006/main">
+  <p:cSld>
+    <p:spTree>
+      <p:nvGrpSpPr>
+        <p:cNvPr id="1" name=""/>
+        <p:cNvGrpSpPr/>
+        <p:nvPr/>
+      </p:nvGrpSpPr>
+      <p:grpSpPr>
+        <a:xfrm>
+          <a:off x="0" y="0"/>
+          <a:ext cx="0" cy="0"/>
+          <a:chOff x="0" y="0"/>
+          <a:chExt cx="0" cy="0"/>
+        </a:xfrm>
+      </p:grpSpPr>
+      <p:sp>
+        <p:nvSpPr>
+          <p:cNvPr id="2" name="Slide Image Placeholder 1"/>
+          <p:cNvSpPr>
+            <a:spLocks noGrp="1" noRot="1" noChangeAspect="1"/>
+          </p:cNvSpPr>
+          <p:nvPr>
+            <p:ph type="sldImg"/>
+          </p:nvPr>
+        </p:nvSpPr>
+        <p:spPr/>
+      </p:sp>
+      <p:sp>
+        <p:nvSpPr>
+          <p:cNvPr id="3" name="Notes Placeholder 2"/>
+          <p:cNvSpPr>
+            <a:spLocks noGrp="1"/>
+          </p:cNvSpPr>
+          <p:nvPr>
+            <p:ph type="body" idx="1"/>
+          </p:nvPr>
+        </p:nvSpPr>
+        <p:spPr/>
+        <p:txBody>
+          <a:bodyPr/>
+          <a:lstStyle/>
+          <a:p>
+            <a:r>
+              <a:rPr lang="en-IE" dirty="0"/>
+              <a:t>When we start a question, we first take a few minutes to judge which pattern is best suited to solve the question. </a:t>
+            </a:r>
+          </a:p>
+          <a:p>
+            <a:r>
+              <a:rPr lang="en-IE" dirty="0"/>
+              <a:t>We then apply this pattern to solve the question. Once it was accepted by the judge system, we compared the solution to the pattern we previously selected. </a:t>
+            </a:r>
+          </a:p>
+          <a:p>
+            <a:r>
+              <a:rPr lang="en-IE" dirty="0"/>
+              <a:t>Our first comparison was based off our intuition. </a:t>
+            </a:r>
+          </a:p>
+          <a:p>
+            <a:r>
+              <a:rPr lang="en-IE" dirty="0"/>
+              <a:t>To support our intuition we needed a numerical value. To obtain this we counted the number of edit operations, the addition and/or deletion of code, to transform a piece of code into another. </a:t>
+            </a:r>
+          </a:p>
+          <a:p>
+            <a:r>
+              <a:rPr lang="en-IE" dirty="0"/>
+              <a:t>We used Control Flow Graphs to obtain the value. We created CFGs for every pattern, and compared these with the solutions. In this cases we were counting how many nodes and/or edges we needed to add or delete. </a:t>
+            </a:r>
+          </a:p>
+          <a:p>
+            <a:r>
+              <a:rPr lang="en-IE" dirty="0"/>
+              <a:t>Each operation was given a value of one. </a:t>
+            </a:r>
+          </a:p>
+          <a:p>
+            <a:r>
+              <a:rPr lang="en-IE" dirty="0"/>
+              <a:t>We totalled the edit operations, if the number was below 10 then they were similar. If it was above 10 then they were dissimilar. </a:t>
+            </a:r>
+          </a:p>
+        </p:txBody>
+      </p:sp>
+      <p:sp>
+        <p:nvSpPr>
+          <p:cNvPr id="4" name="Slide Number Placeholder 3"/>
+          <p:cNvSpPr>
+            <a:spLocks noGrp="1"/>
+          </p:cNvSpPr>
+          <p:nvPr>
+            <p:ph type="sldNum" sz="quarter" idx="10"/>
+          </p:nvPr>
+        </p:nvSpPr>
+        <p:spPr/>
+        <p:txBody>
+          <a:bodyPr/>
+          <a:lstStyle/>
+          <a:p>
+            <a:fld id="{82869989-EB00-4EE7-BCB5-25BDC5BB29F8}" type="slidenum">
+              <a:rPr lang="en-US" smtClean="0"/>
+              <a:t>6</a:t>
+            </a:fld>
+            <a:endParaRPr lang="en-US"/>
+          </a:p>
+        </p:txBody>
+      </p:sp>
+    </p:spTree>
+    <p:extLst>
+      <p:ext uri="{BB962C8B-B14F-4D97-AF65-F5344CB8AC3E}">
+        <p14:creationId xmlns:p14="http://schemas.microsoft.com/office/powerpoint/2010/main" val="3620609630"/>
+      </p:ext>
+    </p:extLst>
+  </p:cSld>
+  <p:clrMapOvr>
+    <a:masterClrMapping/>
+  </p:clrMapOvr>
+</p:notes>
+</file>
+
+<file path=ppt/notesSlides/notesSlide7.xml><?xml version="1.0" encoding="utf-8"?>
+<p:notes xmlns:a="http://schemas.openxmlformats.org/drawingml/2006/main" xmlns:r="http://schemas.openxmlformats.org/officeDocument/2006/relationships" xmlns:p="http://schemas.openxmlformats.org/presentationml/2006/main">
+  <p:cSld>
+    <p:spTree>
+      <p:nvGrpSpPr>
+        <p:cNvPr id="1" name=""/>
+        <p:cNvGrpSpPr/>
+        <p:nvPr/>
+      </p:nvGrpSpPr>
+      <p:grpSpPr>
+        <a:xfrm>
+          <a:off x="0" y="0"/>
+          <a:ext cx="0" cy="0"/>
+          <a:chOff x="0" y="0"/>
+          <a:chExt cx="0" cy="0"/>
+        </a:xfrm>
+      </p:grpSpPr>
+      <p:sp>
+        <p:nvSpPr>
+          <p:cNvPr id="2" name="Slide Image Placeholder 1"/>
+          <p:cNvSpPr>
+            <a:spLocks noGrp="1" noRot="1" noChangeAspect="1"/>
+          </p:cNvSpPr>
+          <p:nvPr>
+            <p:ph type="sldImg"/>
+          </p:nvPr>
+        </p:nvSpPr>
+        <p:spPr/>
+      </p:sp>
+      <p:sp>
+        <p:nvSpPr>
+          <p:cNvPr id="3" name="Notes Placeholder 2"/>
+          <p:cNvSpPr>
+            <a:spLocks noGrp="1"/>
+          </p:cNvSpPr>
+          <p:nvPr>
+            <p:ph type="body" idx="1"/>
+          </p:nvPr>
+        </p:nvSpPr>
+        <p:spPr/>
+        <p:txBody>
+          <a:bodyPr/>
+          <a:lstStyle/>
+          <a:p>
+            <a:r>
+              <a:rPr lang="en-IE" dirty="0"/>
+              <a:t>Here I give an example of how CFGs are used to judge similarity between a pattern and solution. </a:t>
+            </a:r>
+          </a:p>
+          <a:p>
+            <a:r>
+              <a:rPr lang="en-IE" dirty="0"/>
+              <a:t>The first is the standard algorithmic pattern, Palindrome. </a:t>
+            </a:r>
+          </a:p>
+          <a:p>
+            <a:r>
+              <a:rPr lang="en-IE" dirty="0"/>
+              <a:t>It contains 6 nodes and 6 edges. A total of 12. </a:t>
+            </a:r>
+          </a:p>
+          <a:p>
+            <a:r>
+              <a:rPr lang="en-IE" dirty="0"/>
+              <a:t>The second is the question TwoSum. We solved it using the Palindrome Algorithm.</a:t>
+            </a:r>
+          </a:p>
+          <a:p>
+            <a:r>
+              <a:rPr lang="en-IE" dirty="0"/>
+              <a:t>To back up our intuition it can be seen that this CFG has 8 nodes and 10 edges, a total of 18. </a:t>
+            </a:r>
+          </a:p>
+          <a:p>
+            <a:r>
+              <a:rPr lang="en-IE" dirty="0"/>
+              <a:t>Therefore, 6 edit operations would be required to transform one into the other. </a:t>
+            </a:r>
+          </a:p>
+          <a:p>
+            <a:r>
+              <a:rPr lang="en-IE" dirty="0"/>
+              <a:t>Therefore, the solution to TwoSum is related to the Palindrome Algorithm.</a:t>
+            </a:r>
+          </a:p>
+        </p:txBody>
+      </p:sp>
+      <p:sp>
+        <p:nvSpPr>
+          <p:cNvPr id="4" name="Slide Number Placeholder 3"/>
+          <p:cNvSpPr>
+            <a:spLocks noGrp="1"/>
+          </p:cNvSpPr>
+          <p:nvPr>
+            <p:ph type="sldNum" sz="quarter" idx="10"/>
+          </p:nvPr>
+        </p:nvSpPr>
+        <p:spPr/>
+        <p:txBody>
+          <a:bodyPr/>
+          <a:lstStyle/>
+          <a:p>
+            <a:fld id="{82869989-EB00-4EE7-BCB5-25BDC5BB29F8}" type="slidenum">
+              <a:rPr lang="en-US" smtClean="0"/>
+              <a:t>7</a:t>
+            </a:fld>
+            <a:endParaRPr lang="en-US"/>
+          </a:p>
+        </p:txBody>
+      </p:sp>
+    </p:spTree>
+    <p:extLst>
+      <p:ext uri="{BB962C8B-B14F-4D97-AF65-F5344CB8AC3E}">
+        <p14:creationId xmlns:p14="http://schemas.microsoft.com/office/powerpoint/2010/main" val="2799087920"/>
+      </p:ext>
+    </p:extLst>
+  </p:cSld>
+  <p:clrMapOvr>
+    <a:masterClrMapping/>
+  </p:clrMapOvr>
+</p:notes>
+</file>
+
+<file path=ppt/notesSlides/notesSlide8.xml><?xml version="1.0" encoding="utf-8"?>
+<p:notes xmlns:a="http://schemas.openxmlformats.org/drawingml/2006/main" xmlns:r="http://schemas.openxmlformats.org/officeDocument/2006/relationships" xmlns:p="http://schemas.openxmlformats.org/presentationml/2006/main">
+  <p:cSld>
+    <p:spTree>
+      <p:nvGrpSpPr>
+        <p:cNvPr id="1" name=""/>
+        <p:cNvGrpSpPr/>
+        <p:nvPr/>
+      </p:nvGrpSpPr>
+      <p:grpSpPr>
+        <a:xfrm>
+          <a:off x="0" y="0"/>
+          <a:ext cx="0" cy="0"/>
+          <a:chOff x="0" y="0"/>
+          <a:chExt cx="0" cy="0"/>
+        </a:xfrm>
+      </p:grpSpPr>
+      <p:sp>
+        <p:nvSpPr>
+          <p:cNvPr id="2" name="Slide Image Placeholder 1"/>
+          <p:cNvSpPr>
+            <a:spLocks noGrp="1" noRot="1" noChangeAspect="1"/>
+          </p:cNvSpPr>
+          <p:nvPr>
+            <p:ph type="sldImg"/>
+          </p:nvPr>
+        </p:nvSpPr>
+        <p:spPr/>
+      </p:sp>
+      <p:sp>
+        <p:nvSpPr>
+          <p:cNvPr id="3" name="Notes Placeholder 2"/>
+          <p:cNvSpPr>
+            <a:spLocks noGrp="1"/>
+          </p:cNvSpPr>
+          <p:nvPr>
+            <p:ph type="body" idx="1"/>
+          </p:nvPr>
+        </p:nvSpPr>
+        <p:spPr/>
+        <p:txBody>
+          <a:bodyPr/>
+          <a:lstStyle/>
+          <a:p>
+            <a:r>
+              <a:rPr lang="en-IE" dirty="0"/>
+              <a:t>Here is the total data for the 36 questions that we solved. The first graph shows the frequency each pattern we focused on appeared. </a:t>
+            </a:r>
+          </a:p>
+          <a:p>
+            <a:r>
+              <a:rPr lang="en-IE" dirty="0"/>
+              <a:t>Tree traversal appeared 6 times, Palindrome appeared 5 times. </a:t>
+            </a:r>
+          </a:p>
+          <a:p>
+            <a:r>
+              <a:rPr lang="en-IE" dirty="0"/>
+              <a:t>The total here is 21 appearances. The other 15 solutions were solved without using aby of the algorithms we chose to focus on. </a:t>
+            </a:r>
+          </a:p>
+          <a:p>
+            <a:endParaRPr lang="en-IE" dirty="0"/>
+          </a:p>
+          <a:p>
+            <a:r>
+              <a:rPr lang="en-IE" dirty="0"/>
+              <a:t>Secondly I am showing the frequency of the data structures that were used in the solutions. Arrays were clearly used the most. </a:t>
+            </a:r>
+          </a:p>
+          <a:p>
+            <a:r>
+              <a:rPr lang="en-IE" dirty="0"/>
+              <a:t>Combining these two tables results in the full table which can be found in the paper in the evaluation section. </a:t>
+            </a:r>
+          </a:p>
+        </p:txBody>
+      </p:sp>
+      <p:sp>
+        <p:nvSpPr>
+          <p:cNvPr id="4" name="Slide Number Placeholder 3"/>
+          <p:cNvSpPr>
+            <a:spLocks noGrp="1"/>
+          </p:cNvSpPr>
+          <p:nvPr>
+            <p:ph type="sldNum" sz="quarter" idx="10"/>
+          </p:nvPr>
+        </p:nvSpPr>
+        <p:spPr/>
+        <p:txBody>
+          <a:bodyPr/>
+          <a:lstStyle/>
+          <a:p>
+            <a:fld id="{82869989-EB00-4EE7-BCB5-25BDC5BB29F8}" type="slidenum">
+              <a:rPr lang="en-US" smtClean="0"/>
+              <a:t>8</a:t>
+            </a:fld>
+            <a:endParaRPr lang="en-US"/>
+          </a:p>
+        </p:txBody>
+      </p:sp>
+    </p:spTree>
+    <p:extLst>
+      <p:ext uri="{BB962C8B-B14F-4D97-AF65-F5344CB8AC3E}">
+        <p14:creationId xmlns:p14="http://schemas.microsoft.com/office/powerpoint/2010/main" val="1833357859"/>
+      </p:ext>
+    </p:extLst>
+  </p:cSld>
+  <p:clrMapOvr>
+    <a:masterClrMapping/>
+  </p:clrMapOvr>
+</p:notes>
+</file>
+
+<file path=ppt/notesSlides/notesSlide9.xml><?xml version="1.0" encoding="utf-8"?>
+<p:notes xmlns:a="http://schemas.openxmlformats.org/drawingml/2006/main" xmlns:r="http://schemas.openxmlformats.org/officeDocument/2006/relationships" xmlns:p="http://schemas.openxmlformats.org/presentationml/2006/main">
+  <p:cSld>
+    <p:spTree>
+      <p:nvGrpSpPr>
+        <p:cNvPr id="1" name=""/>
+        <p:cNvGrpSpPr/>
+        <p:nvPr/>
+      </p:nvGrpSpPr>
+      <p:grpSpPr>
+        <a:xfrm>
+          <a:off x="0" y="0"/>
+          <a:ext cx="0" cy="0"/>
+          <a:chOff x="0" y="0"/>
+          <a:chExt cx="0" cy="0"/>
+        </a:xfrm>
+      </p:grpSpPr>
+      <p:sp>
+        <p:nvSpPr>
+          <p:cNvPr id="2" name="Slide Image Placeholder 1"/>
+          <p:cNvSpPr>
+            <a:spLocks noGrp="1" noRot="1" noChangeAspect="1"/>
+          </p:cNvSpPr>
+          <p:nvPr>
+            <p:ph type="sldImg"/>
+          </p:nvPr>
+        </p:nvSpPr>
+        <p:spPr/>
+      </p:sp>
+      <p:sp>
+        <p:nvSpPr>
+          <p:cNvPr id="3" name="Notes Placeholder 2"/>
+          <p:cNvSpPr>
+            <a:spLocks noGrp="1"/>
+          </p:cNvSpPr>
+          <p:nvPr>
+            <p:ph type="body" idx="1"/>
+          </p:nvPr>
+        </p:nvSpPr>
+        <p:spPr/>
+        <p:txBody>
+          <a:bodyPr/>
+          <a:lstStyle/>
+          <a:p>
+            <a:r>
+              <a:rPr lang="en-IE" dirty="0"/>
+              <a:t>Overall there is a clear link between interview questions and standard algorithms that reader will have learned in a programming course. </a:t>
+            </a:r>
+          </a:p>
+          <a:p>
+            <a:r>
+              <a:rPr lang="en-IE" dirty="0"/>
+              <a:t>We’ve shown that by learning these standard algorithms, a programmer can use them to answer a variety of questions, some which are outside the norm relating to each identified algorithm.</a:t>
+            </a:r>
+          </a:p>
+          <a:p>
+            <a:r>
+              <a:rPr lang="en-IE" dirty="0"/>
+              <a:t>We’ve also shown that by spending more time on the patterns of each algorithm, a user should be able to then answer more interview questions, as they have a deeper understanding of the patterns and their flexibility.</a:t>
+            </a:r>
+          </a:p>
+          <a:p>
+            <a:r>
+              <a:rPr lang="en-IE" dirty="0"/>
+              <a:t>Our approach in this paper was manual. We solved each question ourselves. This means our approach was close to the interview experiences itself as both have a human aspect. </a:t>
+            </a:r>
+          </a:p>
+          <a:p>
+            <a:endParaRPr lang="en-IE" dirty="0"/>
+          </a:p>
+          <a:p>
+            <a:r>
+              <a:rPr lang="en-IE" dirty="0"/>
+              <a:t>Future Works:</a:t>
+            </a:r>
+          </a:p>
+          <a:p>
+            <a:r>
+              <a:rPr lang="en-IE" dirty="0"/>
+              <a:t>This thesis is an initial study into the link between interview questions and standard algorithms.</a:t>
+            </a:r>
+          </a:p>
+          <a:p>
+            <a:r>
+              <a:rPr lang="en-IE" dirty="0"/>
+              <a:t>We see the following two improvements as good future work:</a:t>
+            </a:r>
+          </a:p>
+          <a:p>
+            <a:pPr marL="228600" indent="-228600">
+              <a:buAutoNum type="arabicPeriod"/>
+            </a:pPr>
+            <a:r>
+              <a:rPr lang="en-IE" dirty="0"/>
+              <a:t>Machine Learning techniques could be utilised to quickly predicate which algorithmic pattern would be best applied to a given interview question.</a:t>
+            </a:r>
+          </a:p>
+          <a:p>
+            <a:pPr marL="228600" indent="-228600">
+              <a:buAutoNum type="arabicPeriod"/>
+            </a:pPr>
+            <a:r>
+              <a:rPr lang="en-IE" dirty="0"/>
+              <a:t>It would be useful to develop an automatic similarity validator for comparing some given solutions for questions, to the standard algorithms’ patterns. </a:t>
+            </a:r>
+          </a:p>
+          <a:p>
+            <a:pPr marL="228600" indent="-228600">
+              <a:buAutoNum type="arabicPeriod"/>
+            </a:pPr>
+            <a:endParaRPr lang="en-IE" dirty="0"/>
+          </a:p>
+          <a:p>
+            <a:endParaRPr lang="en-IE" dirty="0"/>
+          </a:p>
+        </p:txBody>
+      </p:sp>
+      <p:sp>
+        <p:nvSpPr>
+          <p:cNvPr id="4" name="Slide Number Placeholder 3"/>
+          <p:cNvSpPr>
+            <a:spLocks noGrp="1"/>
+          </p:cNvSpPr>
+          <p:nvPr>
+            <p:ph type="sldNum" sz="quarter" idx="10"/>
+          </p:nvPr>
+        </p:nvSpPr>
+        <p:spPr/>
+        <p:txBody>
+          <a:bodyPr/>
+          <a:lstStyle/>
+          <a:p>
+            <a:fld id="{82869989-EB00-4EE7-BCB5-25BDC5BB29F8}" type="slidenum">
+              <a:rPr lang="en-US" smtClean="0"/>
+              <a:t>9</a:t>
+            </a:fld>
+            <a:endParaRPr lang="en-US"/>
+          </a:p>
+        </p:txBody>
+      </p:sp>
+    </p:spTree>
+    <p:extLst>
+      <p:ext uri="{BB962C8B-B14F-4D97-AF65-F5344CB8AC3E}">
+        <p14:creationId xmlns:p14="http://schemas.microsoft.com/office/powerpoint/2010/main" val="429888891"/>
       </p:ext>
     </p:extLst>
   </p:cSld>
@@ -21230,7 +22313,7 @@
           <a:p>
             <a:r>
               <a:rPr lang="en-US" dirty="0"/>
-              <a:t>Problem Formulation.</a:t>
+              <a:t>The Problem</a:t>
             </a:r>
           </a:p>
           <a:p>
@@ -21247,10 +22330,9 @@
           </a:p>
           <a:p>
             <a:r>
-              <a:rPr lang="en-US"/>
+              <a:rPr lang="en-US" dirty="0"/>
               <a:t>Concrete Example.</a:t>
             </a:r>
-            <a:endParaRPr lang="en-US" dirty="0"/>
           </a:p>
           <a:p>
             <a:r>
@@ -21927,7 +23009,7 @@
           <p:nvPr/>
         </p:nvPicPr>
         <p:blipFill>
-          <a:blip r:embed="rId2"/>
+          <a:blip r:embed="rId3"/>
           <a:stretch>
             <a:fillRect/>
           </a:stretch>
@@ -22001,7 +23083,7 @@
           <a:p>
             <a:r>
               <a:rPr lang="en-US" dirty="0"/>
-              <a:t>Problem Formulation</a:t>
+              <a:t>The Problem</a:t>
             </a:r>
           </a:p>
         </p:txBody>
@@ -22021,7 +23103,7 @@
           <p:nvPr/>
         </p:nvPicPr>
         <p:blipFill>
-          <a:blip r:embed="rId2"/>
+          <a:blip r:embed="rId3"/>
           <a:stretch>
             <a:fillRect/>
           </a:stretch>
@@ -22629,7 +23711,7 @@
           <p:nvPr/>
         </p:nvPicPr>
         <p:blipFill>
-          <a:blip r:embed="rId3"/>
+          <a:blip r:embed="rId4"/>
           <a:stretch>
             <a:fillRect/>
           </a:stretch>
@@ -23045,7 +24127,7 @@
           <p:nvPr/>
         </p:nvPicPr>
         <p:blipFill>
-          <a:blip r:embed="rId2"/>
+          <a:blip r:embed="rId3"/>
           <a:stretch>
             <a:fillRect/>
           </a:stretch>
@@ -23075,7 +24157,7 @@
           <p:nvPr/>
         </p:nvPicPr>
         <p:blipFill>
-          <a:blip r:embed="rId3"/>
+          <a:blip r:embed="rId4"/>
           <a:stretch>
             <a:fillRect/>
           </a:stretch>
@@ -23105,7 +24187,7 @@
           <p:nvPr/>
         </p:nvPicPr>
         <p:blipFill>
-          <a:blip r:embed="rId4"/>
+          <a:blip r:embed="rId5"/>
           <a:stretch>
             <a:fillRect/>
           </a:stretch>
@@ -23205,7 +24287,7 @@
         </p:xfrm>
         <a:graphic>
           <a:graphicData uri="http://schemas.openxmlformats.org/drawingml/2006/diagram">
-            <dgm:relIds xmlns:dgm="http://schemas.openxmlformats.org/drawingml/2006/diagram" xmlns:r="http://schemas.openxmlformats.org/officeDocument/2006/relationships" r:dm="rId2" r:lo="rId3" r:qs="rId4" r:cs="rId5"/>
+            <dgm:relIds xmlns:dgm="http://schemas.openxmlformats.org/drawingml/2006/diagram" xmlns:r="http://schemas.openxmlformats.org/officeDocument/2006/relationships" r:dm="rId3" r:lo="rId4" r:qs="rId5" r:cs="rId6"/>
           </a:graphicData>
         </a:graphic>
       </p:graphicFrame>
@@ -23325,7 +24407,7 @@
           <p:nvPr/>
         </p:nvPicPr>
         <p:blipFill>
-          <a:blip r:embed="rId7"/>
+          <a:blip r:embed="rId8"/>
           <a:stretch>
             <a:fillRect/>
           </a:stretch>
@@ -23445,7 +24527,7 @@
             <p:nvPr/>
           </p:nvPicPr>
           <p:blipFill>
-            <a:blip r:embed="rId2"/>
+            <a:blip r:embed="rId3"/>
             <a:stretch>
               <a:fillRect/>
             </a:stretch>
@@ -23531,7 +24613,7 @@
             <p:nvPr/>
           </p:nvPicPr>
           <p:blipFill>
-            <a:blip r:embed="rId3"/>
+            <a:blip r:embed="rId4"/>
             <a:stretch>
               <a:fillRect/>
             </a:stretch>
@@ -23576,15 +24658,7 @@
             <a:p>
               <a:r>
                 <a:rPr lang="en-IE" dirty="0"/>
-                <a:t>CFG for </a:t>
-              </a:r>
-              <a:r>
-                <a:rPr lang="en-IE" dirty="0" err="1"/>
-                <a:t>TwoSum</a:t>
-              </a:r>
-              <a:r>
-                <a:rPr lang="en-IE" dirty="0"/>
-                <a:t> question on </a:t>
+                <a:t>CFG for TwoSum question on </a:t>
               </a:r>
               <a:r>
                 <a:rPr lang="en-IE" dirty="0" err="1"/>
@@ -23686,7 +24760,7 @@
         </p:xfrm>
         <a:graphic>
           <a:graphicData uri="http://schemas.openxmlformats.org/drawingml/2006/chart">
-            <c:chart xmlns:c="http://schemas.openxmlformats.org/drawingml/2006/chart" xmlns:r="http://schemas.openxmlformats.org/officeDocument/2006/relationships" r:id="rId2"/>
+            <c:chart xmlns:c="http://schemas.openxmlformats.org/drawingml/2006/chart" xmlns:r="http://schemas.openxmlformats.org/officeDocument/2006/relationships" r:id="rId3"/>
           </a:graphicData>
         </a:graphic>
       </p:graphicFrame>
@@ -23716,7 +24790,7 @@
         </p:xfrm>
         <a:graphic>
           <a:graphicData uri="http://schemas.openxmlformats.org/drawingml/2006/chart">
-            <c:chart xmlns:c="http://schemas.openxmlformats.org/drawingml/2006/chart" xmlns:r="http://schemas.openxmlformats.org/officeDocument/2006/relationships" r:id="rId3"/>
+            <c:chart xmlns:c="http://schemas.openxmlformats.org/drawingml/2006/chart" xmlns:r="http://schemas.openxmlformats.org/officeDocument/2006/relationships" r:id="rId4"/>
           </a:graphicData>
         </a:graphic>
       </p:graphicFrame>

</xml_diff>

<commit_message>
Updated few slids, notes cleaner andconcise
</commit_message>
<xml_diff>
--- a/presentation/New Thesis Presentation.pptx
+++ b/presentation/New Thesis Presentation.pptx
@@ -20,7 +20,7 @@
     <p:sldId id="273" r:id="rId8"/>
     <p:sldId id="266" r:id="rId9"/>
     <p:sldId id="272" r:id="rId10"/>
-    <p:sldId id="271" r:id="rId11"/>
+    <p:sldId id="274" r:id="rId11"/>
   </p:sldIdLst>
   <p:sldSz cx="12192000" cy="6858000"/>
   <p:notesSz cx="6858000" cy="9144000"/>
@@ -150,6 +150,10 @@
         <p14:section name="Methodology" id="{68B5FE72-28C3-4FC2-9103-7D3861B07DC9}">
           <p14:sldIdLst>
             <p14:sldId id="264"/>
+          </p14:sldIdLst>
+        </p14:section>
+        <p14:section name="Concrete Example" id="{691762C5-3063-4EBF-BE9E-5E674ED8641E}">
+          <p14:sldIdLst>
             <p14:sldId id="273"/>
           </p14:sldIdLst>
         </p14:section>
@@ -163,9 +167,9 @@
             <p14:sldId id="272"/>
           </p14:sldIdLst>
         </p14:section>
-        <p14:section name="Future Work" id="{3CC1A3CD-6760-474B-ADB2-98BE0243CDCC}">
+        <p14:section name="Questions" id="{3CC1A3CD-6760-474B-ADB2-98BE0243CDCC}">
           <p14:sldIdLst>
-            <p14:sldId id="271"/>
+            <p14:sldId id="274"/>
           </p14:sldIdLst>
         </p14:section>
       </p14:sectionLst>
@@ -5803,7 +5807,7 @@
           <a:p>
             <a:fld id="{59041DB8-B66F-4DC8-A96E-33677E0F90FF}" type="datetimeFigureOut">
               <a:rPr lang="en-US" smtClean="0"/>
-              <a:t>1/17/2018</a:t>
+              <a:t>1/18/2018</a:t>
             </a:fld>
             <a:endParaRPr lang="en-US"/>
           </a:p>
@@ -5968,7 +5972,7 @@
           <a:p>
             <a:fld id="{DEB49C4A-65AC-492D-9701-81B46C3AD0E4}" type="datetimeFigureOut">
               <a:rPr lang="en-US" smtClean="0"/>
-              <a:t>1/17/2018</a:t>
+              <a:t>1/18/2018</a:t>
             </a:fld>
             <a:endParaRPr lang="en-US"/>
           </a:p>
@@ -6330,6 +6334,166 @@
 </p:notes>
 </file>
 
+<file path=ppt/notesSlides/notesSlide10.xml><?xml version="1.0" encoding="utf-8"?>
+<p:notes xmlns:a="http://schemas.openxmlformats.org/drawingml/2006/main" xmlns:r="http://schemas.openxmlformats.org/officeDocument/2006/relationships" xmlns:p="http://schemas.openxmlformats.org/presentationml/2006/main">
+  <p:cSld>
+    <p:spTree>
+      <p:nvGrpSpPr>
+        <p:cNvPr id="1" name=""/>
+        <p:cNvGrpSpPr/>
+        <p:nvPr/>
+      </p:nvGrpSpPr>
+      <p:grpSpPr>
+        <a:xfrm>
+          <a:off x="0" y="0"/>
+          <a:ext cx="0" cy="0"/>
+          <a:chOff x="0" y="0"/>
+          <a:chExt cx="0" cy="0"/>
+        </a:xfrm>
+      </p:grpSpPr>
+      <p:sp>
+        <p:nvSpPr>
+          <p:cNvPr id="2" name="Slide Image Placeholder 1"/>
+          <p:cNvSpPr>
+            <a:spLocks noGrp="1" noRot="1" noChangeAspect="1"/>
+          </p:cNvSpPr>
+          <p:nvPr>
+            <p:ph type="sldImg"/>
+          </p:nvPr>
+        </p:nvSpPr>
+        <p:spPr/>
+      </p:sp>
+      <p:sp>
+        <p:nvSpPr>
+          <p:cNvPr id="3" name="Notes Placeholder 2"/>
+          <p:cNvSpPr>
+            <a:spLocks noGrp="1"/>
+          </p:cNvSpPr>
+          <p:nvPr>
+            <p:ph type="body" idx="1"/>
+          </p:nvPr>
+        </p:nvSpPr>
+        <p:spPr/>
+        <p:txBody>
+          <a:bodyPr/>
+          <a:lstStyle/>
+          <a:p>
+            <a:endParaRPr lang="en-IE" dirty="0"/>
+          </a:p>
+          <a:p>
+            <a:r>
+              <a:rPr lang="en-IE" dirty="0"/>
+              <a:t>The Problem:</a:t>
+            </a:r>
+          </a:p>
+          <a:p>
+            <a:r>
+              <a:rPr lang="en-IE" dirty="0"/>
+              <a:t>To be able to tackle the problem of helping interviewees prepare better for interviews, we first have to know where the industry was. </a:t>
+            </a:r>
+          </a:p>
+          <a:p>
+            <a:r>
+              <a:rPr lang="en-IE" dirty="0"/>
+              <a:t>We found interview preparatory books to be closely related, i.e. “Cracking the Coding Interview” by Gayle </a:t>
+            </a:r>
+            <a:r>
+              <a:rPr lang="en-IE" dirty="0" err="1"/>
+              <a:t>Lackmann</a:t>
+            </a:r>
+            <a:r>
+              <a:rPr lang="en-IE" dirty="0"/>
+              <a:t>.</a:t>
+            </a:r>
+          </a:p>
+          <a:p>
+            <a:r>
+              <a:rPr lang="en-IE" dirty="0"/>
+              <a:t>These books have sections candidates should prepare for interviews, such as Searching, Sorting, Recursion. </a:t>
+            </a:r>
+          </a:p>
+          <a:p>
+            <a:r>
+              <a:rPr lang="en-IE" dirty="0"/>
+              <a:t>These are useful as they have some questions on each topic area along with suggested solutions. </a:t>
+            </a:r>
+          </a:p>
+          <a:p>
+            <a:r>
+              <a:rPr lang="en-IE" dirty="0"/>
+              <a:t>But we find these to be an inefficient use of time, as a candidate can not prepare 50+ questions before an interview. </a:t>
+            </a:r>
+          </a:p>
+          <a:p>
+            <a:r>
+              <a:rPr lang="en-IE" dirty="0"/>
+              <a:t>There would be overlapping ideas that should be focused on more. </a:t>
+            </a:r>
+          </a:p>
+          <a:p>
+            <a:r>
+              <a:rPr lang="en-IE" dirty="0"/>
+              <a:t>Ex: If there are 4 questions solved using </a:t>
+            </a:r>
+            <a:r>
+              <a:rPr lang="en-IE" dirty="0" err="1"/>
+              <a:t>MergeSort</a:t>
+            </a:r>
+            <a:r>
+              <a:rPr lang="en-IE" dirty="0"/>
+              <a:t>, they all share common key steps. But if the book does not show that the same steps are taken, only altered to suit the question, then the book is limiting the readers’ ability to think outside the box and apply the patterns in different ways. </a:t>
+            </a:r>
+          </a:p>
+          <a:p>
+            <a:r>
+              <a:rPr lang="en-IE" dirty="0"/>
+              <a:t>Our approach is to show the reader that being comfortable with the patterns will result in them being flexible in thought, such that readers can apply a standard algorithm to multiple questions and not just limited cases. We want to reinforce material they would be familiar with.</a:t>
+            </a:r>
+          </a:p>
+          <a:p>
+            <a:endParaRPr lang="en-IE" dirty="0"/>
+          </a:p>
+          <a:p>
+            <a:endParaRPr lang="en-IE" dirty="0"/>
+          </a:p>
+        </p:txBody>
+      </p:sp>
+      <p:sp>
+        <p:nvSpPr>
+          <p:cNvPr id="4" name="Slide Number Placeholder 3"/>
+          <p:cNvSpPr>
+            <a:spLocks noGrp="1"/>
+          </p:cNvSpPr>
+          <p:nvPr>
+            <p:ph type="sldNum" sz="quarter" idx="10"/>
+          </p:nvPr>
+        </p:nvSpPr>
+        <p:spPr/>
+        <p:txBody>
+          <a:bodyPr/>
+          <a:lstStyle/>
+          <a:p>
+            <a:fld id="{82869989-EB00-4EE7-BCB5-25BDC5BB29F8}" type="slidenum">
+              <a:rPr lang="en-US" smtClean="0"/>
+              <a:t>10</a:t>
+            </a:fld>
+            <a:endParaRPr lang="en-US"/>
+          </a:p>
+        </p:txBody>
+      </p:sp>
+    </p:spTree>
+    <p:extLst>
+      <p:ext uri="{BB962C8B-B14F-4D97-AF65-F5344CB8AC3E}">
+        <p14:creationId xmlns:p14="http://schemas.microsoft.com/office/powerpoint/2010/main" val="998272021"/>
+      </p:ext>
+    </p:extLst>
+  </p:cSld>
+  <p:clrMapOvr>
+    <a:masterClrMapping/>
+  </p:clrMapOvr>
+</p:notes>
+</file>
+
 <file path=ppt/notesSlides/notesSlide2.xml><?xml version="1.0" encoding="utf-8"?>
 <p:notes xmlns:a="http://schemas.openxmlformats.org/drawingml/2006/main" xmlns:r="http://schemas.openxmlformats.org/officeDocument/2006/relationships" xmlns:p="http://schemas.openxmlformats.org/presentationml/2006/main">
   <p:cSld>
@@ -6466,43 +6630,31 @@
           <a:p>
             <a:r>
               <a:rPr lang="en-IE" dirty="0"/>
-              <a:t>Interviews are becoming more technical. </a:t>
+              <a:t>The motivation behind this thesis is that we found interviews are becoming more technical. </a:t>
             </a:r>
           </a:p>
           <a:p>
             <a:r>
               <a:rPr lang="en-IE" dirty="0"/>
-              <a:t>I have been through numerous interviews over the past 2 years, due to me finishing my undergraduate here in Maynooth and also with the requirement of my to complete a placement for my MSc. </a:t>
+              <a:t>Many companies are using technical tests to examine potential employees. </a:t>
             </a:r>
           </a:p>
           <a:p>
             <a:r>
               <a:rPr lang="en-IE" dirty="0"/>
-              <a:t>Many companies are using these technical tests to examine potential employees. These tests usually have a whiteboarding section. These can be quite stressful as the candidate must code freely in front of experienced programmers. </a:t>
+              <a:t>These tests usually have a whiteboarding section. These can be quite stressful as the candidate must code freely in front of experienced programmers on a wide range of topics.</a:t>
             </a:r>
           </a:p>
           <a:p>
             <a:r>
               <a:rPr lang="en-IE" dirty="0"/>
-              <a:t>One thing I personally noticed is that the questions had a bit of repetition amongst them. These were similarly styled solutions to unrelated questions. They seemed to be based off algorithms I had learned whilst taking an algorithm course.</a:t>
+              <a:t>To prepare for this test, people usually prepare as many questions as possible. This is very time consuming though and difficult as they need to revise topics numerous times. </a:t>
             </a:r>
           </a:p>
           <a:p>
             <a:r>
               <a:rPr lang="en-IE" dirty="0"/>
-              <a:t>I noticed binary search appeared a few times. </a:t>
-            </a:r>
-          </a:p>
-          <a:p>
-            <a:r>
-              <a:rPr lang="en-IE" dirty="0"/>
-              <a:t>Therefore, there must have been some form of pattern underneath. </a:t>
-            </a:r>
-          </a:p>
-          <a:p>
-            <a:r>
-              <a:rPr lang="en-IE" dirty="0"/>
-              <a:t>Therefore, we wanted to discover if there is a relationship between standard algorithms a programmer learned in a course and the interview questions.</a:t>
+              <a:t>Therefore, we wanted to discover if there is a more efficient way to prepare for interviews.</a:t>
             </a:r>
           </a:p>
         </p:txBody>
@@ -6589,13 +6741,98 @@
           <a:p>
             <a:r>
               <a:rPr lang="en-IE" dirty="0"/>
-              <a:t>To be able to tackle the problem of helping interviewees prepare better for interviews, we first have to know where the industry was. </a:t>
+              <a:t>The Problem:</a:t>
             </a:r>
+          </a:p>
+          <a:p>
+            <a:r>
+              <a:rPr lang="en-IE" sz="1200" kern="1200" dirty="0">
+                <a:solidFill>
+                  <a:schemeClr val="tx1"/>
+                </a:solidFill>
+                <a:effectLst/>
+                <a:latin typeface="+mn-lt"/>
+                <a:ea typeface="+mn-ea"/>
+                <a:cs typeface="+mn-cs"/>
+              </a:rPr>
+              <a:t>Preparing many questions before an interview can be quite time consuming. It is hard for interviewees to remember all the material that they would cover when answering these questions. </a:t>
+            </a:r>
+          </a:p>
+          <a:p>
+            <a:r>
+              <a:rPr lang="en-IE" sz="1200" kern="1200" dirty="0">
+                <a:solidFill>
+                  <a:schemeClr val="tx1"/>
+                </a:solidFill>
+                <a:effectLst/>
+                <a:latin typeface="+mn-lt"/>
+                <a:ea typeface="+mn-ea"/>
+                <a:cs typeface="+mn-cs"/>
+              </a:rPr>
+              <a:t>Even preparatory books are limited. They simply show readers a brief description of algorithms, some questions on a section and their solutions. They do not reinforce material that readers would already have studied. </a:t>
+            </a:r>
+          </a:p>
+          <a:p>
+            <a:r>
+              <a:rPr lang="en-IE" sz="1200" kern="1200" dirty="0">
+                <a:solidFill>
+                  <a:schemeClr val="tx1"/>
+                </a:solidFill>
+                <a:effectLst/>
+                <a:latin typeface="+mn-lt"/>
+                <a:ea typeface="+mn-ea"/>
+                <a:cs typeface="+mn-cs"/>
+              </a:rPr>
+              <a:t>This is limiting the candidates’ ability to think of different solutions in different ways. </a:t>
+            </a:r>
+          </a:p>
+          <a:p>
+            <a:r>
+              <a:rPr lang="en-IE" sz="1200" kern="1200" dirty="0">
+                <a:solidFill>
+                  <a:schemeClr val="tx1"/>
+                </a:solidFill>
+                <a:effectLst/>
+                <a:latin typeface="+mn-lt"/>
+                <a:ea typeface="+mn-ea"/>
+                <a:cs typeface="+mn-cs"/>
+              </a:rPr>
+              <a:t>We want to discover if the interview questions can be tied back to the material that a programmer would have covered during an Algorithms and Data Structures course., such as CS210 &amp; CS211 here in Maynooth University.</a:t>
+            </a:r>
+          </a:p>
+          <a:p>
+            <a:r>
+              <a:rPr lang="en-IE" sz="1200" kern="1200" dirty="0">
+                <a:solidFill>
+                  <a:schemeClr val="tx1"/>
+                </a:solidFill>
+                <a:effectLst/>
+                <a:latin typeface="+mn-lt"/>
+                <a:ea typeface="+mn-ea"/>
+                <a:cs typeface="+mn-cs"/>
+              </a:rPr>
+              <a:t>Our goal is to show the reader that being comfortable with the algorithms and their patterns will result in them being flexible in thought, such that they can apply standard algorithms to a variety of questions. </a:t>
+            </a:r>
+          </a:p>
+          <a:p>
+            <a:endParaRPr lang="en-IE" dirty="0"/>
           </a:p>
           <a:p>
             <a:r>
               <a:rPr lang="en-IE" dirty="0"/>
-              <a:t>We found interview preparatory books to be closely related, i.e. “Cracking the Coding Interview” by Gayle </a:t>
+              <a:t>Research Qs:</a:t>
+            </a:r>
+          </a:p>
+          <a:p>
+            <a:r>
+              <a:rPr lang="en-IE" dirty="0"/>
+              <a:t>This then lead us to develop 3 Research Qs that attempt to solve the problem of helping interviewees prepare for interviews efficiently. </a:t>
+            </a:r>
+          </a:p>
+          <a:p>
+            <a:r>
+              <a:rPr lang="en-IE" dirty="0"/>
+              <a:t>Q1. What standard algorithms do we choose to focus on.  We gathered information from books such as Cracking the Coding Interview by Gayle </a:t>
             </a:r>
             <a:r>
               <a:rPr lang="en-IE" dirty="0" err="1"/>
@@ -6603,78 +6840,19 @@
             </a:r>
             <a:r>
               <a:rPr lang="en-IE" dirty="0"/>
-              <a:t>.</a:t>
+              <a:t>, online forums discussing interview experiences and algorithms books.</a:t>
             </a:r>
           </a:p>
           <a:p>
             <a:r>
               <a:rPr lang="en-IE" dirty="0"/>
-              <a:t>These books have sections candidates should prepare for interviews, such as Searching, Sorting, Recursion. </a:t>
+              <a:t>We chose the Algorithms in the table below. </a:t>
             </a:r>
           </a:p>
           <a:p>
             <a:r>
               <a:rPr lang="en-IE" dirty="0"/>
-              <a:t>These are useful as they have some questions on each topic area along with suggested solutions. </a:t>
-            </a:r>
-          </a:p>
-          <a:p>
-            <a:r>
-              <a:rPr lang="en-IE" dirty="0"/>
-              <a:t>But we find these to be an inefficient use of time, as a candidate can not prepare 50+ questions before an interview. </a:t>
-            </a:r>
-          </a:p>
-          <a:p>
-            <a:r>
-              <a:rPr lang="en-IE" dirty="0"/>
-              <a:t>There would be overlapping ideas that should be focused on more. </a:t>
-            </a:r>
-          </a:p>
-          <a:p>
-            <a:r>
-              <a:rPr lang="en-IE" dirty="0"/>
-              <a:t>Ex: If there are 4 questions solved using </a:t>
-            </a:r>
-            <a:r>
-              <a:rPr lang="en-IE" dirty="0" err="1"/>
-              <a:t>MergeSort</a:t>
-            </a:r>
-            <a:r>
-              <a:rPr lang="en-IE" dirty="0"/>
-              <a:t>, they all share common key steps. But if the book does not show that the same steps are taken, only altered to suit the question, then the book is limiting the readers’ ability to think outside the box and apply the patterns in different ways. </a:t>
-            </a:r>
-          </a:p>
-          <a:p>
-            <a:r>
-              <a:rPr lang="en-IE" dirty="0"/>
-              <a:t>Our approach is to show the reader that being comfortable with the patterns will result in them being flexible in thought, such that readers can apply a standard algorithm to multiple questions and not just limited cases.</a:t>
-            </a:r>
-          </a:p>
-          <a:p>
-            <a:endParaRPr lang="en-IE" dirty="0"/>
-          </a:p>
-          <a:p>
-            <a:r>
-              <a:rPr lang="en-IE" dirty="0"/>
-              <a:t>Research Qs:</a:t>
-            </a:r>
-          </a:p>
-          <a:p>
-            <a:r>
-              <a:rPr lang="en-IE" dirty="0"/>
-              <a:t>This then lead us to develop 3 Research Qs that attempt to solve the problem of helping interviewees prepare for interviews efficiently. </a:t>
-            </a:r>
-          </a:p>
-          <a:p>
-            <a:r>
-              <a:rPr lang="en-IE" dirty="0"/>
-              <a:t>Q1. What standard algorithms do we choose to focus on. </a:t>
-            </a:r>
-          </a:p>
-          <a:p>
-            <a:r>
-              <a:rPr lang="en-IE" dirty="0"/>
-              <a:t>Q2. How do the questions relate to these algorithms and their patterns. </a:t>
+              <a:t>Q2. How do the questions relate to these algorithms and their patterns. We wanted to obtain a numerical value for the similarity. </a:t>
             </a:r>
           </a:p>
           <a:p>
@@ -6769,87 +6947,222 @@
           <a:lstStyle/>
           <a:p>
             <a:r>
-              <a:rPr lang="en-IE" dirty="0"/>
+              <a:rPr lang="en-IE" sz="1200" kern="1200" dirty="0">
+                <a:solidFill>
+                  <a:schemeClr val="tx1"/>
+                </a:solidFill>
+                <a:effectLst/>
+                <a:latin typeface="+mn-lt"/>
+                <a:ea typeface="+mn-ea"/>
+                <a:cs typeface="+mn-cs"/>
+              </a:rPr>
               <a:t>We chose </a:t>
             </a:r>
             <a:r>
-              <a:rPr lang="en-IE" dirty="0" err="1"/>
+              <a:rPr lang="en-IE" sz="1200" kern="1200" dirty="0" err="1">
+                <a:solidFill>
+                  <a:schemeClr val="tx1"/>
+                </a:solidFill>
+                <a:effectLst/>
+                <a:latin typeface="+mn-lt"/>
+                <a:ea typeface="+mn-ea"/>
+                <a:cs typeface="+mn-cs"/>
+              </a:rPr>
               <a:t>LeetCode</a:t>
             </a:r>
             <a:r>
-              <a:rPr lang="en-IE" dirty="0"/>
+              <a:rPr lang="en-IE" sz="1200" kern="1200" dirty="0">
+                <a:solidFill>
+                  <a:schemeClr val="tx1"/>
+                </a:solidFill>
+                <a:effectLst/>
+                <a:latin typeface="+mn-lt"/>
+                <a:ea typeface="+mn-ea"/>
+                <a:cs typeface="+mn-cs"/>
+              </a:rPr>
               <a:t> as the question bank. </a:t>
             </a:r>
           </a:p>
           <a:p>
             <a:r>
-              <a:rPr lang="en-IE" dirty="0"/>
+              <a:rPr lang="en-IE" sz="1200" kern="1200" dirty="0">
+                <a:solidFill>
+                  <a:schemeClr val="tx1"/>
+                </a:solidFill>
+                <a:effectLst/>
+                <a:latin typeface="+mn-lt"/>
+                <a:ea typeface="+mn-ea"/>
+                <a:cs typeface="+mn-cs"/>
+              </a:rPr>
               <a:t>This is because it had some important qualities. </a:t>
             </a:r>
           </a:p>
           <a:p>
-            <a:pPr marL="228600" indent="-228600">
+            <a:pPr marL="228600" lvl="0" indent="-228600">
               <a:buAutoNum type="arabicPeriod"/>
             </a:pPr>
             <a:r>
-              <a:rPr lang="en-IE" dirty="0"/>
-              <a:t>There is an active community. There was new questions added regularly, new test cases were validated and a forum to help people with issues or just general discussion of solutions. </a:t>
+              <a:rPr lang="en-IE" sz="1200" kern="1200" dirty="0">
+                <a:solidFill>
+                  <a:schemeClr val="tx1"/>
+                </a:solidFill>
+                <a:effectLst/>
+                <a:latin typeface="+mn-lt"/>
+                <a:ea typeface="+mn-ea"/>
+                <a:cs typeface="+mn-cs"/>
+              </a:rPr>
+              <a:t>There is an active community. There were new questions added regularly, new test cases were validated and a forum to help people with issues or just general discussion of solutions. </a:t>
             </a:r>
           </a:p>
           <a:p>
-            <a:pPr marL="228600" indent="-228600">
+            <a:pPr marL="228600" marR="0" lvl="0" indent="-228600" algn="l" defTabSz="914400" rtl="0" eaLnBrk="1" fontAlgn="auto" latinLnBrk="0" hangingPunct="1">
+              <a:lnSpc>
+                <a:spcPct val="100000"/>
+              </a:lnSpc>
+              <a:spcBef>
+                <a:spcPts val="0"/>
+              </a:spcBef>
+              <a:spcAft>
+                <a:spcPts val="0"/>
+              </a:spcAft>
+              <a:buClrTx/>
+              <a:buSzTx/>
+              <a:buFontTx/>
               <a:buAutoNum type="arabicPeriod"/>
+              <a:tabLst/>
+              <a:defRPr/>
             </a:pPr>
             <a:r>
-              <a:rPr lang="en-IE" dirty="0"/>
-              <a:t>There existed an online judge system. This meant that any bias that we might have had  was nullified. Our solutions would only be accepted if they passes their test cases. </a:t>
+              <a:rPr lang="en-IE" sz="1200" kern="1200" dirty="0">
+                <a:solidFill>
+                  <a:schemeClr val="tx1"/>
+                </a:solidFill>
+                <a:effectLst/>
+                <a:latin typeface="+mn-lt"/>
+                <a:ea typeface="+mn-ea"/>
+                <a:cs typeface="+mn-cs"/>
+              </a:rPr>
+              <a:t>There existed an online judge system. This meant that any bias that we might have had was nullified. Our solutions would only be accepted if they passed their test cases. </a:t>
             </a:r>
           </a:p>
           <a:p>
-            <a:pPr marL="228600" indent="-228600">
+            <a:pPr marL="228600" marR="0" lvl="0" indent="-228600" algn="l" defTabSz="914400" rtl="0" eaLnBrk="1" fontAlgn="auto" latinLnBrk="0" hangingPunct="1">
+              <a:lnSpc>
+                <a:spcPct val="100000"/>
+              </a:lnSpc>
+              <a:spcBef>
+                <a:spcPts val="0"/>
+              </a:spcBef>
+              <a:spcAft>
+                <a:spcPts val="0"/>
+              </a:spcAft>
+              <a:buClrTx/>
+              <a:buSzTx/>
+              <a:buFontTx/>
               <a:buAutoNum type="arabicPeriod"/>
+              <a:tabLst/>
+              <a:defRPr/>
             </a:pPr>
             <a:r>
-              <a:rPr lang="en-IE" dirty="0"/>
-              <a:t>We wanted a wide range of questions to choose from. This meant we could choose from varied types of questions to gather our data.</a:t>
+              <a:rPr lang="en-IE" sz="1200" kern="1200" dirty="0">
+                <a:solidFill>
+                  <a:schemeClr val="tx1"/>
+                </a:solidFill>
+                <a:effectLst/>
+                <a:latin typeface="+mn-lt"/>
+                <a:ea typeface="+mn-ea"/>
+                <a:cs typeface="+mn-cs"/>
+              </a:rPr>
+              <a:t>We wanted a wide range of questions to choose from. This meant we could choose from varied types of questions to gather our data. </a:t>
             </a:r>
           </a:p>
           <a:p>
-            <a:pPr marL="0" indent="0">
-              <a:buNone/>
-            </a:pPr>
-            <a:endParaRPr lang="en-IE" dirty="0"/>
-          </a:p>
-          <a:p>
-            <a:pPr marL="0" indent="0">
-              <a:buNone/>
-            </a:pPr>
+            <a:pPr lvl="0"/>
+            <a:endParaRPr lang="en-IE" sz="1200" kern="1200" dirty="0">
+              <a:solidFill>
+                <a:schemeClr val="tx1"/>
+              </a:solidFill>
+              <a:effectLst/>
+              <a:latin typeface="+mn-lt"/>
+              <a:ea typeface="+mn-ea"/>
+              <a:cs typeface="+mn-cs"/>
+            </a:endParaRPr>
+          </a:p>
+          <a:p>
             <a:r>
-              <a:rPr lang="en-IE" dirty="0"/>
+              <a:rPr lang="en-IE" sz="1200" kern="1200" dirty="0">
+                <a:solidFill>
+                  <a:schemeClr val="tx1"/>
+                </a:solidFill>
+                <a:effectLst/>
+                <a:latin typeface="+mn-lt"/>
+                <a:ea typeface="+mn-ea"/>
+                <a:cs typeface="+mn-cs"/>
+              </a:rPr>
               <a:t>For this project we chose Java as the language. Any language would have been acceptable really as we are only giving pseudocode which shows the abstracted ideas of the patterns. </a:t>
             </a:r>
             <a:r>
-              <a:rPr lang="en-IE" dirty="0" err="1"/>
+              <a:rPr lang="en-IE" sz="1200" kern="1200" dirty="0" err="1">
+                <a:solidFill>
+                  <a:schemeClr val="tx1"/>
+                </a:solidFill>
+                <a:effectLst/>
+                <a:latin typeface="+mn-lt"/>
+                <a:ea typeface="+mn-ea"/>
+                <a:cs typeface="+mn-cs"/>
+              </a:rPr>
               <a:t>LeetCode</a:t>
             </a:r>
             <a:r>
-              <a:rPr lang="en-IE" dirty="0"/>
+              <a:rPr lang="en-IE" sz="1200" kern="1200" dirty="0">
+                <a:solidFill>
+                  <a:schemeClr val="tx1"/>
+                </a:solidFill>
+                <a:effectLst/>
+                <a:latin typeface="+mn-lt"/>
+                <a:ea typeface="+mn-ea"/>
+                <a:cs typeface="+mn-cs"/>
+              </a:rPr>
               <a:t> is compatible with major languages like C# and Python. It even supports newer languages like </a:t>
             </a:r>
             <a:r>
-              <a:rPr lang="en-IE" dirty="0" err="1"/>
+              <a:rPr lang="en-IE" sz="1200" kern="1200" dirty="0" err="1">
+                <a:solidFill>
+                  <a:schemeClr val="tx1"/>
+                </a:solidFill>
+                <a:effectLst/>
+                <a:latin typeface="+mn-lt"/>
+                <a:ea typeface="+mn-ea"/>
+                <a:cs typeface="+mn-cs"/>
+              </a:rPr>
               <a:t>Kotlin</a:t>
             </a:r>
             <a:r>
-              <a:rPr lang="en-IE" dirty="0"/>
+              <a:rPr lang="en-IE" sz="1200" kern="1200" dirty="0">
+                <a:solidFill>
+                  <a:schemeClr val="tx1"/>
+                </a:solidFill>
+                <a:effectLst/>
+                <a:latin typeface="+mn-lt"/>
+                <a:ea typeface="+mn-ea"/>
+                <a:cs typeface="+mn-cs"/>
+              </a:rPr>
               <a:t>. </a:t>
             </a:r>
           </a:p>
           <a:p>
-            <a:pPr marL="0" indent="0">
-              <a:buNone/>
-            </a:pPr>
-            <a:endParaRPr lang="en-IE" dirty="0"/>
+            <a:r>
+              <a:rPr lang="en-IE" sz="1200" kern="1200" dirty="0">
+                <a:solidFill>
+                  <a:schemeClr val="tx1"/>
+                </a:solidFill>
+                <a:effectLst/>
+                <a:latin typeface="+mn-lt"/>
+                <a:ea typeface="+mn-ea"/>
+                <a:cs typeface="+mn-cs"/>
+              </a:rPr>
+              <a:t> </a:t>
+            </a:r>
           </a:p>
         </p:txBody>
       </p:sp>
@@ -6934,44 +7247,240 @@
           <a:lstStyle/>
           <a:p>
             <a:r>
-              <a:rPr lang="en-IE" dirty="0"/>
+              <a:rPr lang="en-IE" sz="1200" kern="1200" dirty="0">
+                <a:solidFill>
+                  <a:schemeClr val="tx1"/>
+                </a:solidFill>
+                <a:effectLst/>
+                <a:latin typeface="+mn-lt"/>
+                <a:ea typeface="+mn-ea"/>
+                <a:cs typeface="+mn-cs"/>
+              </a:rPr>
+              <a:t>This is the methodology that resulted in us obtaining our data. </a:t>
+            </a:r>
+          </a:p>
+          <a:p>
+            <a:r>
+              <a:rPr lang="en-IE" sz="1200" kern="1200" dirty="0">
+                <a:solidFill>
+                  <a:schemeClr val="tx1"/>
+                </a:solidFill>
+                <a:effectLst/>
+                <a:latin typeface="+mn-lt"/>
+                <a:ea typeface="+mn-ea"/>
+                <a:cs typeface="+mn-cs"/>
+              </a:rPr>
+              <a:t>Our approach was purely manual, it required a lot of human effort to complete. </a:t>
+            </a:r>
+          </a:p>
+          <a:p>
+            <a:endParaRPr lang="en-IE" sz="1200" kern="1200" dirty="0">
+              <a:solidFill>
+                <a:schemeClr val="tx1"/>
+              </a:solidFill>
+              <a:effectLst/>
+              <a:latin typeface="+mn-lt"/>
+              <a:ea typeface="+mn-ea"/>
+              <a:cs typeface="+mn-cs"/>
+            </a:endParaRPr>
+          </a:p>
+          <a:p>
+            <a:pPr marL="228600" indent="-228600">
+              <a:buAutoNum type="arabicPeriod"/>
+            </a:pPr>
+            <a:r>
+              <a:rPr lang="en-IE" sz="1200" kern="1200" dirty="0">
+                <a:solidFill>
+                  <a:schemeClr val="tx1"/>
+                </a:solidFill>
+                <a:effectLst/>
+                <a:latin typeface="+mn-lt"/>
+                <a:ea typeface="+mn-ea"/>
+                <a:cs typeface="+mn-cs"/>
+              </a:rPr>
               <a:t>When we start a question, we first take a few minutes to judge which pattern is best suited to solve the question. </a:t>
             </a:r>
           </a:p>
           <a:p>
+            <a:pPr marL="228600" indent="-228600">
+              <a:buAutoNum type="arabicPeriod" startAt="2"/>
+            </a:pPr>
             <a:r>
-              <a:rPr lang="en-IE" dirty="0"/>
-              <a:t>We then apply this pattern to solve the question. Once it was accepted by the judge system, we compared the solution to the pattern we previously selected. </a:t>
+              <a:rPr lang="en-IE" sz="1200" kern="1200" dirty="0">
+                <a:solidFill>
+                  <a:schemeClr val="tx1"/>
+                </a:solidFill>
+                <a:effectLst/>
+                <a:latin typeface="+mn-lt"/>
+                <a:ea typeface="+mn-ea"/>
+                <a:cs typeface="+mn-cs"/>
+              </a:rPr>
+              <a:t>We then apply this pattern to solve the question. </a:t>
             </a:r>
           </a:p>
           <a:p>
+            <a:pPr marL="228600" marR="0" lvl="0" indent="-228600" algn="l" defTabSz="914400" rtl="0" eaLnBrk="1" fontAlgn="auto" latinLnBrk="0" hangingPunct="1">
+              <a:lnSpc>
+                <a:spcPct val="100000"/>
+              </a:lnSpc>
+              <a:spcBef>
+                <a:spcPts val="0"/>
+              </a:spcBef>
+              <a:spcAft>
+                <a:spcPts val="0"/>
+              </a:spcAft>
+              <a:buClrTx/>
+              <a:buSzTx/>
+              <a:buFontTx/>
+              <a:buAutoNum type="arabicPeriod" startAt="2"/>
+              <a:tabLst/>
+              <a:defRPr/>
+            </a:pPr>
             <a:r>
-              <a:rPr lang="en-IE" dirty="0"/>
-              <a:t>Our first comparison was based off our intuition. </a:t>
+              <a:rPr lang="en-IE" sz="1200" kern="1200" dirty="0">
+                <a:solidFill>
+                  <a:schemeClr val="tx1"/>
+                </a:solidFill>
+                <a:effectLst/>
+                <a:latin typeface="+mn-lt"/>
+                <a:ea typeface="+mn-ea"/>
+                <a:cs typeface="+mn-cs"/>
+              </a:rPr>
+              <a:t>Once it was accepted by the judge system, we compared the solution to the pattern we previously selected. </a:t>
             </a:r>
           </a:p>
           <a:p>
+            <a:endParaRPr lang="en-IE" sz="1200" kern="1200" dirty="0">
+              <a:solidFill>
+                <a:schemeClr val="tx1"/>
+              </a:solidFill>
+              <a:effectLst/>
+              <a:latin typeface="+mn-lt"/>
+              <a:ea typeface="+mn-ea"/>
+              <a:cs typeface="+mn-cs"/>
+            </a:endParaRPr>
+          </a:p>
+          <a:p>
             <a:r>
-              <a:rPr lang="en-IE" dirty="0"/>
-              <a:t>To support our intuition we needed a numerical value. To obtain this we counted the number of edit operations, the addition and/or deletion of code, to transform a piece of code into another. </a:t>
+              <a:rPr lang="en-IE" sz="1200" kern="1200" dirty="0">
+                <a:solidFill>
+                  <a:schemeClr val="tx1"/>
+                </a:solidFill>
+                <a:effectLst/>
+                <a:latin typeface="+mn-lt"/>
+                <a:ea typeface="+mn-ea"/>
+                <a:cs typeface="+mn-cs"/>
+              </a:rPr>
+              <a:t>Our first comparison was based off our intuition., which is the initial selection we made at the start. We judge whether our initial selection was the correct way to solve the question. </a:t>
             </a:r>
           </a:p>
           <a:p>
+            <a:endParaRPr lang="en-IE" sz="1200" kern="1200" dirty="0">
+              <a:solidFill>
+                <a:schemeClr val="tx1"/>
+              </a:solidFill>
+              <a:effectLst/>
+              <a:latin typeface="+mn-lt"/>
+              <a:ea typeface="+mn-ea"/>
+              <a:cs typeface="+mn-cs"/>
+            </a:endParaRPr>
+          </a:p>
+          <a:p>
             <a:r>
-              <a:rPr lang="en-IE" dirty="0"/>
-              <a:t>We used Control Flow Graphs to obtain the value. We created CFGs for every pattern, and compared these with the solutions. In this cases we were counting how many nodes and/or edges we needed to add or delete. </a:t>
+              <a:rPr lang="en-IE" sz="1200" kern="1200" dirty="0">
+                <a:solidFill>
+                  <a:schemeClr val="tx1"/>
+                </a:solidFill>
+                <a:effectLst/>
+                <a:latin typeface="+mn-lt"/>
+                <a:ea typeface="+mn-ea"/>
+                <a:cs typeface="+mn-cs"/>
+              </a:rPr>
+              <a:t>To support our intuition, we needed a numerical value. To obtain this we counted the number of edit operations, which are the addition and/or deletion of code, to transform a piece of code into another. </a:t>
             </a:r>
           </a:p>
           <a:p>
             <a:r>
-              <a:rPr lang="en-IE" dirty="0"/>
+              <a:rPr lang="en-IE" sz="1200" kern="1200" dirty="0">
+                <a:solidFill>
+                  <a:schemeClr val="tx1"/>
+                </a:solidFill>
+                <a:effectLst/>
+                <a:latin typeface="+mn-lt"/>
+                <a:ea typeface="+mn-ea"/>
+                <a:cs typeface="+mn-cs"/>
+              </a:rPr>
+              <a:t>We used Control Flow Graphs to obtain the value. We created CFGs for every pattern, and compared these with the solutions. In this case we were counting how many nodes and/or edges we needed to add or delete. </a:t>
+            </a:r>
+          </a:p>
+          <a:p>
+            <a:r>
+              <a:rPr lang="en-IE" sz="1200" kern="1200" dirty="0">
+                <a:solidFill>
+                  <a:schemeClr val="tx1"/>
+                </a:solidFill>
+                <a:effectLst/>
+                <a:latin typeface="+mn-lt"/>
+                <a:ea typeface="+mn-ea"/>
+                <a:cs typeface="+mn-cs"/>
+              </a:rPr>
               <a:t>Each operation was given a value of one. </a:t>
             </a:r>
           </a:p>
           <a:p>
             <a:r>
-              <a:rPr lang="en-IE" dirty="0"/>
+              <a:rPr lang="en-IE" sz="1200" kern="1200" dirty="0">
+                <a:solidFill>
+                  <a:schemeClr val="tx1"/>
+                </a:solidFill>
+                <a:effectLst/>
+                <a:latin typeface="+mn-lt"/>
+                <a:ea typeface="+mn-ea"/>
+                <a:cs typeface="+mn-cs"/>
+              </a:rPr>
               <a:t>We totalled the edit operations, if the number was below 10 then they were similar. If it was above 10 then they were dissimilar. </a:t>
+            </a:r>
+          </a:p>
+          <a:p>
+            <a:r>
+              <a:rPr lang="en-IE" sz="1200" kern="1200" dirty="0">
+                <a:solidFill>
+                  <a:schemeClr val="tx1"/>
+                </a:solidFill>
+                <a:effectLst/>
+                <a:latin typeface="+mn-lt"/>
+                <a:ea typeface="+mn-ea"/>
+                <a:cs typeface="+mn-cs"/>
+              </a:rPr>
+              <a:t> </a:t>
+            </a:r>
+          </a:p>
+          <a:p>
+            <a:r>
+              <a:rPr lang="en-IE" sz="1200" kern="1200" dirty="0">
+                <a:solidFill>
+                  <a:schemeClr val="tx1"/>
+                </a:solidFill>
+                <a:effectLst/>
+                <a:latin typeface="+mn-lt"/>
+                <a:ea typeface="+mn-ea"/>
+                <a:cs typeface="+mn-cs"/>
+              </a:rPr>
+              <a:t> </a:t>
+            </a:r>
+          </a:p>
+          <a:p>
+            <a:r>
+              <a:rPr lang="en-IE" sz="1200" kern="1200" dirty="0">
+                <a:solidFill>
+                  <a:schemeClr val="tx1"/>
+                </a:solidFill>
+                <a:effectLst/>
+                <a:latin typeface="+mn-lt"/>
+                <a:ea typeface="+mn-ea"/>
+                <a:cs typeface="+mn-cs"/>
+              </a:rPr>
+              <a:t> </a:t>
             </a:r>
           </a:p>
         </p:txBody>
@@ -7057,44 +7566,162 @@
           <a:lstStyle/>
           <a:p>
             <a:r>
-              <a:rPr lang="en-IE" dirty="0"/>
+              <a:rPr lang="en-IE" sz="1200" kern="1200" dirty="0">
+                <a:solidFill>
+                  <a:schemeClr val="tx1"/>
+                </a:solidFill>
+                <a:effectLst/>
+                <a:latin typeface="+mn-lt"/>
+                <a:ea typeface="+mn-ea"/>
+                <a:cs typeface="+mn-cs"/>
+              </a:rPr>
               <a:t>Here I give an example of how CFGs are used to judge similarity between a pattern and solution. </a:t>
             </a:r>
           </a:p>
           <a:p>
             <a:r>
-              <a:rPr lang="en-IE" dirty="0"/>
+              <a:rPr lang="en-IE" sz="1200" kern="1200" dirty="0">
+                <a:solidFill>
+                  <a:schemeClr val="tx1"/>
+                </a:solidFill>
+                <a:effectLst/>
+                <a:latin typeface="+mn-lt"/>
+                <a:ea typeface="+mn-ea"/>
+                <a:cs typeface="+mn-cs"/>
+              </a:rPr>
               <a:t>The first is the standard algorithmic pattern, Palindrome. </a:t>
             </a:r>
           </a:p>
           <a:p>
             <a:r>
-              <a:rPr lang="en-IE" dirty="0"/>
+              <a:rPr lang="en-IE" sz="1200" kern="1200" dirty="0">
+                <a:solidFill>
+                  <a:schemeClr val="tx1"/>
+                </a:solidFill>
+                <a:effectLst/>
+                <a:latin typeface="+mn-lt"/>
+                <a:ea typeface="+mn-ea"/>
+                <a:cs typeface="+mn-cs"/>
+              </a:rPr>
               <a:t>It contains 6 nodes and 6 edges. A total of 12. </a:t>
             </a:r>
           </a:p>
           <a:p>
             <a:r>
-              <a:rPr lang="en-IE" dirty="0"/>
-              <a:t>The second is the question TwoSum. We solved it using the Palindrome Algorithm.</a:t>
+              <a:rPr lang="en-IE" sz="1200" kern="1200" dirty="0">
+                <a:solidFill>
+                  <a:schemeClr val="tx1"/>
+                </a:solidFill>
+                <a:effectLst/>
+                <a:latin typeface="+mn-lt"/>
+                <a:ea typeface="+mn-ea"/>
+                <a:cs typeface="+mn-cs"/>
+              </a:rPr>
+              <a:t>The second is the question </a:t>
             </a:r>
-          </a:p>
-          <a:p>
             <a:r>
-              <a:rPr lang="en-IE" dirty="0"/>
-              <a:t>To back up our intuition it can be seen that this CFG has 8 nodes and 10 edges, a total of 18. </a:t>
+              <a:rPr lang="en-IE" sz="1200" kern="1200" dirty="0" err="1">
+                <a:solidFill>
+                  <a:schemeClr val="tx1"/>
+                </a:solidFill>
+                <a:effectLst/>
+                <a:latin typeface="+mn-lt"/>
+                <a:ea typeface="+mn-ea"/>
+                <a:cs typeface="+mn-cs"/>
+              </a:rPr>
+              <a:t>TwoSum</a:t>
             </a:r>
-          </a:p>
-          <a:p>
             <a:r>
-              <a:rPr lang="en-IE" dirty="0"/>
-              <a:t>Therefore, 6 edit operations would be required to transform one into the other. </a:t>
+              <a:rPr lang="en-IE" sz="1200" kern="1200" dirty="0">
+                <a:solidFill>
+                  <a:schemeClr val="tx1"/>
+                </a:solidFill>
+                <a:effectLst/>
+                <a:latin typeface="+mn-lt"/>
+                <a:ea typeface="+mn-ea"/>
+                <a:cs typeface="+mn-cs"/>
+              </a:rPr>
+              <a:t>. We solved it using the Palindrome Algorithm, which was based on our initial intuition.</a:t>
             </a:r>
           </a:p>
           <a:p>
             <a:r>
-              <a:rPr lang="en-IE" dirty="0"/>
-              <a:t>Therefore, the solution to TwoSum is related to the Palindrome Algorithm.</a:t>
+              <a:rPr lang="en-IE" sz="1200" kern="1200" dirty="0">
+                <a:solidFill>
+                  <a:schemeClr val="tx1"/>
+                </a:solidFill>
+                <a:effectLst/>
+                <a:latin typeface="+mn-lt"/>
+                <a:ea typeface="+mn-ea"/>
+                <a:cs typeface="+mn-cs"/>
+              </a:rPr>
+              <a:t>To back up our intuition this CFG has 8 nodes and 10 edges, a total of 18. </a:t>
+            </a:r>
+          </a:p>
+          <a:p>
+            <a:r>
+              <a:rPr lang="en-IE" sz="1200" kern="1200" dirty="0">
+                <a:solidFill>
+                  <a:schemeClr val="tx1"/>
+                </a:solidFill>
+                <a:effectLst/>
+                <a:latin typeface="+mn-lt"/>
+                <a:ea typeface="+mn-ea"/>
+                <a:cs typeface="+mn-cs"/>
+              </a:rPr>
+              <a:t>Comparing the two we that 6 edit operations would be required to transform one into the other. 2 additional nodes and 4 additional edges. </a:t>
+            </a:r>
+          </a:p>
+          <a:p>
+            <a:r>
+              <a:rPr lang="en-IE" sz="1200" kern="1200" dirty="0">
+                <a:solidFill>
+                  <a:schemeClr val="tx1"/>
+                </a:solidFill>
+                <a:effectLst/>
+                <a:latin typeface="+mn-lt"/>
+                <a:ea typeface="+mn-ea"/>
+                <a:cs typeface="+mn-cs"/>
+              </a:rPr>
+              <a:t>Therefore, the solution to </a:t>
+            </a:r>
+            <a:r>
+              <a:rPr lang="en-IE" sz="1200" kern="1200" dirty="0" err="1">
+                <a:solidFill>
+                  <a:schemeClr val="tx1"/>
+                </a:solidFill>
+                <a:effectLst/>
+                <a:latin typeface="+mn-lt"/>
+                <a:ea typeface="+mn-ea"/>
+                <a:cs typeface="+mn-cs"/>
+              </a:rPr>
+              <a:t>TwoSum</a:t>
+            </a:r>
+            <a:r>
+              <a:rPr lang="en-IE" sz="1200" kern="1200" dirty="0">
+                <a:solidFill>
+                  <a:schemeClr val="tx1"/>
+                </a:solidFill>
+                <a:effectLst/>
+                <a:latin typeface="+mn-lt"/>
+                <a:ea typeface="+mn-ea"/>
+                <a:cs typeface="+mn-cs"/>
+              </a:rPr>
+              <a:t> is related to the Palindrome Algorithm.</a:t>
+            </a:r>
+          </a:p>
+          <a:p>
+            <a:r>
+              <a:rPr lang="en-IE" sz="1200" kern="1200" dirty="0">
+                <a:solidFill>
+                  <a:schemeClr val="tx1"/>
+                </a:solidFill>
+                <a:effectLst/>
+                <a:latin typeface="+mn-lt"/>
+                <a:ea typeface="+mn-ea"/>
+                <a:cs typeface="+mn-cs"/>
+              </a:rPr>
+              <a:t> </a:t>
             </a:r>
           </a:p>
         </p:txBody>
@@ -7180,35 +7807,100 @@
           <a:lstStyle/>
           <a:p>
             <a:r>
-              <a:rPr lang="en-IE" dirty="0"/>
-              <a:t>Here is the total data for the 36 questions that we solved. The first graph shows the frequency each pattern we focused on appeared. </a:t>
+              <a:rPr lang="en-IE" sz="1200" kern="1200" dirty="0">
+                <a:solidFill>
+                  <a:schemeClr val="tx1"/>
+                </a:solidFill>
+                <a:effectLst/>
+                <a:latin typeface="+mn-lt"/>
+                <a:ea typeface="+mn-ea"/>
+                <a:cs typeface="+mn-cs"/>
+              </a:rPr>
+              <a:t>Here is the total data for the 36 questions that we solved.  I have split the data up into two smaller graphs.</a:t>
             </a:r>
           </a:p>
           <a:p>
             <a:r>
-              <a:rPr lang="en-IE" dirty="0"/>
-              <a:t>Tree traversal appeared 6 times, Palindrome appeared 5 times. </a:t>
+              <a:rPr lang="en-IE" sz="1200" kern="1200" dirty="0">
+                <a:solidFill>
+                  <a:schemeClr val="tx1"/>
+                </a:solidFill>
+                <a:effectLst/>
+                <a:latin typeface="+mn-lt"/>
+                <a:ea typeface="+mn-ea"/>
+                <a:cs typeface="+mn-cs"/>
+              </a:rPr>
+              <a:t>The first graph shows the frequency of each pattern that we focused on out of the 36 questions completed. </a:t>
             </a:r>
           </a:p>
           <a:p>
             <a:r>
-              <a:rPr lang="en-IE" dirty="0"/>
-              <a:t>The total here is 21 appearances. The other 15 solutions were solved without using aby of the algorithms we chose to focus on. </a:t>
+              <a:rPr lang="en-IE" sz="1200" kern="1200" dirty="0">
+                <a:solidFill>
+                  <a:schemeClr val="tx1"/>
+                </a:solidFill>
+                <a:effectLst/>
+                <a:latin typeface="+mn-lt"/>
+                <a:ea typeface="+mn-ea"/>
+                <a:cs typeface="+mn-cs"/>
+              </a:rPr>
+              <a:t>Tree traversal appeared 6 times, Palindrome appeared 5 times. This was a total of 11, which was roughly 30% of the questions alone. </a:t>
             </a:r>
           </a:p>
           <a:p>
-            <a:endParaRPr lang="en-IE" dirty="0"/>
-          </a:p>
-          <a:p>
             <a:r>
-              <a:rPr lang="en-IE" dirty="0"/>
-              <a:t>Secondly I am showing the frequency of the data structures that were used in the solutions. Arrays were clearly used the most. </a:t>
+              <a:rPr lang="en-IE" sz="1200" kern="1200" dirty="0">
+                <a:solidFill>
+                  <a:schemeClr val="tx1"/>
+                </a:solidFill>
+                <a:effectLst/>
+                <a:latin typeface="+mn-lt"/>
+                <a:ea typeface="+mn-ea"/>
+                <a:cs typeface="+mn-cs"/>
+              </a:rPr>
+              <a:t>The total here is 21 appearances. The other 15 solutions were solved without using any of the algorithms we chose to focus on, or none. We did notice that some of the questions that were answered used Insertion Sort for example. </a:t>
             </a:r>
           </a:p>
           <a:p>
             <a:r>
-              <a:rPr lang="en-IE" dirty="0"/>
+              <a:rPr lang="en-IE" sz="1200" kern="1200" dirty="0">
+                <a:solidFill>
+                  <a:schemeClr val="tx1"/>
+                </a:solidFill>
+                <a:effectLst/>
+                <a:latin typeface="+mn-lt"/>
+                <a:ea typeface="+mn-ea"/>
+                <a:cs typeface="+mn-cs"/>
+              </a:rPr>
+              <a:t>Secondly, I am showing the frequency of the data structures that were used in the solutions. Arrays were clearly used the most. This shows that even in complex situations, arrays are powerful.</a:t>
+            </a:r>
+          </a:p>
+          <a:p>
+            <a:r>
+              <a:rPr lang="en-IE" sz="1200" kern="1200" dirty="0">
+                <a:solidFill>
+                  <a:schemeClr val="tx1"/>
+                </a:solidFill>
+                <a:effectLst/>
+                <a:latin typeface="+mn-lt"/>
+                <a:ea typeface="+mn-ea"/>
+                <a:cs typeface="+mn-cs"/>
+              </a:rPr>
               <a:t>Combining these two tables results in the full table which can be found in the paper in the evaluation section. </a:t>
+            </a:r>
+          </a:p>
+          <a:p>
+            <a:r>
+              <a:rPr lang="en-IE" sz="1200" kern="1200" dirty="0">
+                <a:solidFill>
+                  <a:schemeClr val="tx1"/>
+                </a:solidFill>
+                <a:effectLst/>
+                <a:latin typeface="+mn-lt"/>
+                <a:ea typeface="+mn-ea"/>
+                <a:cs typeface="+mn-cs"/>
+              </a:rPr>
+              <a:t> </a:t>
             </a:r>
           </a:p>
         </p:txBody>
@@ -7294,75 +7986,215 @@
           <a:lstStyle/>
           <a:p>
             <a:r>
-              <a:rPr lang="en-IE" dirty="0"/>
-              <a:t>Overall there is a clear link between interview questions and standard algorithms that reader will have learned in a programming course. </a:t>
+              <a:rPr lang="en-IE" sz="1200" kern="1200" dirty="0">
+                <a:solidFill>
+                  <a:schemeClr val="tx1"/>
+                </a:solidFill>
+                <a:effectLst/>
+                <a:latin typeface="+mn-lt"/>
+                <a:ea typeface="+mn-ea"/>
+                <a:cs typeface="+mn-cs"/>
+              </a:rPr>
+              <a:t>Conclusion:</a:t>
             </a:r>
           </a:p>
           <a:p>
             <a:r>
-              <a:rPr lang="en-IE" dirty="0"/>
+              <a:rPr lang="en-IE" sz="1200" kern="1200" dirty="0">
+                <a:solidFill>
+                  <a:schemeClr val="tx1"/>
+                </a:solidFill>
+                <a:effectLst/>
+                <a:latin typeface="+mn-lt"/>
+                <a:ea typeface="+mn-ea"/>
+                <a:cs typeface="+mn-cs"/>
+              </a:rPr>
+              <a:t>Overall there is a clear link between interview questions and standard algorithms that readers will have learned in a programming course. Of the 36 questions, 21 questions had a pattern that we chose to focus on appear. This is roughly 60%. This number would be increased if we consider other patterns.</a:t>
+            </a:r>
+          </a:p>
+          <a:p>
+            <a:r>
+              <a:rPr lang="en-IE" sz="1200" kern="1200" dirty="0">
+                <a:solidFill>
+                  <a:schemeClr val="tx1"/>
+                </a:solidFill>
+                <a:effectLst/>
+                <a:latin typeface="+mn-lt"/>
+                <a:ea typeface="+mn-ea"/>
+                <a:cs typeface="+mn-cs"/>
+              </a:rPr>
               <a:t>We’ve shown that by learning these standard algorithms, a programmer can use them to answer a variety of questions, some which are outside the norm relating to each identified algorithm.</a:t>
             </a:r>
           </a:p>
           <a:p>
             <a:r>
-              <a:rPr lang="en-IE" dirty="0"/>
+              <a:rPr lang="en-IE" sz="1200" kern="1200" dirty="0">
+                <a:solidFill>
+                  <a:schemeClr val="tx1"/>
+                </a:solidFill>
+                <a:effectLst/>
+                <a:latin typeface="+mn-lt"/>
+                <a:ea typeface="+mn-ea"/>
+                <a:cs typeface="+mn-cs"/>
+              </a:rPr>
               <a:t>We’ve also shown that by spending more time on the patterns of each algorithm, a user should be able to then answer more interview questions, as they have a deeper understanding of the patterns and their flexibility.</a:t>
             </a:r>
           </a:p>
           <a:p>
             <a:r>
-              <a:rPr lang="en-IE" dirty="0"/>
-              <a:t>Our approach in this paper was manual. We solved each question ourselves. This means our approach was close to the interview experiences itself as both have a human aspect. </a:t>
+              <a:rPr lang="en-IE" sz="1200" kern="1200" dirty="0">
+                <a:solidFill>
+                  <a:schemeClr val="tx1"/>
+                </a:solidFill>
+                <a:effectLst/>
+                <a:latin typeface="+mn-lt"/>
+                <a:ea typeface="+mn-ea"/>
+                <a:cs typeface="+mn-cs"/>
+              </a:rPr>
+              <a:t>Our approach in this paper was manual. We solved each question ourselves. This means our approach was close to the interview experience itself, as both have a human aspect. </a:t>
             </a:r>
           </a:p>
           <a:p>
-            <a:endParaRPr lang="en-IE" dirty="0"/>
+            <a:endParaRPr lang="en-IE" sz="1200" kern="1200" dirty="0">
+              <a:solidFill>
+                <a:schemeClr val="tx1"/>
+              </a:solidFill>
+              <a:effectLst/>
+              <a:latin typeface="+mn-lt"/>
+              <a:ea typeface="+mn-ea"/>
+              <a:cs typeface="+mn-cs"/>
+            </a:endParaRPr>
           </a:p>
           <a:p>
             <a:r>
-              <a:rPr lang="en-IE" dirty="0"/>
+              <a:rPr lang="en-IE" sz="1200" kern="1200" dirty="0">
+                <a:solidFill>
+                  <a:schemeClr val="tx1"/>
+                </a:solidFill>
+                <a:effectLst/>
+                <a:latin typeface="+mn-lt"/>
+                <a:ea typeface="+mn-ea"/>
+                <a:cs typeface="+mn-cs"/>
+              </a:rPr>
               <a:t>Future Works:</a:t>
             </a:r>
           </a:p>
           <a:p>
             <a:r>
-              <a:rPr lang="en-IE" dirty="0"/>
+              <a:rPr lang="en-IE" sz="1200" kern="1200" dirty="0">
+                <a:solidFill>
+                  <a:schemeClr val="tx1"/>
+                </a:solidFill>
+                <a:effectLst/>
+                <a:latin typeface="+mn-lt"/>
+                <a:ea typeface="+mn-ea"/>
+                <a:cs typeface="+mn-cs"/>
+              </a:rPr>
               <a:t>This thesis is an initial study into the link between interview questions and standard algorithms.</a:t>
             </a:r>
           </a:p>
           <a:p>
             <a:r>
-              <a:rPr lang="en-IE" dirty="0"/>
+              <a:rPr lang="en-IE" sz="1200" kern="1200" dirty="0">
+                <a:solidFill>
+                  <a:schemeClr val="tx1"/>
+                </a:solidFill>
+                <a:effectLst/>
+                <a:latin typeface="+mn-lt"/>
+                <a:ea typeface="+mn-ea"/>
+                <a:cs typeface="+mn-cs"/>
+              </a:rPr>
               <a:t>We see the following two improvements as good future work:</a:t>
             </a:r>
           </a:p>
           <a:p>
-            <a:pPr marL="228600" indent="-228600">
+            <a:pPr marL="228600" lvl="0" indent="-228600">
               <a:buAutoNum type="arabicPeriod"/>
             </a:pPr>
             <a:r>
-              <a:rPr lang="en-IE" dirty="0"/>
+              <a:rPr lang="en-IE" sz="1200" kern="1200" dirty="0">
+                <a:solidFill>
+                  <a:schemeClr val="tx1"/>
+                </a:solidFill>
+                <a:effectLst/>
+                <a:latin typeface="+mn-lt"/>
+                <a:ea typeface="+mn-ea"/>
+                <a:cs typeface="+mn-cs"/>
+              </a:rPr>
               <a:t>Machine Learning techniques could be utilised to quickly predicate which algorithmic pattern would be best applied to a given interview question.</a:t>
             </a:r>
           </a:p>
           <a:p>
-            <a:pPr marL="228600" indent="-228600">
+            <a:pPr marL="228600" marR="0" lvl="0" indent="-228600" algn="l" defTabSz="914400" rtl="0" eaLnBrk="1" fontAlgn="auto" latinLnBrk="0" hangingPunct="1">
+              <a:lnSpc>
+                <a:spcPct val="100000"/>
+              </a:lnSpc>
+              <a:spcBef>
+                <a:spcPts val="0"/>
+              </a:spcBef>
+              <a:spcAft>
+                <a:spcPts val="0"/>
+              </a:spcAft>
+              <a:buClrTx/>
+              <a:buSzTx/>
+              <a:buFontTx/>
               <a:buAutoNum type="arabicPeriod"/>
+              <a:tabLst/>
+              <a:defRPr/>
             </a:pPr>
             <a:r>
-              <a:rPr lang="en-IE" dirty="0"/>
+              <a:rPr lang="en-IE" sz="1200" kern="1200" dirty="0">
+                <a:solidFill>
+                  <a:schemeClr val="tx1"/>
+                </a:solidFill>
+                <a:effectLst/>
+                <a:latin typeface="+mn-lt"/>
+                <a:ea typeface="+mn-ea"/>
+                <a:cs typeface="+mn-cs"/>
+              </a:rPr>
               <a:t>It would be useful to develop an automatic similarity validator for comparing some given solutions for questions, to the standard algorithms’ patterns. </a:t>
             </a:r>
           </a:p>
           <a:p>
-            <a:pPr marL="228600" indent="-228600">
-              <a:buAutoNum type="arabicPeriod"/>
-            </a:pPr>
-            <a:endParaRPr lang="en-IE" dirty="0"/>
-          </a:p>
-          <a:p>
-            <a:endParaRPr lang="en-IE" dirty="0"/>
+            <a:pPr lvl="0"/>
+            <a:endParaRPr lang="en-IE" sz="1200" kern="1200" dirty="0">
+              <a:solidFill>
+                <a:schemeClr val="tx1"/>
+              </a:solidFill>
+              <a:effectLst/>
+              <a:latin typeface="+mn-lt"/>
+              <a:ea typeface="+mn-ea"/>
+              <a:cs typeface="+mn-cs"/>
+            </a:endParaRPr>
+          </a:p>
+          <a:p>
+            <a:pPr lvl="0"/>
+            <a:r>
+              <a:rPr lang="en-IE" sz="1200" kern="1200" dirty="0">
+                <a:solidFill>
+                  <a:schemeClr val="tx1"/>
+                </a:solidFill>
+                <a:effectLst/>
+                <a:latin typeface="+mn-lt"/>
+                <a:ea typeface="+mn-ea"/>
+                <a:cs typeface="+mn-cs"/>
+              </a:rPr>
+              <a:t>Any future work would have to consider more questions and from a wider range of topics too. </a:t>
+            </a:r>
+          </a:p>
+          <a:p>
+            <a:r>
+              <a:rPr lang="en-IE" sz="1200" kern="1200" dirty="0">
+                <a:solidFill>
+                  <a:schemeClr val="tx1"/>
+                </a:solidFill>
+                <a:effectLst/>
+                <a:latin typeface="+mn-lt"/>
+                <a:ea typeface="+mn-ea"/>
+                <a:cs typeface="+mn-cs"/>
+              </a:rPr>
+              <a:t> </a:t>
+            </a:r>
           </a:p>
         </p:txBody>
       </p:sp>
@@ -9543,7 +10375,7 @@
           <a:p>
             <a:fld id="{384A29A4-78C8-47AB-BA06-22CB45938951}" type="datetime1">
               <a:rPr lang="en-US" smtClean="0"/>
-              <a:t>1/17/2018</a:t>
+              <a:t>1/18/2018</a:t>
             </a:fld>
             <a:endParaRPr lang="en-US"/>
           </a:p>
@@ -9738,7 +10570,7 @@
           <a:p>
             <a:fld id="{E1ED4ACF-2D82-46F2-A8E9-23963AA34E86}" type="datetime1">
               <a:rPr lang="en-US" smtClean="0"/>
-              <a:t>1/17/2018</a:t>
+              <a:t>1/18/2018</a:t>
             </a:fld>
             <a:endParaRPr lang="en-US"/>
           </a:p>
@@ -9922,7 +10754,7 @@
           <a:p>
             <a:fld id="{AE374B5B-21A0-4192-BF4C-38187F1A68D8}" type="datetime1">
               <a:rPr lang="en-US" smtClean="0"/>
-              <a:t>1/17/2018</a:t>
+              <a:t>1/18/2018</a:t>
             </a:fld>
             <a:endParaRPr lang="en-US"/>
           </a:p>
@@ -12263,7 +13095,7 @@
           <a:p>
             <a:fld id="{33B5CF7C-B333-48E1-A4A6-83A3C8B73AC0}" type="datetime1">
               <a:rPr lang="en-US" smtClean="0"/>
-              <a:t>1/17/2018</a:t>
+              <a:t>1/18/2018</a:t>
             </a:fld>
             <a:endParaRPr lang="en-US"/>
           </a:p>
@@ -12716,7 +13548,7 @@
           <a:p>
             <a:fld id="{AE320762-5CBF-4210-AB54-376B091119F8}" type="datetime1">
               <a:rPr lang="en-US" smtClean="0"/>
-              <a:t>1/17/2018</a:t>
+              <a:t>1/18/2018</a:t>
             </a:fld>
             <a:endParaRPr lang="en-US"/>
           </a:p>
@@ -12848,7 +13680,7 @@
           <a:p>
             <a:fld id="{7F0DB371-BF5F-4058-A212-1A908E4D2674}" type="datetime1">
               <a:rPr lang="en-US" smtClean="0"/>
-              <a:t>1/17/2018</a:t>
+              <a:t>1/18/2018</a:t>
             </a:fld>
             <a:endParaRPr lang="en-US"/>
           </a:p>
@@ -14781,7 +15613,7 @@
           <a:p>
             <a:fld id="{60A4083B-90AA-48CF-BAD5-00AA24D7F288}" type="datetime1">
               <a:rPr lang="en-US" smtClean="0"/>
-              <a:t>1/17/2018</a:t>
+              <a:t>1/18/2018</a:t>
             </a:fld>
             <a:endParaRPr lang="en-US"/>
           </a:p>
@@ -17040,7 +17872,7 @@
             <a:fld id="{F5BAF629-ECA2-4CF3-B790-9D9BDED98269}" type="datetime1">
               <a:rPr lang="en-US" smtClean="0"/>
               <a:pPr/>
-              <a:t>1/17/2018</a:t>
+              <a:t>1/18/2018</a:t>
             </a:fld>
             <a:endParaRPr lang="en-US"/>
           </a:p>
@@ -21335,7 +22167,7 @@
             <a:fld id="{B51B2453-8663-4C69-AF73-9FD7B1DEC5D0}" type="datetime1">
               <a:rPr lang="en-US" smtClean="0"/>
               <a:pPr/>
-              <a:t>1/17/2018</a:t>
+              <a:t>1/18/2018</a:t>
             </a:fld>
             <a:endParaRPr lang="en-US" dirty="0"/>
           </a:p>
@@ -21905,7 +22737,7 @@
           <p:cNvPr id="2" name="Title 1">
             <a:extLst>
               <a:ext uri="{FF2B5EF4-FFF2-40B4-BE49-F238E27FC236}">
-                <a16:creationId xmlns:a16="http://schemas.microsoft.com/office/drawing/2014/main" id="{F0B28BE5-55D6-487F-94F3-5423689F4A48}"/>
+                <a16:creationId xmlns:a16="http://schemas.microsoft.com/office/drawing/2014/main" id="{F93A46D0-554D-4D89-BCD3-848943380B51}"/>
               </a:ext>
             </a:extLst>
           </p:cNvPr>
@@ -21921,313 +22753,17 @@
           <a:bodyPr/>
           <a:lstStyle/>
           <a:p>
-            <a:endParaRPr lang="en-IE"/>
-          </a:p>
-        </p:txBody>
-      </p:sp>
-      <p:sp>
-        <p:nvSpPr>
-          <p:cNvPr id="4" name="Text Placeholder 3">
-            <a:extLst>
-              <a:ext uri="{FF2B5EF4-FFF2-40B4-BE49-F238E27FC236}">
-                <a16:creationId xmlns:a16="http://schemas.microsoft.com/office/drawing/2014/main" id="{3DD948D7-0781-4D9D-9558-A3A7B075F39C}"/>
-              </a:ext>
-            </a:extLst>
-          </p:cNvPr>
-          <p:cNvSpPr>
-            <a:spLocks noGrp="1"/>
-          </p:cNvSpPr>
-          <p:nvPr>
-            <p:ph type="body" sz="half" idx="2"/>
-          </p:nvPr>
-        </p:nvSpPr>
-        <p:spPr/>
-        <p:txBody>
-          <a:bodyPr/>
-          <a:lstStyle/>
-          <a:p>
-            <a:endParaRPr lang="en-IE"/>
-          </a:p>
-        </p:txBody>
-      </p:sp>
-      <p:graphicFrame>
-        <p:nvGraphicFramePr>
-          <p:cNvPr id="6" name="Content Placeholder 4">
-            <a:extLst>
-              <a:ext uri="{FF2B5EF4-FFF2-40B4-BE49-F238E27FC236}">
-                <a16:creationId xmlns:a16="http://schemas.microsoft.com/office/drawing/2014/main" id="{D0624120-84FE-4881-88F9-A4A66A63DF4D}"/>
-              </a:ext>
-            </a:extLst>
-          </p:cNvPr>
-          <p:cNvGraphicFramePr>
-            <a:graphicFrameLocks/>
-          </p:cNvGraphicFramePr>
-          <p:nvPr>
-            <p:extLst>
-              <p:ext uri="{D42A27DB-BD31-4B8C-83A1-F6EECF244321}">
-                <p14:modId xmlns:p14="http://schemas.microsoft.com/office/powerpoint/2010/main" val="1630609190"/>
-              </p:ext>
-            </p:extLst>
-          </p:nvPr>
-        </p:nvGraphicFramePr>
-        <p:xfrm>
-          <a:off x="1251559" y="177452"/>
-          <a:ext cx="4572000" cy="2141912"/>
-        </p:xfrm>
-        <a:graphic>
-          <a:graphicData uri="http://schemas.openxmlformats.org/drawingml/2006/table">
-            <a:tbl>
-              <a:tblPr firstRow="1" bandRow="1">
-                <a:tableStyleId>{BC89EF96-8CEA-46FF-86C4-4CE0E7609802}</a:tableStyleId>
-              </a:tblPr>
-              <a:tblGrid>
-                <a:gridCol w="1524000">
-                  <a:extLst>
-                    <a:ext uri="{9D8B030D-6E8A-4147-A177-3AD203B41FA5}">
-                      <a16:colId xmlns:a16="http://schemas.microsoft.com/office/drawing/2014/main" val="20000"/>
-                    </a:ext>
-                  </a:extLst>
-                </a:gridCol>
-                <a:gridCol w="1524000">
-                  <a:extLst>
-                    <a:ext uri="{9D8B030D-6E8A-4147-A177-3AD203B41FA5}">
-                      <a16:colId xmlns:a16="http://schemas.microsoft.com/office/drawing/2014/main" val="20001"/>
-                    </a:ext>
-                  </a:extLst>
-                </a:gridCol>
-                <a:gridCol w="1524000">
-                  <a:extLst>
-                    <a:ext uri="{9D8B030D-6E8A-4147-A177-3AD203B41FA5}">
-                      <a16:colId xmlns:a16="http://schemas.microsoft.com/office/drawing/2014/main" val="20002"/>
-                    </a:ext>
-                  </a:extLst>
-                </a:gridCol>
-              </a:tblGrid>
-              <a:tr h="535478">
-                <a:tc>
-                  <a:txBody>
-                    <a:bodyPr/>
-                    <a:lstStyle/>
-                    <a:p>
-                      <a:r>
-                        <a:rPr lang="en-US" dirty="0"/>
-                        <a:t>Class</a:t>
-                      </a:r>
-                    </a:p>
-                  </a:txBody>
-                  <a:tcPr anchor="ctr"/>
-                </a:tc>
-                <a:tc>
-                  <a:txBody>
-                    <a:bodyPr/>
-                    <a:lstStyle/>
-                    <a:p>
-                      <a:pPr algn="ctr"/>
-                      <a:r>
-                        <a:rPr lang="en-US" dirty="0"/>
-                        <a:t>Group 1</a:t>
-                      </a:r>
-                    </a:p>
-                  </a:txBody>
-                  <a:tcPr anchor="ctr"/>
-                </a:tc>
-                <a:tc>
-                  <a:txBody>
-                    <a:bodyPr/>
-                    <a:lstStyle/>
-                    <a:p>
-                      <a:pPr algn="ctr"/>
-                      <a:r>
-                        <a:rPr lang="en-US" dirty="0"/>
-                        <a:t>Group 2</a:t>
-                      </a:r>
-                    </a:p>
-                  </a:txBody>
-                  <a:tcPr anchor="ctr"/>
-                </a:tc>
-                <a:extLst>
-                  <a:ext uri="{0D108BD9-81ED-4DB2-BD59-A6C34878D82A}">
-                    <a16:rowId xmlns:a16="http://schemas.microsoft.com/office/drawing/2014/main" val="10000"/>
-                  </a:ext>
-                </a:extLst>
-              </a:tr>
-              <a:tr h="535478">
-                <a:tc>
-                  <a:txBody>
-                    <a:bodyPr/>
-                    <a:lstStyle/>
-                    <a:p>
-                      <a:r>
-                        <a:rPr lang="en-US" dirty="0"/>
-                        <a:t>Class 1</a:t>
-                      </a:r>
-                    </a:p>
-                  </a:txBody>
-                  <a:tcPr anchor="ctr"/>
-                </a:tc>
-                <a:tc>
-                  <a:txBody>
-                    <a:bodyPr/>
-                    <a:lstStyle/>
-                    <a:p>
-                      <a:pPr algn="ctr"/>
-                      <a:r>
-                        <a:rPr lang="en-US" dirty="0"/>
-                        <a:t>82</a:t>
-                      </a:r>
-                    </a:p>
-                  </a:txBody>
-                  <a:tcPr anchor="ctr"/>
-                </a:tc>
-                <a:tc>
-                  <a:txBody>
-                    <a:bodyPr/>
-                    <a:lstStyle/>
-                    <a:p>
-                      <a:pPr algn="ctr"/>
-                      <a:r>
-                        <a:rPr lang="en-US" dirty="0"/>
-                        <a:t>95</a:t>
-                      </a:r>
-                    </a:p>
-                  </a:txBody>
-                  <a:tcPr anchor="ctr"/>
-                </a:tc>
-                <a:extLst>
-                  <a:ext uri="{0D108BD9-81ED-4DB2-BD59-A6C34878D82A}">
-                    <a16:rowId xmlns:a16="http://schemas.microsoft.com/office/drawing/2014/main" val="10001"/>
-                  </a:ext>
-                </a:extLst>
-              </a:tr>
-              <a:tr h="535478">
-                <a:tc>
-                  <a:txBody>
-                    <a:bodyPr/>
-                    <a:lstStyle/>
-                    <a:p>
-                      <a:r>
-                        <a:rPr lang="en-US" dirty="0"/>
-                        <a:t>Class 2</a:t>
-                      </a:r>
-                    </a:p>
-                  </a:txBody>
-                  <a:tcPr anchor="ctr"/>
-                </a:tc>
-                <a:tc>
-                  <a:txBody>
-                    <a:bodyPr/>
-                    <a:lstStyle/>
-                    <a:p>
-                      <a:pPr algn="ctr"/>
-                      <a:r>
-                        <a:rPr lang="en-US" dirty="0"/>
-                        <a:t>76</a:t>
-                      </a:r>
-                    </a:p>
-                  </a:txBody>
-                  <a:tcPr anchor="ctr"/>
-                </a:tc>
-                <a:tc>
-                  <a:txBody>
-                    <a:bodyPr/>
-                    <a:lstStyle/>
-                    <a:p>
-                      <a:pPr algn="ctr"/>
-                      <a:r>
-                        <a:rPr lang="en-US" dirty="0"/>
-                        <a:t>88</a:t>
-                      </a:r>
-                    </a:p>
-                  </a:txBody>
-                  <a:tcPr anchor="ctr"/>
-                </a:tc>
-                <a:extLst>
-                  <a:ext uri="{0D108BD9-81ED-4DB2-BD59-A6C34878D82A}">
-                    <a16:rowId xmlns:a16="http://schemas.microsoft.com/office/drawing/2014/main" val="10002"/>
-                  </a:ext>
-                </a:extLst>
-              </a:tr>
-              <a:tr h="535478">
-                <a:tc>
-                  <a:txBody>
-                    <a:bodyPr/>
-                    <a:lstStyle/>
-                    <a:p>
-                      <a:r>
-                        <a:rPr lang="en-US" dirty="0"/>
-                        <a:t>Class 3</a:t>
-                      </a:r>
-                    </a:p>
-                  </a:txBody>
-                  <a:tcPr anchor="ctr"/>
-                </a:tc>
-                <a:tc>
-                  <a:txBody>
-                    <a:bodyPr/>
-                    <a:lstStyle/>
-                    <a:p>
-                      <a:pPr algn="ctr"/>
-                      <a:r>
-                        <a:rPr lang="en-US" dirty="0"/>
-                        <a:t>84</a:t>
-                      </a:r>
-                    </a:p>
-                  </a:txBody>
-                  <a:tcPr anchor="ctr"/>
-                </a:tc>
-                <a:tc>
-                  <a:txBody>
-                    <a:bodyPr/>
-                    <a:lstStyle/>
-                    <a:p>
-                      <a:pPr algn="ctr"/>
-                      <a:r>
-                        <a:rPr lang="en-US" dirty="0"/>
-                        <a:t>90</a:t>
-                      </a:r>
-                    </a:p>
-                  </a:txBody>
-                  <a:tcPr anchor="ctr"/>
-                </a:tc>
-                <a:extLst>
-                  <a:ext uri="{0D108BD9-81ED-4DB2-BD59-A6C34878D82A}">
-                    <a16:rowId xmlns:a16="http://schemas.microsoft.com/office/drawing/2014/main" val="10003"/>
-                  </a:ext>
-                </a:extLst>
-              </a:tr>
-            </a:tbl>
-          </a:graphicData>
-        </a:graphic>
-      </p:graphicFrame>
-      <p:sp>
-        <p:nvSpPr>
-          <p:cNvPr id="13" name="Content Placeholder 12">
-            <a:extLst>
-              <a:ext uri="{FF2B5EF4-FFF2-40B4-BE49-F238E27FC236}">
-                <a16:creationId xmlns:a16="http://schemas.microsoft.com/office/drawing/2014/main" id="{14C6E1B7-AEDE-485A-8EE1-9D9ECCE55996}"/>
-              </a:ext>
-            </a:extLst>
-          </p:cNvPr>
-          <p:cNvSpPr>
-            <a:spLocks noGrp="1"/>
-          </p:cNvSpPr>
-          <p:nvPr>
-            <p:ph idx="1"/>
-          </p:nvPr>
-        </p:nvSpPr>
-        <p:spPr/>
-        <p:txBody>
-          <a:bodyPr/>
-          <a:lstStyle/>
-          <a:p>
-            <a:endParaRPr lang="en-IE"/>
+            <a:r>
+              <a:rPr lang="en-IE" dirty="0"/>
+              <a:t>Questions</a:t>
+            </a:r>
           </a:p>
         </p:txBody>
       </p:sp>
     </p:spTree>
     <p:extLst>
       <p:ext uri="{BB962C8B-B14F-4D97-AF65-F5344CB8AC3E}">
-        <p14:creationId xmlns:p14="http://schemas.microsoft.com/office/powerpoint/2010/main" val="1001101328"/>
+        <p14:creationId xmlns:p14="http://schemas.microsoft.com/office/powerpoint/2010/main" val="12900773"/>
       </p:ext>
     </p:extLst>
   </p:cSld>
@@ -22313,7 +22849,7 @@
           <a:p>
             <a:r>
               <a:rPr lang="en-US" dirty="0"/>
-              <a:t>The Problem</a:t>
+              <a:t>The Problem.</a:t>
             </a:r>
           </a:p>
           <a:p>
@@ -22983,7 +23519,7 @@
           <a:p>
             <a:r>
               <a:rPr lang="en-US" dirty="0"/>
-              <a:t>Discover a relationship between algorithms and questions.</a:t>
+              <a:t>Discover a more efficient form of preparation.</a:t>
             </a:r>
           </a:p>
           <a:p>
@@ -23110,7 +23646,7 @@
         </p:blipFill>
         <p:spPr>
           <a:xfrm>
-            <a:off x="267744" y="4140870"/>
+            <a:off x="95909" y="2447420"/>
             <a:ext cx="1374209" cy="1963156"/>
           </a:xfrm>
           <a:prstGeom prst="rect">
@@ -23649,7 +24185,6 @@
           </a:lstStyle>
           <a:p>
             <a:pPr marL="0" indent="0" algn="ctr">
-              <a:buFont typeface="Arial" pitchFamily="34" charset="0"/>
               <a:buNone/>
             </a:pPr>
             <a:r>
@@ -23660,7 +24195,17 @@
                   </a:schemeClr>
                 </a:solidFill>
               </a:rPr>
-              <a:t>Related Works</a:t>
+              <a:t>Problem</a:t>
+            </a:r>
+          </a:p>
+          <a:p>
+            <a:r>
+              <a:rPr lang="en-US" dirty="0">
+                <a:solidFill>
+                  <a:schemeClr val="tx2"/>
+                </a:solidFill>
+              </a:rPr>
+              <a:t>Preparing questions is time consuming.</a:t>
             </a:r>
           </a:p>
           <a:p>
@@ -23672,20 +24217,13 @@
           <a:p>
             <a:r>
               <a:rPr lang="en-US" dirty="0"/>
-              <a:t>5-10 questions per section.</a:t>
+              <a:t>Try to show the flexibility of algorithms.</a:t>
             </a:r>
           </a:p>
           <a:p>
-            <a:pPr lvl="1"/>
             <a:r>
               <a:rPr lang="en-US" dirty="0"/>
-              <a:t>Overlapping ideas.</a:t>
-            </a:r>
-          </a:p>
-          <a:p>
-            <a:r>
-              <a:rPr lang="en-US" dirty="0"/>
-              <a:t>Try to show the flexibility of algorithms.</a:t>
+              <a:t>Reinforce material programmers know.</a:t>
             </a:r>
           </a:p>
           <a:p>

</xml_diff>

<commit_message>
Updated slides and notes
</commit_message>
<xml_diff>
--- a/presentation/New Thesis Presentation.pptx
+++ b/presentation/New Thesis Presentation.pptx
@@ -5807,7 +5807,7 @@
           <a:p>
             <a:fld id="{59041DB8-B66F-4DC8-A96E-33677E0F90FF}" type="datetimeFigureOut">
               <a:rPr lang="en-US" smtClean="0"/>
-              <a:t>1/18/2018</a:t>
+              <a:t>1/19/2018</a:t>
             </a:fld>
             <a:endParaRPr lang="en-US"/>
           </a:p>
@@ -5972,7 +5972,7 @@
           <a:p>
             <a:fld id="{DEB49C4A-65AC-492D-9701-81B46C3AD0E4}" type="datetimeFigureOut">
               <a:rPr lang="en-US" smtClean="0"/>
-              <a:t>1/18/2018</a:t>
+              <a:t>1/19/2018</a:t>
             </a:fld>
             <a:endParaRPr lang="en-US"/>
           </a:p>
@@ -7641,7 +7641,7 @@
                 <a:ea typeface="+mn-ea"/>
                 <a:cs typeface="+mn-cs"/>
               </a:rPr>
-              <a:t>. We solved it using the Palindrome Algorithm, which was based on our initial intuition.</a:t>
+              <a:t>. We solved it using the Palindrome Algorithm, which was based on our initial intuition when we first read the question. </a:t>
             </a:r>
           </a:p>
           <a:p>
@@ -7669,7 +7669,7 @@
                 <a:ea typeface="+mn-ea"/>
                 <a:cs typeface="+mn-cs"/>
               </a:rPr>
-              <a:t>Comparing the two we that 6 edit operations would be required to transform one into the other. 2 additional nodes and 4 additional edges. </a:t>
+              <a:t>Comparing the two we see that 6 edit operations would be required to transform one into the other. 2 additional nodes and 4 additional edges. </a:t>
             </a:r>
           </a:p>
           <a:p>
@@ -8009,7 +8009,7 @@
                 <a:ea typeface="+mn-ea"/>
                 <a:cs typeface="+mn-cs"/>
               </a:rPr>
-              <a:t>Overall there is a clear link between interview questions and standard algorithms that readers will have learned in a programming course. Of the 36 questions, 21 questions had a pattern that we chose to focus on appear. This is roughly 60%. This number would be increased if we consider other patterns.</a:t>
+              <a:t>Overall there is a clear link between interview questions and standard algorithms that readers will have learned in a programming course. Of the 36 questions, 21 had a pattern that we chose to focus on appear. This is roughly 60%. This number would be increased if we consider other patterns.</a:t>
             </a:r>
           </a:p>
           <a:p>
@@ -10375,7 +10375,7 @@
           <a:p>
             <a:fld id="{384A29A4-78C8-47AB-BA06-22CB45938951}" type="datetime1">
               <a:rPr lang="en-US" smtClean="0"/>
-              <a:t>1/18/2018</a:t>
+              <a:t>1/19/2018</a:t>
             </a:fld>
             <a:endParaRPr lang="en-US"/>
           </a:p>
@@ -10570,7 +10570,7 @@
           <a:p>
             <a:fld id="{E1ED4ACF-2D82-46F2-A8E9-23963AA34E86}" type="datetime1">
               <a:rPr lang="en-US" smtClean="0"/>
-              <a:t>1/18/2018</a:t>
+              <a:t>1/19/2018</a:t>
             </a:fld>
             <a:endParaRPr lang="en-US"/>
           </a:p>
@@ -10754,7 +10754,7 @@
           <a:p>
             <a:fld id="{AE374B5B-21A0-4192-BF4C-38187F1A68D8}" type="datetime1">
               <a:rPr lang="en-US" smtClean="0"/>
-              <a:t>1/18/2018</a:t>
+              <a:t>1/19/2018</a:t>
             </a:fld>
             <a:endParaRPr lang="en-US"/>
           </a:p>
@@ -13095,7 +13095,7 @@
           <a:p>
             <a:fld id="{33B5CF7C-B333-48E1-A4A6-83A3C8B73AC0}" type="datetime1">
               <a:rPr lang="en-US" smtClean="0"/>
-              <a:t>1/18/2018</a:t>
+              <a:t>1/19/2018</a:t>
             </a:fld>
             <a:endParaRPr lang="en-US"/>
           </a:p>
@@ -13548,7 +13548,7 @@
           <a:p>
             <a:fld id="{AE320762-5CBF-4210-AB54-376B091119F8}" type="datetime1">
               <a:rPr lang="en-US" smtClean="0"/>
-              <a:t>1/18/2018</a:t>
+              <a:t>1/19/2018</a:t>
             </a:fld>
             <a:endParaRPr lang="en-US"/>
           </a:p>
@@ -13680,7 +13680,7 @@
           <a:p>
             <a:fld id="{7F0DB371-BF5F-4058-A212-1A908E4D2674}" type="datetime1">
               <a:rPr lang="en-US" smtClean="0"/>
-              <a:t>1/18/2018</a:t>
+              <a:t>1/19/2018</a:t>
             </a:fld>
             <a:endParaRPr lang="en-US"/>
           </a:p>
@@ -15613,7 +15613,7 @@
           <a:p>
             <a:fld id="{60A4083B-90AA-48CF-BAD5-00AA24D7F288}" type="datetime1">
               <a:rPr lang="en-US" smtClean="0"/>
-              <a:t>1/18/2018</a:t>
+              <a:t>1/19/2018</a:t>
             </a:fld>
             <a:endParaRPr lang="en-US"/>
           </a:p>
@@ -17872,7 +17872,7 @@
             <a:fld id="{F5BAF629-ECA2-4CF3-B790-9D9BDED98269}" type="datetime1">
               <a:rPr lang="en-US" smtClean="0"/>
               <a:pPr/>
-              <a:t>1/18/2018</a:t>
+              <a:t>1/19/2018</a:t>
             </a:fld>
             <a:endParaRPr lang="en-US"/>
           </a:p>
@@ -22167,7 +22167,7 @@
             <a:fld id="{B51B2453-8663-4C69-AF73-9FD7B1DEC5D0}" type="datetime1">
               <a:rPr lang="en-US" smtClean="0"/>
               <a:pPr/>
-              <a:t>1/18/2018</a:t>
+              <a:t>1/19/2018</a:t>
             </a:fld>
             <a:endParaRPr lang="en-US" dirty="0"/>
           </a:p>

</xml_diff>

<commit_message>
Updated notes and graph
</commit_message>
<xml_diff>
--- a/presentation/New Thesis Presentation.pptx
+++ b/presentation/New Thesis Presentation.pptx
@@ -5807,7 +5807,7 @@
           <a:p>
             <a:fld id="{59041DB8-B66F-4DC8-A96E-33677E0F90FF}" type="datetimeFigureOut">
               <a:rPr lang="en-US" smtClean="0"/>
-              <a:t>1/19/2018</a:t>
+              <a:t>1/22/2018</a:t>
             </a:fld>
             <a:endParaRPr lang="en-US"/>
           </a:p>
@@ -5972,7 +5972,7 @@
           <a:p>
             <a:fld id="{DEB49C4A-65AC-492D-9701-81B46C3AD0E4}" type="datetimeFigureOut">
               <a:rPr lang="en-US" smtClean="0"/>
-              <a:t>1/19/2018</a:t>
+              <a:t>1/22/2018</a:t>
             </a:fld>
             <a:endParaRPr lang="en-US"/>
           </a:p>
@@ -10375,7 +10375,7 @@
           <a:p>
             <a:fld id="{384A29A4-78C8-47AB-BA06-22CB45938951}" type="datetime1">
               <a:rPr lang="en-US" smtClean="0"/>
-              <a:t>1/19/2018</a:t>
+              <a:t>1/22/2018</a:t>
             </a:fld>
             <a:endParaRPr lang="en-US"/>
           </a:p>
@@ -10570,7 +10570,7 @@
           <a:p>
             <a:fld id="{E1ED4ACF-2D82-46F2-A8E9-23963AA34E86}" type="datetime1">
               <a:rPr lang="en-US" smtClean="0"/>
-              <a:t>1/19/2018</a:t>
+              <a:t>1/22/2018</a:t>
             </a:fld>
             <a:endParaRPr lang="en-US"/>
           </a:p>
@@ -10754,7 +10754,7 @@
           <a:p>
             <a:fld id="{AE374B5B-21A0-4192-BF4C-38187F1A68D8}" type="datetime1">
               <a:rPr lang="en-US" smtClean="0"/>
-              <a:t>1/19/2018</a:t>
+              <a:t>1/22/2018</a:t>
             </a:fld>
             <a:endParaRPr lang="en-US"/>
           </a:p>
@@ -13095,7 +13095,7 @@
           <a:p>
             <a:fld id="{33B5CF7C-B333-48E1-A4A6-83A3C8B73AC0}" type="datetime1">
               <a:rPr lang="en-US" smtClean="0"/>
-              <a:t>1/19/2018</a:t>
+              <a:t>1/22/2018</a:t>
             </a:fld>
             <a:endParaRPr lang="en-US"/>
           </a:p>
@@ -13548,7 +13548,7 @@
           <a:p>
             <a:fld id="{AE320762-5CBF-4210-AB54-376B091119F8}" type="datetime1">
               <a:rPr lang="en-US" smtClean="0"/>
-              <a:t>1/19/2018</a:t>
+              <a:t>1/22/2018</a:t>
             </a:fld>
             <a:endParaRPr lang="en-US"/>
           </a:p>
@@ -13680,7 +13680,7 @@
           <a:p>
             <a:fld id="{7F0DB371-BF5F-4058-A212-1A908E4D2674}" type="datetime1">
               <a:rPr lang="en-US" smtClean="0"/>
-              <a:t>1/19/2018</a:t>
+              <a:t>1/22/2018</a:t>
             </a:fld>
             <a:endParaRPr lang="en-US"/>
           </a:p>
@@ -15613,7 +15613,7 @@
           <a:p>
             <a:fld id="{60A4083B-90AA-48CF-BAD5-00AA24D7F288}" type="datetime1">
               <a:rPr lang="en-US" smtClean="0"/>
-              <a:t>1/19/2018</a:t>
+              <a:t>1/22/2018</a:t>
             </a:fld>
             <a:endParaRPr lang="en-US"/>
           </a:p>
@@ -17872,7 +17872,7 @@
             <a:fld id="{F5BAF629-ECA2-4CF3-B790-9D9BDED98269}" type="datetime1">
               <a:rPr lang="en-US" smtClean="0"/>
               <a:pPr/>
-              <a:t>1/19/2018</a:t>
+              <a:t>1/22/2018</a:t>
             </a:fld>
             <a:endParaRPr lang="en-US"/>
           </a:p>
@@ -22167,7 +22167,7 @@
             <a:fld id="{B51B2453-8663-4C69-AF73-9FD7B1DEC5D0}" type="datetime1">
               <a:rPr lang="en-US" smtClean="0"/>
               <a:pPr/>
-              <a:t>1/19/2018</a:t>
+              <a:t>1/22/2018</a:t>
             </a:fld>
             <a:endParaRPr lang="en-US" dirty="0"/>
           </a:p>
@@ -25287,14 +25287,14 @@
             <p:ph sz="half" idx="2"/>
             <p:extLst>
               <p:ext uri="{D42A27DB-BD31-4B8C-83A1-F6EECF244321}">
-                <p14:modId xmlns:p14="http://schemas.microsoft.com/office/powerpoint/2010/main" val="3749858720"/>
+                <p14:modId xmlns:p14="http://schemas.microsoft.com/office/powerpoint/2010/main" val="1801055158"/>
               </p:ext>
             </p:extLst>
           </p:nvPr>
         </p:nvGraphicFramePr>
         <p:xfrm>
-          <a:off x="1107508" y="1818322"/>
-          <a:ext cx="4759893" cy="3567870"/>
+          <a:off x="1222327" y="1818322"/>
+          <a:ext cx="4759893" cy="4281854"/>
         </p:xfrm>
         <a:graphic>
           <a:graphicData uri="http://schemas.openxmlformats.org/drawingml/2006/chart">

</xml_diff>